<commit_message>
"Kochen-Specker Theorem in QIVPM.pptx" Updating...
</commit_message>
<xml_diff>
--- a/Kochen-Specker Theorem in QIVPM.pptx
+++ b/Kochen-Specker Theorem in QIVPM.pptx
@@ -5,14 +5,15 @@
     <p:sldMasterId id="2147483648" r:id="rId1"/>
   </p:sldMasterIdLst>
   <p:notesMasterIdLst>
-    <p:notesMasterId r:id="rId4"/>
+    <p:notesMasterId r:id="rId5"/>
   </p:notesMasterIdLst>
   <p:handoutMasterIdLst>
-    <p:handoutMasterId r:id="rId5"/>
+    <p:handoutMasterId r:id="rId6"/>
   </p:handoutMasterIdLst>
   <p:sldIdLst>
     <p:sldId id="256" r:id="rId2"/>
     <p:sldId id="257" r:id="rId3"/>
+    <p:sldId id="258" r:id="rId4"/>
   </p:sldIdLst>
   <p:sldSz cx="12192000" cy="6858000"/>
   <p:notesSz cx="6858000" cy="9144000"/>
@@ -111,6 +112,11 @@
       </a:defRPr>
     </a:lvl9pPr>
   </p:defaultTextStyle>
+  <p:extLst>
+    <p:ext uri="{EFAFB233-063F-42B5-8137-9DF3F51BA10A}">
+      <p15:sldGuideLst xmlns:p15="http://schemas.microsoft.com/office/powerpoint/2012/main"/>
+    </p:ext>
+  </p:extLst>
 </p:presentation>
 </file>
 
@@ -797,6 +803,115 @@
 </p:notes>
 </file>
 
+<file path=ppt/notesSlides/notesSlide3.xml><?xml version="1.0" encoding="utf-8"?>
+<p:notes xmlns:a="http://schemas.openxmlformats.org/drawingml/2006/main" xmlns:r="http://schemas.openxmlformats.org/officeDocument/2006/relationships" xmlns:p="http://schemas.openxmlformats.org/presentationml/2006/main">
+  <p:cSld>
+    <p:spTree>
+      <p:nvGrpSpPr>
+        <p:cNvPr id="1" name=""/>
+        <p:cNvGrpSpPr/>
+        <p:nvPr/>
+      </p:nvGrpSpPr>
+      <p:grpSpPr>
+        <a:xfrm>
+          <a:off x="0" y="0"/>
+          <a:ext cx="0" cy="0"/>
+          <a:chOff x="0" y="0"/>
+          <a:chExt cx="0" cy="0"/>
+        </a:xfrm>
+      </p:grpSpPr>
+      <p:sp>
+        <p:nvSpPr>
+          <p:cNvPr id="2" name="Slide Image Placeholder 1"/>
+          <p:cNvSpPr>
+            <a:spLocks noGrp="1" noRot="1" noChangeAspect="1"/>
+          </p:cNvSpPr>
+          <p:nvPr>
+            <p:ph type="sldImg"/>
+          </p:nvPr>
+        </p:nvSpPr>
+        <p:spPr/>
+      </p:sp>
+      <p:sp>
+        <p:nvSpPr>
+          <p:cNvPr id="3" name="Notes Placeholder 2"/>
+          <p:cNvSpPr>
+            <a:spLocks noGrp="1"/>
+          </p:cNvSpPr>
+          <p:nvPr>
+            <p:ph type="body" idx="1"/>
+          </p:nvPr>
+        </p:nvSpPr>
+        <p:spPr/>
+        <p:txBody>
+          <a:bodyPr/>
+          <a:lstStyle/>
+          <a:p>
+            <a:r>
+              <a:rPr lang="en-US" dirty="0" smtClean="0"/>
+              <a:t>XITS font is required</a:t>
+            </a:r>
+            <a:r>
+              <a:rPr lang="en-US" baseline="0" dirty="0" smtClean="0"/>
+              <a:t> to display Formal Script (\</a:t>
+            </a:r>
+            <a:r>
+              <a:rPr lang="en-US" baseline="0" dirty="0" err="1" smtClean="0"/>
+              <a:t>mathscr</a:t>
+            </a:r>
+            <a:r>
+              <a:rPr lang="en-US" baseline="0" dirty="0" smtClean="0"/>
+              <a:t>) font correctly.</a:t>
+            </a:r>
+            <a:endParaRPr lang="en-US" dirty="0" smtClean="0"/>
+          </a:p>
+          <a:p>
+            <a:r>
+              <a:rPr lang="en-US" dirty="0" smtClean="0"/>
+              <a:t>https://www.ctan.org/tex-archive/fonts/xits/</a:t>
+            </a:r>
+          </a:p>
+          <a:p>
+            <a:endParaRPr lang="en-US" dirty="0"/>
+          </a:p>
+        </p:txBody>
+      </p:sp>
+      <p:sp>
+        <p:nvSpPr>
+          <p:cNvPr id="4" name="Slide Number Placeholder 3"/>
+          <p:cNvSpPr>
+            <a:spLocks noGrp="1"/>
+          </p:cNvSpPr>
+          <p:nvPr>
+            <p:ph type="sldNum" sz="quarter" idx="10"/>
+          </p:nvPr>
+        </p:nvSpPr>
+        <p:spPr/>
+        <p:txBody>
+          <a:bodyPr/>
+          <a:lstStyle/>
+          <a:p>
+            <a:fld id="{553141C9-E3AF-4773-84E5-4C6860670B56}" type="slidenum">
+              <a:rPr lang="en-US" smtClean="0"/>
+              <a:t>3</a:t>
+            </a:fld>
+            <a:endParaRPr lang="en-US"/>
+          </a:p>
+        </p:txBody>
+      </p:sp>
+    </p:spTree>
+    <p:extLst>
+      <p:ext uri="{BB962C8B-B14F-4D97-AF65-F5344CB8AC3E}">
+        <p14:creationId xmlns:p14="http://schemas.microsoft.com/office/powerpoint/2010/main" val="2827294382"/>
+      </p:ext>
+    </p:extLst>
+  </p:cSld>
+  <p:clrMapOvr>
+    <a:masterClrMapping/>
+  </p:clrMapOvr>
+</p:notes>
+</file>
+
 <file path=ppt/slideLayouts/slideLayout1.xml><?xml version="1.0" encoding="utf-8"?>
 <p:sldLayout xmlns:a="http://schemas.openxmlformats.org/drawingml/2006/main" xmlns:r="http://schemas.openxmlformats.org/officeDocument/2006/relationships" xmlns:p="http://schemas.openxmlformats.org/presentationml/2006/main" type="title" preserve="1">
   <p:cSld name="Title Slide">
@@ -928,7 +1043,7 @@
           <a:p>
             <a:fld id="{D1C3BEE1-3E90-49E5-9A2E-FAD1B5091927}" type="datetimeFigureOut">
               <a:rPr lang="en-US" smtClean="0"/>
-              <a:t>6/19/2017</a:t>
+              <a:t>6/20/2017</a:t>
             </a:fld>
             <a:endParaRPr lang="en-US"/>
           </a:p>
@@ -1098,7 +1213,7 @@
           <a:p>
             <a:fld id="{D1C3BEE1-3E90-49E5-9A2E-FAD1B5091927}" type="datetimeFigureOut">
               <a:rPr lang="en-US" smtClean="0"/>
-              <a:t>6/19/2017</a:t>
+              <a:t>6/20/2017</a:t>
             </a:fld>
             <a:endParaRPr lang="en-US"/>
           </a:p>
@@ -1278,7 +1393,7 @@
           <a:p>
             <a:fld id="{D1C3BEE1-3E90-49E5-9A2E-FAD1B5091927}" type="datetimeFigureOut">
               <a:rPr lang="en-US" smtClean="0"/>
-              <a:t>6/19/2017</a:t>
+              <a:t>6/20/2017</a:t>
             </a:fld>
             <a:endParaRPr lang="en-US"/>
           </a:p>
@@ -1448,7 +1563,7 @@
           <a:p>
             <a:fld id="{D1C3BEE1-3E90-49E5-9A2E-FAD1B5091927}" type="datetimeFigureOut">
               <a:rPr lang="en-US" smtClean="0"/>
-              <a:t>6/19/2017</a:t>
+              <a:t>6/20/2017</a:t>
             </a:fld>
             <a:endParaRPr lang="en-US"/>
           </a:p>
@@ -1694,7 +1809,7 @@
           <a:p>
             <a:fld id="{D1C3BEE1-3E90-49E5-9A2E-FAD1B5091927}" type="datetimeFigureOut">
               <a:rPr lang="en-US" smtClean="0"/>
-              <a:t>6/19/2017</a:t>
+              <a:t>6/20/2017</a:t>
             </a:fld>
             <a:endParaRPr lang="en-US"/>
           </a:p>
@@ -1926,7 +2041,7 @@
           <a:p>
             <a:fld id="{D1C3BEE1-3E90-49E5-9A2E-FAD1B5091927}" type="datetimeFigureOut">
               <a:rPr lang="en-US" smtClean="0"/>
-              <a:t>6/19/2017</a:t>
+              <a:t>6/20/2017</a:t>
             </a:fld>
             <a:endParaRPr lang="en-US"/>
           </a:p>
@@ -2293,7 +2408,7 @@
           <a:p>
             <a:fld id="{D1C3BEE1-3E90-49E5-9A2E-FAD1B5091927}" type="datetimeFigureOut">
               <a:rPr lang="en-US" smtClean="0"/>
-              <a:t>6/19/2017</a:t>
+              <a:t>6/20/2017</a:t>
             </a:fld>
             <a:endParaRPr lang="en-US"/>
           </a:p>
@@ -2411,7 +2526,7 @@
           <a:p>
             <a:fld id="{D1C3BEE1-3E90-49E5-9A2E-FAD1B5091927}" type="datetimeFigureOut">
               <a:rPr lang="en-US" smtClean="0"/>
-              <a:t>6/19/2017</a:t>
+              <a:t>6/20/2017</a:t>
             </a:fld>
             <a:endParaRPr lang="en-US"/>
           </a:p>
@@ -2506,7 +2621,7 @@
           <a:p>
             <a:fld id="{D1C3BEE1-3E90-49E5-9A2E-FAD1B5091927}" type="datetimeFigureOut">
               <a:rPr lang="en-US" smtClean="0"/>
-              <a:t>6/19/2017</a:t>
+              <a:t>6/20/2017</a:t>
             </a:fld>
             <a:endParaRPr lang="en-US"/>
           </a:p>
@@ -2783,7 +2898,7 @@
           <a:p>
             <a:fld id="{D1C3BEE1-3E90-49E5-9A2E-FAD1B5091927}" type="datetimeFigureOut">
               <a:rPr lang="en-US" smtClean="0"/>
-              <a:t>6/19/2017</a:t>
+              <a:t>6/20/2017</a:t>
             </a:fld>
             <a:endParaRPr lang="en-US"/>
           </a:p>
@@ -3036,7 +3151,7 @@
           <a:p>
             <a:fld id="{D1C3BEE1-3E90-49E5-9A2E-FAD1B5091927}" type="datetimeFigureOut">
               <a:rPr lang="en-US" smtClean="0"/>
-              <a:t>6/19/2017</a:t>
+              <a:t>6/20/2017</a:t>
             </a:fld>
             <a:endParaRPr lang="en-US"/>
           </a:p>
@@ -3249,7 +3364,7 @@
           <a:p>
             <a:fld id="{D1C3BEE1-3E90-49E5-9A2E-FAD1B5091927}" type="datetimeFigureOut">
               <a:rPr lang="en-US" smtClean="0"/>
-              <a:t>6/19/2017</a:t>
+              <a:t>6/20/2017</a:t>
             </a:fld>
             <a:endParaRPr lang="en-US"/>
           </a:p>
@@ -3756,42 +3871,1915 @@
           </a:p>
         </p:txBody>
       </p:sp>
-      <p:sp>
-        <p:nvSpPr>
-          <p:cNvPr id="3" name="Content Placeholder 2"/>
-          <p:cNvSpPr>
-            <a:spLocks noGrp="1"/>
-          </p:cNvSpPr>
-          <p:nvPr>
-            <p:ph idx="1"/>
-          </p:nvPr>
-        </p:nvSpPr>
-        <p:spPr/>
-        <p:txBody>
-          <a:bodyPr/>
-          <a:lstStyle/>
-          <a:p>
-            <a:r>
-              <a:rPr lang="en-US" dirty="0" smtClean="0"/>
-              <a:t>There is no </a:t>
-            </a:r>
-            <a:r>
-              <a:rPr lang="en-US" dirty="0" smtClean="0">
-                <a:effectLst/>
-              </a:rPr>
-              <a:t>cryptodeterministic measure</a:t>
-            </a:r>
-            <a:r>
-              <a:rPr lang="en-US" dirty="0"/>
-              <a:t> </a:t>
-            </a:r>
-          </a:p>
-        </p:txBody>
-      </p:sp>
+      <mc:AlternateContent xmlns:mc="http://schemas.openxmlformats.org/markup-compatibility/2006" xmlns:a14="http://schemas.microsoft.com/office/drawing/2010/main">
+        <mc:Choice Requires="a14">
+          <p:sp>
+            <p:nvSpPr>
+              <p:cNvPr id="3" name="Content Placeholder 2"/>
+              <p:cNvSpPr>
+                <a:spLocks noGrp="1"/>
+              </p:cNvSpPr>
+              <p:nvPr>
+                <p:ph idx="1"/>
+              </p:nvPr>
+            </p:nvSpPr>
+            <p:spPr/>
+            <p:txBody>
+              <a:bodyPr/>
+              <a:lstStyle/>
+              <a:p>
+                <a:r>
+                  <a:rPr lang="en-US" dirty="0" smtClean="0"/>
+                  <a:t>There is no </a:t>
+                </a:r>
+                <a:r>
+                  <a:rPr lang="en-US" dirty="0" smtClean="0">
+                    <a:effectLst/>
+                  </a:rPr>
+                  <a:t>cryptodeterministic measure</a:t>
+                </a:r>
+                <a:r>
+                  <a:rPr lang="en-US" dirty="0"/>
+                  <a:t> </a:t>
+                </a:r>
+                <a14:m>
+                  <m:oMath xmlns:m="http://schemas.openxmlformats.org/officeDocument/2006/math">
+                    <m:sSup>
+                      <m:sSupPr>
+                        <m:ctrlPr>
+                          <a:rPr lang="en-US" b="0" i="1" smtClean="0">
+                            <a:latin typeface="Cambria Math" panose="02040503050406030204" pitchFamily="18" charset="0"/>
+                          </a:rPr>
+                        </m:ctrlPr>
+                      </m:sSupPr>
+                      <m:e>
+                        <m:r>
+                          <a:rPr lang="en-US" b="0" i="1" smtClean="0">
+                            <a:latin typeface="Cambria Math" panose="02040503050406030204" pitchFamily="18" charset="0"/>
+                          </a:rPr>
+                          <m:t>𝜇</m:t>
+                        </m:r>
+                      </m:e>
+                      <m:sup>
+                        <m:r>
+                          <m:rPr>
+                            <m:nor/>
+                          </m:rPr>
+                          <a:rPr lang="en-US" b="0" i="0" smtClean="0">
+                            <a:latin typeface="Cambria Math" panose="02040503050406030204" pitchFamily="18" charset="0"/>
+                          </a:rPr>
+                          <m:t>D</m:t>
+                        </m:r>
+                      </m:sup>
+                    </m:sSup>
+                    <m:r>
+                      <a:rPr lang="en-US" b="0" i="1" smtClean="0">
+                        <a:latin typeface="Cambria Math" panose="02040503050406030204" pitchFamily="18" charset="0"/>
+                      </a:rPr>
+                      <m:t>:</m:t>
+                    </m:r>
+                    <m:r>
+                      <a:rPr lang="en-US" b="0" i="1" smtClean="0">
+                        <a:latin typeface="Cambria Math" panose="02040503050406030204" pitchFamily="18" charset="0"/>
+                        <a:ea typeface="Cambria Math" panose="02040503050406030204" pitchFamily="18" charset="0"/>
+                      </a:rPr>
+                      <m:t>ℰ</m:t>
+                    </m:r>
+                    <m:r>
+                      <a:rPr lang="en-US" b="0" i="1" smtClean="0">
+                        <a:latin typeface="Cambria Math" panose="02040503050406030204" pitchFamily="18" charset="0"/>
+                        <a:ea typeface="Cambria Math" panose="02040503050406030204" pitchFamily="18" charset="0"/>
+                      </a:rPr>
+                      <m:t>→</m:t>
+                    </m:r>
+                    <m:d>
+                      <m:dPr>
+                        <m:begChr m:val="{"/>
+                        <m:endChr m:val="}"/>
+                        <m:ctrlPr>
+                          <a:rPr lang="en-US" b="0" i="1" smtClean="0">
+                            <a:latin typeface="Cambria Math" panose="02040503050406030204" pitchFamily="18" charset="0"/>
+                            <a:ea typeface="Cambria Math" panose="02040503050406030204" pitchFamily="18" charset="0"/>
+                          </a:rPr>
+                        </m:ctrlPr>
+                      </m:dPr>
+                      <m:e>
+                        <m:r>
+                          <a:rPr lang="en-US" b="0" i="1" smtClean="0">
+                            <a:latin typeface="Cambria Math" panose="02040503050406030204" pitchFamily="18" charset="0"/>
+                            <a:ea typeface="Cambria Math" panose="02040503050406030204" pitchFamily="18" charset="0"/>
+                          </a:rPr>
+                          <m:t>0,1</m:t>
+                        </m:r>
+                      </m:e>
+                    </m:d>
+                  </m:oMath>
+                </a14:m>
+                <a:r>
+                  <a:rPr lang="en-US" dirty="0" smtClean="0"/>
+                  <a:t>, where </a:t>
+                </a:r>
+                <a14:m>
+                  <m:oMath xmlns:m="http://schemas.openxmlformats.org/officeDocument/2006/math">
+                    <m:r>
+                      <a:rPr lang="en-US" i="1">
+                        <a:latin typeface="Cambria Math" panose="02040503050406030204" pitchFamily="18" charset="0"/>
+                        <a:ea typeface="Cambria Math" panose="02040503050406030204" pitchFamily="18" charset="0"/>
+                      </a:rPr>
+                      <m:t>ℰ</m:t>
+                    </m:r>
+                  </m:oMath>
+                </a14:m>
+                <a:r>
+                  <a:rPr lang="en-US" dirty="0" smtClean="0"/>
+                  <a:t> is the set of projectors on a Hilbert space, and </a:t>
+                </a:r>
+                <a14:m>
+                  <m:oMath xmlns:m="http://schemas.openxmlformats.org/officeDocument/2006/math">
+                    <m:sSup>
+                      <m:sSupPr>
+                        <m:ctrlPr>
+                          <a:rPr lang="en-US" i="1">
+                            <a:latin typeface="Cambria Math" panose="02040503050406030204" pitchFamily="18" charset="0"/>
+                          </a:rPr>
+                        </m:ctrlPr>
+                      </m:sSupPr>
+                      <m:e>
+                        <m:r>
+                          <a:rPr lang="en-US" i="1">
+                            <a:latin typeface="Cambria Math" panose="02040503050406030204" pitchFamily="18" charset="0"/>
+                          </a:rPr>
+                          <m:t>𝜇</m:t>
+                        </m:r>
+                      </m:e>
+                      <m:sup>
+                        <m:r>
+                          <m:rPr>
+                            <m:nor/>
+                          </m:rPr>
+                          <a:rPr lang="en-US">
+                            <a:latin typeface="Cambria Math" panose="02040503050406030204" pitchFamily="18" charset="0"/>
+                          </a:rPr>
+                          <m:t>D</m:t>
+                        </m:r>
+                      </m:sup>
+                    </m:sSup>
+                  </m:oMath>
+                </a14:m>
+                <a:r>
+                  <a:rPr lang="en-US" dirty="0" smtClean="0"/>
+                  <a:t> satisfies the following axioms:</a:t>
+                </a:r>
+              </a:p>
+              <a:p>
+                <a:pPr lvl="1"/>
+                <a14:m>
+                  <m:oMath xmlns:m="http://schemas.openxmlformats.org/officeDocument/2006/math">
+                    <m:sSup>
+                      <m:sSupPr>
+                        <m:ctrlPr>
+                          <a:rPr lang="en-US" i="1">
+                            <a:latin typeface="Cambria Math" panose="02040503050406030204" pitchFamily="18" charset="0"/>
+                          </a:rPr>
+                        </m:ctrlPr>
+                      </m:sSupPr>
+                      <m:e>
+                        <m:r>
+                          <a:rPr lang="en-US" i="1">
+                            <a:latin typeface="Cambria Math" panose="02040503050406030204" pitchFamily="18" charset="0"/>
+                          </a:rPr>
+                          <m:t>𝜇</m:t>
+                        </m:r>
+                      </m:e>
+                      <m:sup>
+                        <m:r>
+                          <m:rPr>
+                            <m:nor/>
+                          </m:rPr>
+                          <a:rPr lang="en-US">
+                            <a:latin typeface="Cambria Math" panose="02040503050406030204" pitchFamily="18" charset="0"/>
+                          </a:rPr>
+                          <m:t>D</m:t>
+                        </m:r>
+                      </m:sup>
+                    </m:sSup>
+                    <m:d>
+                      <m:dPr>
+                        <m:ctrlPr>
+                          <a:rPr lang="en-US" b="0" i="1" smtClean="0">
+                            <a:latin typeface="Cambria Math" panose="02040503050406030204" pitchFamily="18" charset="0"/>
+                          </a:rPr>
+                        </m:ctrlPr>
+                      </m:dPr>
+                      <m:e>
+                        <m:r>
+                          <a:rPr lang="en-US" i="1">
+                            <a:latin typeface="Cambria Math" panose="02040503050406030204" pitchFamily="18" charset="0"/>
+                          </a:rPr>
+                          <m:t>𝟘</m:t>
+                        </m:r>
+                      </m:e>
+                    </m:d>
+                    <m:r>
+                      <a:rPr lang="en-US" b="0" i="1" smtClean="0">
+                        <a:latin typeface="Cambria Math" panose="02040503050406030204" pitchFamily="18" charset="0"/>
+                      </a:rPr>
+                      <m:t>=0</m:t>
+                    </m:r>
+                  </m:oMath>
+                </a14:m>
+                <a:r>
+                  <a:rPr lang="en-US" dirty="0" smtClean="0"/>
+                  <a:t>, where </a:t>
+                </a:r>
+                <a14:m>
+                  <m:oMath xmlns:m="http://schemas.openxmlformats.org/officeDocument/2006/math">
+                    <m:r>
+                      <a:rPr lang="en-US" i="1">
+                        <a:latin typeface="Cambria Math" panose="02040503050406030204" pitchFamily="18" charset="0"/>
+                      </a:rPr>
+                      <m:t>𝟘</m:t>
+                    </m:r>
+                  </m:oMath>
+                </a14:m>
+                <a:r>
+                  <a:rPr lang="en-US" dirty="0" smtClean="0"/>
+                  <a:t> is the zero matrix.</a:t>
+                </a:r>
+              </a:p>
+              <a:p>
+                <a:pPr lvl="1"/>
+                <a14:m>
+                  <m:oMath xmlns:m="http://schemas.openxmlformats.org/officeDocument/2006/math">
+                    <m:sSup>
+                      <m:sSupPr>
+                        <m:ctrlPr>
+                          <a:rPr lang="en-US" i="1">
+                            <a:latin typeface="Cambria Math" panose="02040503050406030204" pitchFamily="18" charset="0"/>
+                          </a:rPr>
+                        </m:ctrlPr>
+                      </m:sSupPr>
+                      <m:e>
+                        <m:r>
+                          <a:rPr lang="en-US" i="1">
+                            <a:latin typeface="Cambria Math" panose="02040503050406030204" pitchFamily="18" charset="0"/>
+                          </a:rPr>
+                          <m:t>𝜇</m:t>
+                        </m:r>
+                      </m:e>
+                      <m:sup>
+                        <m:r>
+                          <m:rPr>
+                            <m:nor/>
+                          </m:rPr>
+                          <a:rPr lang="en-US">
+                            <a:latin typeface="Cambria Math" panose="02040503050406030204" pitchFamily="18" charset="0"/>
+                          </a:rPr>
+                          <m:t>D</m:t>
+                        </m:r>
+                      </m:sup>
+                    </m:sSup>
+                    <m:d>
+                      <m:dPr>
+                        <m:ctrlPr>
+                          <a:rPr lang="en-US" i="1">
+                            <a:latin typeface="Cambria Math" panose="02040503050406030204" pitchFamily="18" charset="0"/>
+                          </a:rPr>
+                        </m:ctrlPr>
+                      </m:dPr>
+                      <m:e>
+                        <m:r>
+                          <a:rPr lang="en-US" i="1">
+                            <a:latin typeface="Cambria Math" panose="02040503050406030204" pitchFamily="18" charset="0"/>
+                          </a:rPr>
+                          <m:t>𝟙</m:t>
+                        </m:r>
+                      </m:e>
+                    </m:d>
+                    <m:r>
+                      <a:rPr lang="en-US" i="1">
+                        <a:latin typeface="Cambria Math" panose="02040503050406030204" pitchFamily="18" charset="0"/>
+                      </a:rPr>
+                      <m:t>=</m:t>
+                    </m:r>
+                    <m:r>
+                      <a:rPr lang="en-US" b="0" i="1" smtClean="0">
+                        <a:latin typeface="Cambria Math" panose="02040503050406030204" pitchFamily="18" charset="0"/>
+                      </a:rPr>
+                      <m:t>1</m:t>
+                    </m:r>
+                  </m:oMath>
+                </a14:m>
+                <a:r>
+                  <a:rPr lang="en-US" dirty="0"/>
+                  <a:t>, where</a:t>
+                </a:r>
+                <a:r>
+                  <a:rPr lang="en-US" dirty="0" smtClean="0"/>
+                  <a:t> </a:t>
+                </a:r>
+                <a14:m>
+                  <m:oMath xmlns:m="http://schemas.openxmlformats.org/officeDocument/2006/math">
+                    <m:r>
+                      <a:rPr lang="en-US" i="1">
+                        <a:latin typeface="Cambria Math" panose="02040503050406030204" pitchFamily="18" charset="0"/>
+                      </a:rPr>
+                      <m:t>𝟙</m:t>
+                    </m:r>
+                  </m:oMath>
+                </a14:m>
+                <a:r>
+                  <a:rPr lang="en-US" dirty="0" smtClean="0"/>
+                  <a:t> </a:t>
+                </a:r>
+                <a:r>
+                  <a:rPr lang="en-US" dirty="0"/>
+                  <a:t>is the </a:t>
+                </a:r>
+                <a:r>
+                  <a:rPr lang="en-US" dirty="0" smtClean="0"/>
+                  <a:t>identity </a:t>
+                </a:r>
+                <a:r>
+                  <a:rPr lang="en-US" dirty="0"/>
+                  <a:t>matrix</a:t>
+                </a:r>
+                <a:r>
+                  <a:rPr lang="en-US" dirty="0" smtClean="0"/>
+                  <a:t>.</a:t>
+                </a:r>
+              </a:p>
+              <a:p>
+                <a:pPr lvl="1"/>
+                <a14:m>
+                  <m:oMath xmlns:m="http://schemas.openxmlformats.org/officeDocument/2006/math">
+                    <m:sSup>
+                      <m:sSupPr>
+                        <m:ctrlPr>
+                          <a:rPr lang="en-US" i="1">
+                            <a:latin typeface="Cambria Math" panose="02040503050406030204" pitchFamily="18" charset="0"/>
+                          </a:rPr>
+                        </m:ctrlPr>
+                      </m:sSupPr>
+                      <m:e>
+                        <m:r>
+                          <a:rPr lang="en-US" i="1">
+                            <a:latin typeface="Cambria Math" panose="02040503050406030204" pitchFamily="18" charset="0"/>
+                          </a:rPr>
+                          <m:t>𝜇</m:t>
+                        </m:r>
+                      </m:e>
+                      <m:sup>
+                        <m:r>
+                          <m:rPr>
+                            <m:nor/>
+                          </m:rPr>
+                          <a:rPr lang="en-US">
+                            <a:latin typeface="Cambria Math" panose="02040503050406030204" pitchFamily="18" charset="0"/>
+                          </a:rPr>
+                          <m:t>D</m:t>
+                        </m:r>
+                      </m:sup>
+                    </m:sSup>
+                    <m:d>
+                      <m:dPr>
+                        <m:ctrlPr>
+                          <a:rPr lang="en-US" i="1">
+                            <a:latin typeface="Cambria Math" panose="02040503050406030204" pitchFamily="18" charset="0"/>
+                          </a:rPr>
+                        </m:ctrlPr>
+                      </m:dPr>
+                      <m:e>
+                        <m:r>
+                          <a:rPr lang="en-US" i="1">
+                            <a:latin typeface="Cambria Math" panose="02040503050406030204" pitchFamily="18" charset="0"/>
+                          </a:rPr>
+                          <m:t>𝟙</m:t>
+                        </m:r>
+                        <m:r>
+                          <a:rPr lang="en-US" b="0" i="1" smtClean="0">
+                            <a:latin typeface="Cambria Math" panose="02040503050406030204" pitchFamily="18" charset="0"/>
+                          </a:rPr>
+                          <m:t>−</m:t>
+                        </m:r>
+                        <m:r>
+                          <a:rPr lang="en-US" b="0" i="1" smtClean="0">
+                            <a:latin typeface="Cambria Math" panose="02040503050406030204" pitchFamily="18" charset="0"/>
+                          </a:rPr>
+                          <m:t>𝑃</m:t>
+                        </m:r>
+                      </m:e>
+                    </m:d>
+                    <m:r>
+                      <a:rPr lang="en-US" i="1">
+                        <a:latin typeface="Cambria Math" panose="02040503050406030204" pitchFamily="18" charset="0"/>
+                      </a:rPr>
+                      <m:t>=1</m:t>
+                    </m:r>
+                    <m:r>
+                      <a:rPr lang="en-US" b="0" i="1" smtClean="0">
+                        <a:latin typeface="Cambria Math" panose="02040503050406030204" pitchFamily="18" charset="0"/>
+                      </a:rPr>
+                      <m:t>−</m:t>
+                    </m:r>
+                    <m:sSup>
+                      <m:sSupPr>
+                        <m:ctrlPr>
+                          <a:rPr lang="en-US" i="1">
+                            <a:latin typeface="Cambria Math" panose="02040503050406030204" pitchFamily="18" charset="0"/>
+                          </a:rPr>
+                        </m:ctrlPr>
+                      </m:sSupPr>
+                      <m:e>
+                        <m:r>
+                          <a:rPr lang="en-US" i="1">
+                            <a:latin typeface="Cambria Math" panose="02040503050406030204" pitchFamily="18" charset="0"/>
+                          </a:rPr>
+                          <m:t>𝜇</m:t>
+                        </m:r>
+                      </m:e>
+                      <m:sup>
+                        <m:r>
+                          <m:rPr>
+                            <m:nor/>
+                          </m:rPr>
+                          <a:rPr lang="en-US">
+                            <a:latin typeface="Cambria Math" panose="02040503050406030204" pitchFamily="18" charset="0"/>
+                          </a:rPr>
+                          <m:t>D</m:t>
+                        </m:r>
+                      </m:sup>
+                    </m:sSup>
+                    <m:d>
+                      <m:dPr>
+                        <m:ctrlPr>
+                          <a:rPr lang="en-US" i="1">
+                            <a:latin typeface="Cambria Math" panose="02040503050406030204" pitchFamily="18" charset="0"/>
+                          </a:rPr>
+                        </m:ctrlPr>
+                      </m:dPr>
+                      <m:e>
+                        <m:r>
+                          <a:rPr lang="en-US" i="1">
+                            <a:latin typeface="Cambria Math" panose="02040503050406030204" pitchFamily="18" charset="0"/>
+                          </a:rPr>
+                          <m:t>𝑃</m:t>
+                        </m:r>
+                      </m:e>
+                    </m:d>
+                  </m:oMath>
+                </a14:m>
+                <a:r>
+                  <a:rPr lang="en-US" dirty="0" smtClean="0"/>
+                  <a:t> for any projector</a:t>
+                </a:r>
+                <a:r>
+                  <a:rPr lang="en-US" dirty="0"/>
+                  <a:t> </a:t>
+                </a:r>
+                <a14:m>
+                  <m:oMath xmlns:m="http://schemas.openxmlformats.org/officeDocument/2006/math">
+                    <m:r>
+                      <a:rPr lang="en-US" i="1">
+                        <a:latin typeface="Cambria Math" panose="02040503050406030204" pitchFamily="18" charset="0"/>
+                      </a:rPr>
+                      <m:t>𝑃</m:t>
+                    </m:r>
+                  </m:oMath>
+                </a14:m>
+                <a:r>
+                  <a:rPr lang="en-US" dirty="0" smtClean="0"/>
+                  <a:t>.</a:t>
+                </a:r>
+              </a:p>
+              <a:p>
+                <a:pPr lvl="1">
+                  <a:tabLst>
+                    <a:tab pos="5143500" algn="ctr"/>
+                    <a:tab pos="10287000" algn="r"/>
+                  </a:tabLst>
+                </a:pPr>
+                <a:r>
+                  <a:rPr lang="en-US" dirty="0" smtClean="0"/>
+                  <a:t>For </a:t>
+                </a:r>
+                <a:r>
+                  <a:rPr lang="en-US" dirty="0"/>
+                  <a:t>any </a:t>
+                </a:r>
+                <a:r>
+                  <a:rPr lang="en-US" i="1" dirty="0" smtClean="0"/>
+                  <a:t>orthogonal</a:t>
+                </a:r>
+                <a:r>
+                  <a:rPr lang="en-US" dirty="0" smtClean="0"/>
+                  <a:t> projector</a:t>
+                </a:r>
+                <a:r>
+                  <a:rPr lang="en-US" dirty="0"/>
+                  <a:t> </a:t>
+                </a:r>
+                <a14:m>
+                  <m:oMath xmlns:m="http://schemas.openxmlformats.org/officeDocument/2006/math">
+                    <m:sSub>
+                      <m:sSubPr>
+                        <m:ctrlPr>
+                          <a:rPr lang="en-US" b="0" i="1" smtClean="0">
+                            <a:latin typeface="Cambria Math" panose="02040503050406030204" pitchFamily="18" charset="0"/>
+                          </a:rPr>
+                        </m:ctrlPr>
+                      </m:sSubPr>
+                      <m:e>
+                        <m:r>
+                          <a:rPr lang="en-US" i="1">
+                            <a:latin typeface="Cambria Math" panose="02040503050406030204" pitchFamily="18" charset="0"/>
+                          </a:rPr>
+                          <m:t>𝑃</m:t>
+                        </m:r>
+                      </m:e>
+                      <m:sub>
+                        <m:r>
+                          <a:rPr lang="en-US" b="0" i="1" smtClean="0">
+                            <a:latin typeface="Cambria Math" panose="02040503050406030204" pitchFamily="18" charset="0"/>
+                          </a:rPr>
+                          <m:t>0</m:t>
+                        </m:r>
+                      </m:sub>
+                    </m:sSub>
+                  </m:oMath>
+                </a14:m>
+                <a:r>
+                  <a:rPr lang="en-US" dirty="0" smtClean="0"/>
+                  <a:t> and </a:t>
+                </a:r>
+                <a14:m>
+                  <m:oMath xmlns:m="http://schemas.openxmlformats.org/officeDocument/2006/math">
+                    <m:sSub>
+                      <m:sSubPr>
+                        <m:ctrlPr>
+                          <a:rPr lang="en-US" i="1">
+                            <a:latin typeface="Cambria Math" panose="02040503050406030204" pitchFamily="18" charset="0"/>
+                          </a:rPr>
+                        </m:ctrlPr>
+                      </m:sSubPr>
+                      <m:e>
+                        <m:r>
+                          <a:rPr lang="en-US" i="1">
+                            <a:latin typeface="Cambria Math" panose="02040503050406030204" pitchFamily="18" charset="0"/>
+                          </a:rPr>
+                          <m:t>𝑃</m:t>
+                        </m:r>
+                      </m:e>
+                      <m:sub>
+                        <m:r>
+                          <a:rPr lang="en-US" b="0" i="1" smtClean="0">
+                            <a:latin typeface="Cambria Math" panose="02040503050406030204" pitchFamily="18" charset="0"/>
+                          </a:rPr>
+                          <m:t>1</m:t>
+                        </m:r>
+                      </m:sub>
+                    </m:sSub>
+                  </m:oMath>
+                </a14:m>
+                <a:r>
+                  <a:rPr lang="en-US" dirty="0" smtClean="0"/>
+                  <a:t>, we have</a:t>
+                </a:r>
+                <a:br>
+                  <a:rPr lang="en-US" dirty="0" smtClean="0"/>
+                </a:br>
+                <a:r>
+                  <a:rPr lang="en-US" dirty="0" smtClean="0"/>
+                  <a:t>	</a:t>
+                </a:r>
+                <a14:m>
+                  <m:oMath xmlns:m="http://schemas.openxmlformats.org/officeDocument/2006/math">
+                    <m:sSup>
+                      <m:sSupPr>
+                        <m:ctrlPr>
+                          <a:rPr lang="en-US" i="1" smtClean="0">
+                            <a:latin typeface="Cambria Math" panose="02040503050406030204" pitchFamily="18" charset="0"/>
+                          </a:rPr>
+                        </m:ctrlPr>
+                      </m:sSupPr>
+                      <m:e>
+                        <m:r>
+                          <a:rPr lang="en-US" i="1" smtClean="0">
+                            <a:latin typeface="Cambria Math" panose="02040503050406030204" pitchFamily="18" charset="0"/>
+                          </a:rPr>
+                          <m:t>𝜇</m:t>
+                        </m:r>
+                      </m:e>
+                      <m:sup>
+                        <m:r>
+                          <m:rPr>
+                            <m:nor/>
+                          </m:rPr>
+                          <a:rPr lang="en-US">
+                            <a:latin typeface="Cambria Math" panose="02040503050406030204" pitchFamily="18" charset="0"/>
+                          </a:rPr>
+                          <m:t>D</m:t>
+                        </m:r>
+                      </m:sup>
+                    </m:sSup>
+                    <m:d>
+                      <m:dPr>
+                        <m:ctrlPr>
+                          <a:rPr lang="en-US" i="1">
+                            <a:latin typeface="Cambria Math" panose="02040503050406030204" pitchFamily="18" charset="0"/>
+                          </a:rPr>
+                        </m:ctrlPr>
+                      </m:dPr>
+                      <m:e>
+                        <m:sSub>
+                          <m:sSubPr>
+                            <m:ctrlPr>
+                              <a:rPr lang="en-US" i="1">
+                                <a:latin typeface="Cambria Math" panose="02040503050406030204" pitchFamily="18" charset="0"/>
+                              </a:rPr>
+                            </m:ctrlPr>
+                          </m:sSubPr>
+                          <m:e>
+                            <m:r>
+                              <a:rPr lang="en-US" i="1">
+                                <a:latin typeface="Cambria Math" panose="02040503050406030204" pitchFamily="18" charset="0"/>
+                              </a:rPr>
+                              <m:t>𝑃</m:t>
+                            </m:r>
+                          </m:e>
+                          <m:sub>
+                            <m:r>
+                              <a:rPr lang="en-US" i="1">
+                                <a:latin typeface="Cambria Math" panose="02040503050406030204" pitchFamily="18" charset="0"/>
+                              </a:rPr>
+                              <m:t>0</m:t>
+                            </m:r>
+                          </m:sub>
+                        </m:sSub>
+                        <m:r>
+                          <a:rPr lang="en-US" b="0" i="1" smtClean="0">
+                            <a:latin typeface="Cambria Math" panose="02040503050406030204" pitchFamily="18" charset="0"/>
+                          </a:rPr>
+                          <m:t>+</m:t>
+                        </m:r>
+                        <m:sSub>
+                          <m:sSubPr>
+                            <m:ctrlPr>
+                              <a:rPr lang="en-US" i="1">
+                                <a:latin typeface="Cambria Math" panose="02040503050406030204" pitchFamily="18" charset="0"/>
+                              </a:rPr>
+                            </m:ctrlPr>
+                          </m:sSubPr>
+                          <m:e>
+                            <m:r>
+                              <a:rPr lang="en-US" i="1">
+                                <a:latin typeface="Cambria Math" panose="02040503050406030204" pitchFamily="18" charset="0"/>
+                              </a:rPr>
+                              <m:t>𝑃</m:t>
+                            </m:r>
+                          </m:e>
+                          <m:sub>
+                            <m:r>
+                              <a:rPr lang="en-US" b="0" i="1" smtClean="0">
+                                <a:latin typeface="Cambria Math" panose="02040503050406030204" pitchFamily="18" charset="0"/>
+                              </a:rPr>
+                              <m:t>1</m:t>
+                            </m:r>
+                          </m:sub>
+                        </m:sSub>
+                      </m:e>
+                    </m:d>
+                    <m:r>
+                      <a:rPr lang="en-US" i="1">
+                        <a:latin typeface="Cambria Math" panose="02040503050406030204" pitchFamily="18" charset="0"/>
+                      </a:rPr>
+                      <m:t>=</m:t>
+                    </m:r>
+                    <m:sSup>
+                      <m:sSupPr>
+                        <m:ctrlPr>
+                          <a:rPr lang="en-US" i="1">
+                            <a:latin typeface="Cambria Math" panose="02040503050406030204" pitchFamily="18" charset="0"/>
+                          </a:rPr>
+                        </m:ctrlPr>
+                      </m:sSupPr>
+                      <m:e>
+                        <m:r>
+                          <a:rPr lang="en-US" i="1">
+                            <a:latin typeface="Cambria Math" panose="02040503050406030204" pitchFamily="18" charset="0"/>
+                          </a:rPr>
+                          <m:t>𝜇</m:t>
+                        </m:r>
+                      </m:e>
+                      <m:sup>
+                        <m:r>
+                          <m:rPr>
+                            <m:nor/>
+                          </m:rPr>
+                          <a:rPr lang="en-US">
+                            <a:latin typeface="Cambria Math" panose="02040503050406030204" pitchFamily="18" charset="0"/>
+                          </a:rPr>
+                          <m:t>D</m:t>
+                        </m:r>
+                      </m:sup>
+                    </m:sSup>
+                    <m:d>
+                      <m:dPr>
+                        <m:ctrlPr>
+                          <a:rPr lang="en-US" i="1">
+                            <a:latin typeface="Cambria Math" panose="02040503050406030204" pitchFamily="18" charset="0"/>
+                          </a:rPr>
+                        </m:ctrlPr>
+                      </m:dPr>
+                      <m:e>
+                        <m:sSub>
+                          <m:sSubPr>
+                            <m:ctrlPr>
+                              <a:rPr lang="en-US" b="0" i="1" smtClean="0">
+                                <a:latin typeface="Cambria Math" panose="02040503050406030204" pitchFamily="18" charset="0"/>
+                              </a:rPr>
+                            </m:ctrlPr>
+                          </m:sSubPr>
+                          <m:e>
+                            <m:r>
+                              <a:rPr lang="en-US" i="1">
+                                <a:latin typeface="Cambria Math" panose="02040503050406030204" pitchFamily="18" charset="0"/>
+                              </a:rPr>
+                              <m:t>𝑃</m:t>
+                            </m:r>
+                          </m:e>
+                          <m:sub>
+                            <m:r>
+                              <a:rPr lang="en-US" b="0" i="1" smtClean="0">
+                                <a:latin typeface="Cambria Math" panose="02040503050406030204" pitchFamily="18" charset="0"/>
+                              </a:rPr>
+                              <m:t>0</m:t>
+                            </m:r>
+                          </m:sub>
+                        </m:sSub>
+                      </m:e>
+                    </m:d>
+                    <m:r>
+                      <a:rPr lang="en-US" b="0" i="1" smtClean="0">
+                        <a:latin typeface="Cambria Math" panose="02040503050406030204" pitchFamily="18" charset="0"/>
+                      </a:rPr>
+                      <m:t>+</m:t>
+                    </m:r>
+                    <m:sSup>
+                      <m:sSupPr>
+                        <m:ctrlPr>
+                          <a:rPr lang="en-US" i="1">
+                            <a:latin typeface="Cambria Math" panose="02040503050406030204" pitchFamily="18" charset="0"/>
+                          </a:rPr>
+                        </m:ctrlPr>
+                      </m:sSupPr>
+                      <m:e>
+                        <m:r>
+                          <a:rPr lang="en-US" i="1">
+                            <a:latin typeface="Cambria Math" panose="02040503050406030204" pitchFamily="18" charset="0"/>
+                          </a:rPr>
+                          <m:t>𝜇</m:t>
+                        </m:r>
+                      </m:e>
+                      <m:sup>
+                        <m:r>
+                          <m:rPr>
+                            <m:nor/>
+                          </m:rPr>
+                          <a:rPr lang="en-US">
+                            <a:latin typeface="Cambria Math" panose="02040503050406030204" pitchFamily="18" charset="0"/>
+                          </a:rPr>
+                          <m:t>D</m:t>
+                        </m:r>
+                      </m:sup>
+                    </m:sSup>
+                    <m:d>
+                      <m:dPr>
+                        <m:ctrlPr>
+                          <a:rPr lang="en-US" i="1">
+                            <a:latin typeface="Cambria Math" panose="02040503050406030204" pitchFamily="18" charset="0"/>
+                          </a:rPr>
+                        </m:ctrlPr>
+                      </m:dPr>
+                      <m:e>
+                        <m:sSub>
+                          <m:sSubPr>
+                            <m:ctrlPr>
+                              <a:rPr lang="en-US" b="0" i="1" smtClean="0">
+                                <a:latin typeface="Cambria Math" panose="02040503050406030204" pitchFamily="18" charset="0"/>
+                              </a:rPr>
+                            </m:ctrlPr>
+                          </m:sSubPr>
+                          <m:e>
+                            <m:r>
+                              <a:rPr lang="en-US" i="1">
+                                <a:latin typeface="Cambria Math" panose="02040503050406030204" pitchFamily="18" charset="0"/>
+                              </a:rPr>
+                              <m:t>𝑃</m:t>
+                            </m:r>
+                          </m:e>
+                          <m:sub>
+                            <m:r>
+                              <a:rPr lang="en-US" b="0" i="1" smtClean="0">
+                                <a:latin typeface="Cambria Math" panose="02040503050406030204" pitchFamily="18" charset="0"/>
+                              </a:rPr>
+                              <m:t>1</m:t>
+                            </m:r>
+                          </m:sub>
+                        </m:sSub>
+                      </m:e>
+                    </m:d>
+                    <m:r>
+                      <m:rPr>
+                        <m:nor/>
+                      </m:rPr>
+                      <a:rPr lang="en-US" dirty="0"/>
+                      <m:t>	</m:t>
+                    </m:r>
+                  </m:oMath>
+                </a14:m>
+                <a:r>
+                  <a:rPr lang="en-US" dirty="0"/>
+                  <a:t> </a:t>
+                </a:r>
+                <a:r>
+                  <a:rPr lang="en-US" dirty="0" smtClean="0"/>
+                  <a:t>.	(1)</a:t>
+                </a:r>
+                <a:endParaRPr lang="en-US" dirty="0"/>
+              </a:p>
+              <a:p>
+                <a:pPr lvl="1"/>
+                <a:endParaRPr lang="en-US" dirty="0"/>
+              </a:p>
+              <a:p>
+                <a:pPr lvl="1"/>
+                <a:endParaRPr lang="en-US" dirty="0"/>
+              </a:p>
+            </p:txBody>
+          </p:sp>
+        </mc:Choice>
+        <mc:Fallback xmlns="">
+          <p:sp>
+            <p:nvSpPr>
+              <p:cNvPr id="3" name="Content Placeholder 2"/>
+              <p:cNvSpPr>
+                <a:spLocks noGrp="1" noRot="1" noChangeAspect="1" noMove="1" noResize="1" noEditPoints="1" noAdjustHandles="1" noChangeArrowheads="1" noChangeShapeType="1" noTextEdit="1"/>
+              </p:cNvSpPr>
+              <p:nvPr>
+                <p:ph idx="1"/>
+              </p:nvPr>
+            </p:nvSpPr>
+            <p:spPr>
+              <a:blipFill rotWithShape="0">
+                <a:blip r:embed="rId3"/>
+                <a:stretch>
+                  <a:fillRect l="-1043" t="-700" r="-1449"/>
+                </a:stretch>
+              </a:blipFill>
+            </p:spPr>
+            <p:txBody>
+              <a:bodyPr/>
+              <a:lstStyle/>
+              <a:p>
+                <a:r>
+                  <a:rPr lang="en-US">
+                    <a:noFill/>
+                  </a:rPr>
+                  <a:t> </a:t>
+                </a:r>
+              </a:p>
+            </p:txBody>
+          </p:sp>
+        </mc:Fallback>
+      </mc:AlternateContent>
     </p:spTree>
     <p:extLst>
       <p:ext uri="{BB962C8B-B14F-4D97-AF65-F5344CB8AC3E}">
         <p14:creationId xmlns:p14="http://schemas.microsoft.com/office/powerpoint/2010/main" val="1365564733"/>
+      </p:ext>
+    </p:extLst>
+  </p:cSld>
+  <p:clrMapOvr>
+    <a:masterClrMapping/>
+  </p:clrMapOvr>
+  <p:timing>
+    <p:tnLst>
+      <p:par>
+        <p:cTn id="1" dur="indefinite" restart="never" nodeType="tmRoot"/>
+      </p:par>
+    </p:tnLst>
+  </p:timing>
+</p:sld>
+</file>
+
+<file path=ppt/slides/slide3.xml><?xml version="1.0" encoding="utf-8"?>
+<p:sld xmlns:a="http://schemas.openxmlformats.org/drawingml/2006/main" xmlns:r="http://schemas.openxmlformats.org/officeDocument/2006/relationships" xmlns:p="http://schemas.openxmlformats.org/presentationml/2006/main">
+  <p:cSld>
+    <p:spTree>
+      <p:nvGrpSpPr>
+        <p:cNvPr id="1" name=""/>
+        <p:cNvGrpSpPr/>
+        <p:nvPr/>
+      </p:nvGrpSpPr>
+      <p:grpSpPr>
+        <a:xfrm>
+          <a:off x="0" y="0"/>
+          <a:ext cx="0" cy="0"/>
+          <a:chOff x="0" y="0"/>
+          <a:chExt cx="0" cy="0"/>
+        </a:xfrm>
+      </p:grpSpPr>
+      <p:sp>
+        <p:nvSpPr>
+          <p:cNvPr id="2" name="Title 1"/>
+          <p:cNvSpPr>
+            <a:spLocks noGrp="1"/>
+          </p:cNvSpPr>
+          <p:nvPr>
+            <p:ph type="title"/>
+          </p:nvPr>
+        </p:nvSpPr>
+        <p:spPr/>
+        <p:txBody>
+          <a:bodyPr/>
+          <a:lstStyle/>
+          <a:p>
+            <a:r>
+              <a:rPr lang="en-US" dirty="0" smtClean="0"/>
+              <a:t>Finite Precision Measurement</a:t>
+            </a:r>
+            <a:endParaRPr lang="en-US" dirty="0"/>
+          </a:p>
+        </p:txBody>
+      </p:sp>
+      <mc:AlternateContent xmlns:mc="http://schemas.openxmlformats.org/markup-compatibility/2006">
+        <mc:Choice xmlns:a14="http://schemas.microsoft.com/office/drawing/2010/main" Requires="a14">
+          <p:sp>
+            <p:nvSpPr>
+              <p:cNvPr id="3" name="Content Placeholder 2"/>
+              <p:cNvSpPr>
+                <a:spLocks noGrp="1"/>
+              </p:cNvSpPr>
+              <p:nvPr>
+                <p:ph idx="1"/>
+              </p:nvPr>
+            </p:nvSpPr>
+            <p:spPr/>
+            <p:txBody>
+              <a:bodyPr/>
+              <a:lstStyle/>
+              <a:p>
+                <a:r>
+                  <a:rPr lang="en-US" dirty="0" smtClean="0"/>
+                  <a:t>Relax </a:t>
+                </a:r>
+                <a14:m>
+                  <m:oMath xmlns:m="http://schemas.openxmlformats.org/officeDocument/2006/math">
+                    <m:d>
+                      <m:dPr>
+                        <m:begChr m:val="{"/>
+                        <m:endChr m:val="}"/>
+                        <m:ctrlPr>
+                          <a:rPr lang="en-US" i="1">
+                            <a:latin typeface="Cambria Math" panose="02040503050406030204" pitchFamily="18" charset="0"/>
+                            <a:ea typeface="Cambria Math" panose="02040503050406030204" pitchFamily="18" charset="0"/>
+                          </a:rPr>
+                        </m:ctrlPr>
+                      </m:dPr>
+                      <m:e>
+                        <m:r>
+                          <a:rPr lang="en-US" i="1">
+                            <a:latin typeface="Cambria Math" panose="02040503050406030204" pitchFamily="18" charset="0"/>
+                            <a:ea typeface="Cambria Math" panose="02040503050406030204" pitchFamily="18" charset="0"/>
+                          </a:rPr>
+                          <m:t>0,1</m:t>
+                        </m:r>
+                      </m:e>
+                    </m:d>
+                  </m:oMath>
+                </a14:m>
+                <a:r>
+                  <a:rPr lang="en-US" dirty="0" smtClean="0"/>
+                  <a:t> to </a:t>
+                </a:r>
+                <a:r>
+                  <a:rPr lang="en-US" dirty="0"/>
+                  <a:t>intervals </a:t>
+                </a:r>
+                <a14:m>
+                  <m:oMath xmlns:m="http://schemas.openxmlformats.org/officeDocument/2006/math">
+                    <m:r>
+                      <m:rPr>
+                        <m:nor/>
+                      </m:rPr>
+                      <a:rPr lang="en-US" dirty="0">
+                        <a:latin typeface="XITS Math" panose="02000503000000000000" pitchFamily="50" charset="0"/>
+                        <a:ea typeface="XITS Math" panose="02000503000000000000" pitchFamily="50" charset="0"/>
+                        <a:cs typeface="XITS Math" panose="02000503000000000000" pitchFamily="50" charset="0"/>
+                      </a:rPr>
+                      <m:t>ℐ</m:t>
+                    </m:r>
+                  </m:oMath>
+                </a14:m>
+                <a:r>
+                  <a:rPr lang="en-US" dirty="0" smtClean="0"/>
+                  <a:t> </a:t>
+                </a:r>
+                <a:r>
+                  <a:rPr lang="en-US" dirty="0"/>
+                  <a:t>closed to </a:t>
+                </a:r>
+                <a14:m>
+                  <m:oMath xmlns:m="http://schemas.openxmlformats.org/officeDocument/2006/math">
+                    <m:d>
+                      <m:dPr>
+                        <m:begChr m:val="{"/>
+                        <m:endChr m:val="}"/>
+                        <m:ctrlPr>
+                          <a:rPr lang="en-US" i="1">
+                            <a:latin typeface="Cambria Math" panose="02040503050406030204" pitchFamily="18" charset="0"/>
+                            <a:ea typeface="Cambria Math" panose="02040503050406030204" pitchFamily="18" charset="0"/>
+                          </a:rPr>
+                        </m:ctrlPr>
+                      </m:dPr>
+                      <m:e>
+                        <m:r>
+                          <a:rPr lang="en-US" i="1">
+                            <a:latin typeface="Cambria Math" panose="02040503050406030204" pitchFamily="18" charset="0"/>
+                            <a:ea typeface="Cambria Math" panose="02040503050406030204" pitchFamily="18" charset="0"/>
+                          </a:rPr>
+                          <m:t>0,1</m:t>
+                        </m:r>
+                      </m:e>
+                    </m:d>
+                  </m:oMath>
+                </a14:m>
+                <a:r>
+                  <a:rPr lang="en-US" dirty="0" smtClean="0"/>
+                  <a:t>.</a:t>
+                </a:r>
+              </a:p>
+              <a:p>
+                <a:r>
+                  <a:rPr lang="en-US" dirty="0" smtClean="0"/>
+                  <a:t>There is no </a:t>
+                </a:r>
+                <a:r>
+                  <a:rPr lang="en-US" dirty="0" smtClean="0">
+                    <a:effectLst/>
+                  </a:rPr>
+                  <a:t>cryptodeterministic measure</a:t>
+                </a:r>
+                <a:r>
+                  <a:rPr lang="en-US" dirty="0"/>
+                  <a:t> </a:t>
+                </a:r>
+                <a14:m>
+                  <m:oMath xmlns:m="http://schemas.openxmlformats.org/officeDocument/2006/math">
+                    <m:acc>
+                      <m:accPr>
+                        <m:chr m:val="̅"/>
+                        <m:ctrlPr>
+                          <a:rPr lang="en-US" i="1" smtClean="0">
+                            <a:latin typeface="Cambria Math" panose="02040503050406030204" pitchFamily="18" charset="0"/>
+                          </a:rPr>
+                        </m:ctrlPr>
+                      </m:accPr>
+                      <m:e>
+                        <m:r>
+                          <a:rPr lang="en-US" i="1">
+                            <a:latin typeface="Cambria Math" panose="02040503050406030204" pitchFamily="18" charset="0"/>
+                          </a:rPr>
+                          <m:t>𝜇</m:t>
+                        </m:r>
+                      </m:e>
+                    </m:acc>
+                    <m:r>
+                      <a:rPr lang="en-US" i="1">
+                        <a:latin typeface="Cambria Math" panose="02040503050406030204" pitchFamily="18" charset="0"/>
+                      </a:rPr>
+                      <m:t>:</m:t>
+                    </m:r>
+                    <m:r>
+                      <a:rPr lang="en-US" b="0" i="1" smtClean="0">
+                        <a:latin typeface="Cambria Math" panose="02040503050406030204" pitchFamily="18" charset="0"/>
+                        <a:ea typeface="Cambria Math" panose="02040503050406030204" pitchFamily="18" charset="0"/>
+                      </a:rPr>
+                      <m:t>ℰ</m:t>
+                    </m:r>
+                    <m:r>
+                      <a:rPr lang="en-US" b="0" i="1" smtClean="0">
+                        <a:latin typeface="Cambria Math" panose="02040503050406030204" pitchFamily="18" charset="0"/>
+                        <a:ea typeface="Cambria Math" panose="02040503050406030204" pitchFamily="18" charset="0"/>
+                      </a:rPr>
+                      <m:t>→</m:t>
+                    </m:r>
+                    <m:d>
+                      <m:dPr>
+                        <m:begChr m:val="{"/>
+                        <m:endChr m:val="}"/>
+                        <m:ctrlPr>
+                          <a:rPr lang="en-US" b="0" i="1" smtClean="0">
+                            <a:latin typeface="Cambria Math" panose="02040503050406030204" pitchFamily="18" charset="0"/>
+                            <a:ea typeface="Cambria Math" panose="02040503050406030204" pitchFamily="18" charset="0"/>
+                          </a:rPr>
+                        </m:ctrlPr>
+                      </m:dPr>
+                      <m:e>
+                        <m:r>
+                          <a:rPr lang="en-US" b="0" i="1" smtClean="0">
+                            <a:latin typeface="Cambria Math" panose="02040503050406030204" pitchFamily="18" charset="0"/>
+                            <a:ea typeface="Cambria Math" panose="02040503050406030204" pitchFamily="18" charset="0"/>
+                          </a:rPr>
+                          <m:t>0,1</m:t>
+                        </m:r>
+                      </m:e>
+                    </m:d>
+                  </m:oMath>
+                </a14:m>
+                <a:r>
+                  <a:rPr lang="en-US" dirty="0" smtClean="0"/>
+                  <a:t>, where </a:t>
+                </a:r>
+                <a14:m>
+                  <m:oMath xmlns:m="http://schemas.openxmlformats.org/officeDocument/2006/math">
+                    <m:r>
+                      <a:rPr lang="en-US" i="1">
+                        <a:latin typeface="Cambria Math" panose="02040503050406030204" pitchFamily="18" charset="0"/>
+                        <a:ea typeface="Cambria Math" panose="02040503050406030204" pitchFamily="18" charset="0"/>
+                      </a:rPr>
+                      <m:t>ℰ</m:t>
+                    </m:r>
+                  </m:oMath>
+                </a14:m>
+                <a:r>
+                  <a:rPr lang="en-US" dirty="0" smtClean="0"/>
+                  <a:t> is the set of projectors on a Hilbert space, and </a:t>
+                </a:r>
+                <a14:m>
+                  <m:oMath xmlns:m="http://schemas.openxmlformats.org/officeDocument/2006/math">
+                    <m:sSup>
+                      <m:sSupPr>
+                        <m:ctrlPr>
+                          <a:rPr lang="en-US" i="1">
+                            <a:latin typeface="Cambria Math" panose="02040503050406030204" pitchFamily="18" charset="0"/>
+                          </a:rPr>
+                        </m:ctrlPr>
+                      </m:sSupPr>
+                      <m:e>
+                        <m:r>
+                          <a:rPr lang="en-US" i="1">
+                            <a:latin typeface="Cambria Math" panose="02040503050406030204" pitchFamily="18" charset="0"/>
+                          </a:rPr>
+                          <m:t>𝜇</m:t>
+                        </m:r>
+                      </m:e>
+                      <m:sup>
+                        <m:r>
+                          <m:rPr>
+                            <m:nor/>
+                          </m:rPr>
+                          <a:rPr lang="en-US">
+                            <a:latin typeface="Cambria Math" panose="02040503050406030204" pitchFamily="18" charset="0"/>
+                          </a:rPr>
+                          <m:t>D</m:t>
+                        </m:r>
+                      </m:sup>
+                    </m:sSup>
+                  </m:oMath>
+                </a14:m>
+                <a:r>
+                  <a:rPr lang="en-US" dirty="0" smtClean="0"/>
+                  <a:t> satisfies the following axioms:</a:t>
+                </a:r>
+              </a:p>
+              <a:p>
+                <a:pPr lvl="1"/>
+                <a14:m>
+                  <m:oMath xmlns:m="http://schemas.openxmlformats.org/officeDocument/2006/math">
+                    <m:sSup>
+                      <m:sSupPr>
+                        <m:ctrlPr>
+                          <a:rPr lang="en-US" i="1">
+                            <a:latin typeface="Cambria Math" panose="02040503050406030204" pitchFamily="18" charset="0"/>
+                          </a:rPr>
+                        </m:ctrlPr>
+                      </m:sSupPr>
+                      <m:e>
+                        <m:r>
+                          <a:rPr lang="en-US" i="1">
+                            <a:latin typeface="Cambria Math" panose="02040503050406030204" pitchFamily="18" charset="0"/>
+                          </a:rPr>
+                          <m:t>𝜇</m:t>
+                        </m:r>
+                      </m:e>
+                      <m:sup>
+                        <m:r>
+                          <m:rPr>
+                            <m:nor/>
+                          </m:rPr>
+                          <a:rPr lang="en-US">
+                            <a:latin typeface="Cambria Math" panose="02040503050406030204" pitchFamily="18" charset="0"/>
+                          </a:rPr>
+                          <m:t>D</m:t>
+                        </m:r>
+                      </m:sup>
+                    </m:sSup>
+                    <m:d>
+                      <m:dPr>
+                        <m:ctrlPr>
+                          <a:rPr lang="en-US" b="0" i="1" smtClean="0">
+                            <a:latin typeface="Cambria Math" panose="02040503050406030204" pitchFamily="18" charset="0"/>
+                          </a:rPr>
+                        </m:ctrlPr>
+                      </m:dPr>
+                      <m:e>
+                        <m:r>
+                          <a:rPr lang="en-US" i="1">
+                            <a:latin typeface="Cambria Math" panose="02040503050406030204" pitchFamily="18" charset="0"/>
+                          </a:rPr>
+                          <m:t>𝟘</m:t>
+                        </m:r>
+                      </m:e>
+                    </m:d>
+                    <m:r>
+                      <a:rPr lang="en-US" b="0" i="1" smtClean="0">
+                        <a:latin typeface="Cambria Math" panose="02040503050406030204" pitchFamily="18" charset="0"/>
+                      </a:rPr>
+                      <m:t>=0</m:t>
+                    </m:r>
+                  </m:oMath>
+                </a14:m>
+                <a:r>
+                  <a:rPr lang="en-US" dirty="0" smtClean="0"/>
+                  <a:t>, where </a:t>
+                </a:r>
+                <a14:m>
+                  <m:oMath xmlns:m="http://schemas.openxmlformats.org/officeDocument/2006/math">
+                    <m:r>
+                      <a:rPr lang="en-US" i="1">
+                        <a:latin typeface="Cambria Math" panose="02040503050406030204" pitchFamily="18" charset="0"/>
+                      </a:rPr>
+                      <m:t>𝟘</m:t>
+                    </m:r>
+                  </m:oMath>
+                </a14:m>
+                <a:r>
+                  <a:rPr lang="en-US" dirty="0" smtClean="0"/>
+                  <a:t> is the zero matrix.</a:t>
+                </a:r>
+              </a:p>
+              <a:p>
+                <a:pPr lvl="1"/>
+                <a14:m>
+                  <m:oMath xmlns:m="http://schemas.openxmlformats.org/officeDocument/2006/math">
+                    <m:sSup>
+                      <m:sSupPr>
+                        <m:ctrlPr>
+                          <a:rPr lang="en-US" i="1">
+                            <a:latin typeface="Cambria Math" panose="02040503050406030204" pitchFamily="18" charset="0"/>
+                          </a:rPr>
+                        </m:ctrlPr>
+                      </m:sSupPr>
+                      <m:e>
+                        <m:r>
+                          <a:rPr lang="en-US" i="1">
+                            <a:latin typeface="Cambria Math" panose="02040503050406030204" pitchFamily="18" charset="0"/>
+                          </a:rPr>
+                          <m:t>𝜇</m:t>
+                        </m:r>
+                      </m:e>
+                      <m:sup>
+                        <m:r>
+                          <m:rPr>
+                            <m:nor/>
+                          </m:rPr>
+                          <a:rPr lang="en-US">
+                            <a:latin typeface="Cambria Math" panose="02040503050406030204" pitchFamily="18" charset="0"/>
+                          </a:rPr>
+                          <m:t>D</m:t>
+                        </m:r>
+                      </m:sup>
+                    </m:sSup>
+                    <m:d>
+                      <m:dPr>
+                        <m:ctrlPr>
+                          <a:rPr lang="en-US" i="1">
+                            <a:latin typeface="Cambria Math" panose="02040503050406030204" pitchFamily="18" charset="0"/>
+                          </a:rPr>
+                        </m:ctrlPr>
+                      </m:dPr>
+                      <m:e>
+                        <m:r>
+                          <a:rPr lang="en-US" i="1">
+                            <a:latin typeface="Cambria Math" panose="02040503050406030204" pitchFamily="18" charset="0"/>
+                          </a:rPr>
+                          <m:t>𝟙</m:t>
+                        </m:r>
+                      </m:e>
+                    </m:d>
+                    <m:r>
+                      <a:rPr lang="en-US" i="1">
+                        <a:latin typeface="Cambria Math" panose="02040503050406030204" pitchFamily="18" charset="0"/>
+                      </a:rPr>
+                      <m:t>=</m:t>
+                    </m:r>
+                    <m:r>
+                      <a:rPr lang="en-US" b="0" i="1" smtClean="0">
+                        <a:latin typeface="Cambria Math" panose="02040503050406030204" pitchFamily="18" charset="0"/>
+                      </a:rPr>
+                      <m:t>1</m:t>
+                    </m:r>
+                  </m:oMath>
+                </a14:m>
+                <a:r>
+                  <a:rPr lang="en-US" dirty="0"/>
+                  <a:t>, where</a:t>
+                </a:r>
+                <a:r>
+                  <a:rPr lang="en-US" dirty="0" smtClean="0"/>
+                  <a:t> </a:t>
+                </a:r>
+                <a14:m>
+                  <m:oMath xmlns:m="http://schemas.openxmlformats.org/officeDocument/2006/math">
+                    <m:r>
+                      <a:rPr lang="en-US" i="1">
+                        <a:latin typeface="Cambria Math" panose="02040503050406030204" pitchFamily="18" charset="0"/>
+                      </a:rPr>
+                      <m:t>𝟙</m:t>
+                    </m:r>
+                  </m:oMath>
+                </a14:m>
+                <a:r>
+                  <a:rPr lang="en-US" dirty="0" smtClean="0"/>
+                  <a:t> </a:t>
+                </a:r>
+                <a:r>
+                  <a:rPr lang="en-US" dirty="0"/>
+                  <a:t>is the </a:t>
+                </a:r>
+                <a:r>
+                  <a:rPr lang="en-US" dirty="0" smtClean="0"/>
+                  <a:t>identity </a:t>
+                </a:r>
+                <a:r>
+                  <a:rPr lang="en-US" dirty="0"/>
+                  <a:t>matrix</a:t>
+                </a:r>
+                <a:r>
+                  <a:rPr lang="en-US" dirty="0" smtClean="0"/>
+                  <a:t>.</a:t>
+                </a:r>
+              </a:p>
+              <a:p>
+                <a:pPr lvl="1"/>
+                <a14:m>
+                  <m:oMath xmlns:m="http://schemas.openxmlformats.org/officeDocument/2006/math">
+                    <m:sSup>
+                      <m:sSupPr>
+                        <m:ctrlPr>
+                          <a:rPr lang="en-US" i="1">
+                            <a:latin typeface="Cambria Math" panose="02040503050406030204" pitchFamily="18" charset="0"/>
+                          </a:rPr>
+                        </m:ctrlPr>
+                      </m:sSupPr>
+                      <m:e>
+                        <m:r>
+                          <a:rPr lang="en-US" i="1">
+                            <a:latin typeface="Cambria Math" panose="02040503050406030204" pitchFamily="18" charset="0"/>
+                          </a:rPr>
+                          <m:t>𝜇</m:t>
+                        </m:r>
+                      </m:e>
+                      <m:sup>
+                        <m:r>
+                          <m:rPr>
+                            <m:nor/>
+                          </m:rPr>
+                          <a:rPr lang="en-US">
+                            <a:latin typeface="Cambria Math" panose="02040503050406030204" pitchFamily="18" charset="0"/>
+                          </a:rPr>
+                          <m:t>D</m:t>
+                        </m:r>
+                      </m:sup>
+                    </m:sSup>
+                    <m:d>
+                      <m:dPr>
+                        <m:ctrlPr>
+                          <a:rPr lang="en-US" i="1">
+                            <a:latin typeface="Cambria Math" panose="02040503050406030204" pitchFamily="18" charset="0"/>
+                          </a:rPr>
+                        </m:ctrlPr>
+                      </m:dPr>
+                      <m:e>
+                        <m:r>
+                          <a:rPr lang="en-US" i="1">
+                            <a:latin typeface="Cambria Math" panose="02040503050406030204" pitchFamily="18" charset="0"/>
+                          </a:rPr>
+                          <m:t>𝟙</m:t>
+                        </m:r>
+                        <m:r>
+                          <a:rPr lang="en-US" b="0" i="1" smtClean="0">
+                            <a:latin typeface="Cambria Math" panose="02040503050406030204" pitchFamily="18" charset="0"/>
+                          </a:rPr>
+                          <m:t>−</m:t>
+                        </m:r>
+                        <m:r>
+                          <a:rPr lang="en-US" b="0" i="1" smtClean="0">
+                            <a:latin typeface="Cambria Math" panose="02040503050406030204" pitchFamily="18" charset="0"/>
+                          </a:rPr>
+                          <m:t>𝑃</m:t>
+                        </m:r>
+                      </m:e>
+                    </m:d>
+                    <m:r>
+                      <a:rPr lang="en-US" i="1">
+                        <a:latin typeface="Cambria Math" panose="02040503050406030204" pitchFamily="18" charset="0"/>
+                      </a:rPr>
+                      <m:t>=1</m:t>
+                    </m:r>
+                    <m:r>
+                      <a:rPr lang="en-US" b="0" i="1" smtClean="0">
+                        <a:latin typeface="Cambria Math" panose="02040503050406030204" pitchFamily="18" charset="0"/>
+                      </a:rPr>
+                      <m:t>−</m:t>
+                    </m:r>
+                    <m:sSup>
+                      <m:sSupPr>
+                        <m:ctrlPr>
+                          <a:rPr lang="en-US" i="1">
+                            <a:latin typeface="Cambria Math" panose="02040503050406030204" pitchFamily="18" charset="0"/>
+                          </a:rPr>
+                        </m:ctrlPr>
+                      </m:sSupPr>
+                      <m:e>
+                        <m:r>
+                          <a:rPr lang="en-US" i="1">
+                            <a:latin typeface="Cambria Math" panose="02040503050406030204" pitchFamily="18" charset="0"/>
+                          </a:rPr>
+                          <m:t>𝜇</m:t>
+                        </m:r>
+                      </m:e>
+                      <m:sup>
+                        <m:r>
+                          <m:rPr>
+                            <m:nor/>
+                          </m:rPr>
+                          <a:rPr lang="en-US">
+                            <a:latin typeface="Cambria Math" panose="02040503050406030204" pitchFamily="18" charset="0"/>
+                          </a:rPr>
+                          <m:t>D</m:t>
+                        </m:r>
+                      </m:sup>
+                    </m:sSup>
+                    <m:d>
+                      <m:dPr>
+                        <m:ctrlPr>
+                          <a:rPr lang="en-US" i="1">
+                            <a:latin typeface="Cambria Math" panose="02040503050406030204" pitchFamily="18" charset="0"/>
+                          </a:rPr>
+                        </m:ctrlPr>
+                      </m:dPr>
+                      <m:e>
+                        <m:r>
+                          <a:rPr lang="en-US" i="1">
+                            <a:latin typeface="Cambria Math" panose="02040503050406030204" pitchFamily="18" charset="0"/>
+                          </a:rPr>
+                          <m:t>𝑃</m:t>
+                        </m:r>
+                      </m:e>
+                    </m:d>
+                  </m:oMath>
+                </a14:m>
+                <a:r>
+                  <a:rPr lang="en-US" dirty="0" smtClean="0"/>
+                  <a:t> for any projector</a:t>
+                </a:r>
+                <a:r>
+                  <a:rPr lang="en-US" dirty="0"/>
+                  <a:t> </a:t>
+                </a:r>
+                <a14:m>
+                  <m:oMath xmlns:m="http://schemas.openxmlformats.org/officeDocument/2006/math">
+                    <m:r>
+                      <a:rPr lang="en-US" i="1">
+                        <a:latin typeface="Cambria Math" panose="02040503050406030204" pitchFamily="18" charset="0"/>
+                      </a:rPr>
+                      <m:t>𝑃</m:t>
+                    </m:r>
+                  </m:oMath>
+                </a14:m>
+                <a:r>
+                  <a:rPr lang="en-US" dirty="0" smtClean="0"/>
+                  <a:t>.</a:t>
+                </a:r>
+              </a:p>
+              <a:p>
+                <a:pPr lvl="1">
+                  <a:tabLst>
+                    <a:tab pos="5143500" algn="ctr"/>
+                    <a:tab pos="10287000" algn="r"/>
+                  </a:tabLst>
+                </a:pPr>
+                <a:r>
+                  <a:rPr lang="en-US" dirty="0" smtClean="0"/>
+                  <a:t>For </a:t>
+                </a:r>
+                <a:r>
+                  <a:rPr lang="en-US" dirty="0"/>
+                  <a:t>any </a:t>
+                </a:r>
+                <a:r>
+                  <a:rPr lang="en-US" i="1" dirty="0" smtClean="0"/>
+                  <a:t>orthogonal</a:t>
+                </a:r>
+                <a:r>
+                  <a:rPr lang="en-US" dirty="0" smtClean="0"/>
+                  <a:t> projector</a:t>
+                </a:r>
+                <a:r>
+                  <a:rPr lang="en-US" dirty="0"/>
+                  <a:t> </a:t>
+                </a:r>
+                <a14:m>
+                  <m:oMath xmlns:m="http://schemas.openxmlformats.org/officeDocument/2006/math">
+                    <m:sSub>
+                      <m:sSubPr>
+                        <m:ctrlPr>
+                          <a:rPr lang="en-US" b="0" i="1" smtClean="0">
+                            <a:latin typeface="Cambria Math" panose="02040503050406030204" pitchFamily="18" charset="0"/>
+                          </a:rPr>
+                        </m:ctrlPr>
+                      </m:sSubPr>
+                      <m:e>
+                        <m:r>
+                          <a:rPr lang="en-US" i="1">
+                            <a:latin typeface="Cambria Math" panose="02040503050406030204" pitchFamily="18" charset="0"/>
+                          </a:rPr>
+                          <m:t>𝑃</m:t>
+                        </m:r>
+                      </m:e>
+                      <m:sub>
+                        <m:r>
+                          <a:rPr lang="en-US" b="0" i="1" smtClean="0">
+                            <a:latin typeface="Cambria Math" panose="02040503050406030204" pitchFamily="18" charset="0"/>
+                          </a:rPr>
+                          <m:t>0</m:t>
+                        </m:r>
+                      </m:sub>
+                    </m:sSub>
+                  </m:oMath>
+                </a14:m>
+                <a:r>
+                  <a:rPr lang="en-US" dirty="0" smtClean="0"/>
+                  <a:t> and </a:t>
+                </a:r>
+                <a14:m>
+                  <m:oMath xmlns:m="http://schemas.openxmlformats.org/officeDocument/2006/math">
+                    <m:sSub>
+                      <m:sSubPr>
+                        <m:ctrlPr>
+                          <a:rPr lang="en-US" i="1">
+                            <a:latin typeface="Cambria Math" panose="02040503050406030204" pitchFamily="18" charset="0"/>
+                          </a:rPr>
+                        </m:ctrlPr>
+                      </m:sSubPr>
+                      <m:e>
+                        <m:r>
+                          <a:rPr lang="en-US" i="1">
+                            <a:latin typeface="Cambria Math" panose="02040503050406030204" pitchFamily="18" charset="0"/>
+                          </a:rPr>
+                          <m:t>𝑃</m:t>
+                        </m:r>
+                      </m:e>
+                      <m:sub>
+                        <m:r>
+                          <a:rPr lang="en-US" b="0" i="1" smtClean="0">
+                            <a:latin typeface="Cambria Math" panose="02040503050406030204" pitchFamily="18" charset="0"/>
+                          </a:rPr>
+                          <m:t>1</m:t>
+                        </m:r>
+                      </m:sub>
+                    </m:sSub>
+                  </m:oMath>
+                </a14:m>
+                <a:r>
+                  <a:rPr lang="en-US" dirty="0" smtClean="0"/>
+                  <a:t>, we have</a:t>
+                </a:r>
+                <a:br>
+                  <a:rPr lang="en-US" dirty="0" smtClean="0"/>
+                </a:br>
+                <a:r>
+                  <a:rPr lang="en-US" dirty="0" smtClean="0"/>
+                  <a:t>	</a:t>
+                </a:r>
+                <a14:m>
+                  <m:oMath xmlns:m="http://schemas.openxmlformats.org/officeDocument/2006/math">
+                    <m:sSup>
+                      <m:sSupPr>
+                        <m:ctrlPr>
+                          <a:rPr lang="en-US" i="1" smtClean="0">
+                            <a:latin typeface="Cambria Math" panose="02040503050406030204" pitchFamily="18" charset="0"/>
+                          </a:rPr>
+                        </m:ctrlPr>
+                      </m:sSupPr>
+                      <m:e>
+                        <m:r>
+                          <a:rPr lang="en-US" i="1" smtClean="0">
+                            <a:latin typeface="Cambria Math" panose="02040503050406030204" pitchFamily="18" charset="0"/>
+                          </a:rPr>
+                          <m:t>𝜇</m:t>
+                        </m:r>
+                      </m:e>
+                      <m:sup>
+                        <m:r>
+                          <m:rPr>
+                            <m:nor/>
+                          </m:rPr>
+                          <a:rPr lang="en-US">
+                            <a:latin typeface="Cambria Math" panose="02040503050406030204" pitchFamily="18" charset="0"/>
+                          </a:rPr>
+                          <m:t>D</m:t>
+                        </m:r>
+                      </m:sup>
+                    </m:sSup>
+                    <m:d>
+                      <m:dPr>
+                        <m:ctrlPr>
+                          <a:rPr lang="en-US" i="1">
+                            <a:latin typeface="Cambria Math" panose="02040503050406030204" pitchFamily="18" charset="0"/>
+                          </a:rPr>
+                        </m:ctrlPr>
+                      </m:dPr>
+                      <m:e>
+                        <m:sSub>
+                          <m:sSubPr>
+                            <m:ctrlPr>
+                              <a:rPr lang="en-US" i="1">
+                                <a:latin typeface="Cambria Math" panose="02040503050406030204" pitchFamily="18" charset="0"/>
+                              </a:rPr>
+                            </m:ctrlPr>
+                          </m:sSubPr>
+                          <m:e>
+                            <m:r>
+                              <a:rPr lang="en-US" i="1">
+                                <a:latin typeface="Cambria Math" panose="02040503050406030204" pitchFamily="18" charset="0"/>
+                              </a:rPr>
+                              <m:t>𝑃</m:t>
+                            </m:r>
+                          </m:e>
+                          <m:sub>
+                            <m:r>
+                              <a:rPr lang="en-US" i="1">
+                                <a:latin typeface="Cambria Math" panose="02040503050406030204" pitchFamily="18" charset="0"/>
+                              </a:rPr>
+                              <m:t>0</m:t>
+                            </m:r>
+                          </m:sub>
+                        </m:sSub>
+                        <m:r>
+                          <a:rPr lang="en-US" b="0" i="1" smtClean="0">
+                            <a:latin typeface="Cambria Math" panose="02040503050406030204" pitchFamily="18" charset="0"/>
+                          </a:rPr>
+                          <m:t>+</m:t>
+                        </m:r>
+                        <m:sSub>
+                          <m:sSubPr>
+                            <m:ctrlPr>
+                              <a:rPr lang="en-US" i="1">
+                                <a:latin typeface="Cambria Math" panose="02040503050406030204" pitchFamily="18" charset="0"/>
+                              </a:rPr>
+                            </m:ctrlPr>
+                          </m:sSubPr>
+                          <m:e>
+                            <m:r>
+                              <a:rPr lang="en-US" i="1">
+                                <a:latin typeface="Cambria Math" panose="02040503050406030204" pitchFamily="18" charset="0"/>
+                              </a:rPr>
+                              <m:t>𝑃</m:t>
+                            </m:r>
+                          </m:e>
+                          <m:sub>
+                            <m:r>
+                              <a:rPr lang="en-US" b="0" i="1" smtClean="0">
+                                <a:latin typeface="Cambria Math" panose="02040503050406030204" pitchFamily="18" charset="0"/>
+                              </a:rPr>
+                              <m:t>1</m:t>
+                            </m:r>
+                          </m:sub>
+                        </m:sSub>
+                      </m:e>
+                    </m:d>
+                    <m:r>
+                      <a:rPr lang="en-US" i="1">
+                        <a:latin typeface="Cambria Math" panose="02040503050406030204" pitchFamily="18" charset="0"/>
+                      </a:rPr>
+                      <m:t>=</m:t>
+                    </m:r>
+                    <m:sSup>
+                      <m:sSupPr>
+                        <m:ctrlPr>
+                          <a:rPr lang="en-US" i="1">
+                            <a:latin typeface="Cambria Math" panose="02040503050406030204" pitchFamily="18" charset="0"/>
+                          </a:rPr>
+                        </m:ctrlPr>
+                      </m:sSupPr>
+                      <m:e>
+                        <m:r>
+                          <a:rPr lang="en-US" i="1">
+                            <a:latin typeface="Cambria Math" panose="02040503050406030204" pitchFamily="18" charset="0"/>
+                          </a:rPr>
+                          <m:t>𝜇</m:t>
+                        </m:r>
+                      </m:e>
+                      <m:sup>
+                        <m:r>
+                          <m:rPr>
+                            <m:nor/>
+                          </m:rPr>
+                          <a:rPr lang="en-US">
+                            <a:latin typeface="Cambria Math" panose="02040503050406030204" pitchFamily="18" charset="0"/>
+                          </a:rPr>
+                          <m:t>D</m:t>
+                        </m:r>
+                      </m:sup>
+                    </m:sSup>
+                    <m:d>
+                      <m:dPr>
+                        <m:ctrlPr>
+                          <a:rPr lang="en-US" i="1">
+                            <a:latin typeface="Cambria Math" panose="02040503050406030204" pitchFamily="18" charset="0"/>
+                          </a:rPr>
+                        </m:ctrlPr>
+                      </m:dPr>
+                      <m:e>
+                        <m:sSub>
+                          <m:sSubPr>
+                            <m:ctrlPr>
+                              <a:rPr lang="en-US" b="0" i="1" smtClean="0">
+                                <a:latin typeface="Cambria Math" panose="02040503050406030204" pitchFamily="18" charset="0"/>
+                              </a:rPr>
+                            </m:ctrlPr>
+                          </m:sSubPr>
+                          <m:e>
+                            <m:r>
+                              <a:rPr lang="en-US" i="1">
+                                <a:latin typeface="Cambria Math" panose="02040503050406030204" pitchFamily="18" charset="0"/>
+                              </a:rPr>
+                              <m:t>𝑃</m:t>
+                            </m:r>
+                          </m:e>
+                          <m:sub>
+                            <m:r>
+                              <a:rPr lang="en-US" b="0" i="1" smtClean="0">
+                                <a:latin typeface="Cambria Math" panose="02040503050406030204" pitchFamily="18" charset="0"/>
+                              </a:rPr>
+                              <m:t>0</m:t>
+                            </m:r>
+                          </m:sub>
+                        </m:sSub>
+                      </m:e>
+                    </m:d>
+                    <m:r>
+                      <a:rPr lang="en-US" b="0" i="1" smtClean="0">
+                        <a:latin typeface="Cambria Math" panose="02040503050406030204" pitchFamily="18" charset="0"/>
+                      </a:rPr>
+                      <m:t>+</m:t>
+                    </m:r>
+                    <m:sSup>
+                      <m:sSupPr>
+                        <m:ctrlPr>
+                          <a:rPr lang="en-US" i="1">
+                            <a:latin typeface="Cambria Math" panose="02040503050406030204" pitchFamily="18" charset="0"/>
+                          </a:rPr>
+                        </m:ctrlPr>
+                      </m:sSupPr>
+                      <m:e>
+                        <m:r>
+                          <a:rPr lang="en-US" i="1">
+                            <a:latin typeface="Cambria Math" panose="02040503050406030204" pitchFamily="18" charset="0"/>
+                          </a:rPr>
+                          <m:t>𝜇</m:t>
+                        </m:r>
+                      </m:e>
+                      <m:sup>
+                        <m:r>
+                          <m:rPr>
+                            <m:nor/>
+                          </m:rPr>
+                          <a:rPr lang="en-US">
+                            <a:latin typeface="Cambria Math" panose="02040503050406030204" pitchFamily="18" charset="0"/>
+                          </a:rPr>
+                          <m:t>D</m:t>
+                        </m:r>
+                      </m:sup>
+                    </m:sSup>
+                    <m:d>
+                      <m:dPr>
+                        <m:ctrlPr>
+                          <a:rPr lang="en-US" i="1">
+                            <a:latin typeface="Cambria Math" panose="02040503050406030204" pitchFamily="18" charset="0"/>
+                          </a:rPr>
+                        </m:ctrlPr>
+                      </m:dPr>
+                      <m:e>
+                        <m:sSub>
+                          <m:sSubPr>
+                            <m:ctrlPr>
+                              <a:rPr lang="en-US" b="0" i="1" smtClean="0">
+                                <a:latin typeface="Cambria Math" panose="02040503050406030204" pitchFamily="18" charset="0"/>
+                              </a:rPr>
+                            </m:ctrlPr>
+                          </m:sSubPr>
+                          <m:e>
+                            <m:r>
+                              <a:rPr lang="en-US" i="1">
+                                <a:latin typeface="Cambria Math" panose="02040503050406030204" pitchFamily="18" charset="0"/>
+                              </a:rPr>
+                              <m:t>𝑃</m:t>
+                            </m:r>
+                          </m:e>
+                          <m:sub>
+                            <m:r>
+                              <a:rPr lang="en-US" b="0" i="1" smtClean="0">
+                                <a:latin typeface="Cambria Math" panose="02040503050406030204" pitchFamily="18" charset="0"/>
+                              </a:rPr>
+                              <m:t>1</m:t>
+                            </m:r>
+                          </m:sub>
+                        </m:sSub>
+                      </m:e>
+                    </m:d>
+                    <m:r>
+                      <m:rPr>
+                        <m:nor/>
+                      </m:rPr>
+                      <a:rPr lang="en-US" dirty="0"/>
+                      <m:t>	</m:t>
+                    </m:r>
+                  </m:oMath>
+                </a14:m>
+                <a:r>
+                  <a:rPr lang="en-US" dirty="0"/>
+                  <a:t> </a:t>
+                </a:r>
+                <a:r>
+                  <a:rPr lang="en-US" dirty="0" smtClean="0"/>
+                  <a:t>.	(1)</a:t>
+                </a:r>
+                <a:endParaRPr lang="en-US" dirty="0"/>
+              </a:p>
+              <a:p>
+                <a:pPr lvl="1"/>
+                <a:endParaRPr lang="en-US" dirty="0"/>
+              </a:p>
+              <a:p>
+                <a:pPr lvl="1"/>
+                <a:endParaRPr lang="en-US" dirty="0"/>
+              </a:p>
+            </p:txBody>
+          </p:sp>
+        </mc:Choice>
+        <mc:Fallback>
+          <p:sp>
+            <p:nvSpPr>
+              <p:cNvPr id="3" name="Content Placeholder 2"/>
+              <p:cNvSpPr>
+                <a:spLocks noGrp="1" noRot="1" noChangeAspect="1" noMove="1" noResize="1" noEditPoints="1" noAdjustHandles="1" noChangeArrowheads="1" noChangeShapeType="1" noTextEdit="1"/>
+              </p:cNvSpPr>
+              <p:nvPr>
+                <p:ph idx="1"/>
+              </p:nvPr>
+            </p:nvSpPr>
+            <p:spPr>
+              <a:blipFill rotWithShape="0">
+                <a:blip r:embed="rId3"/>
+                <a:stretch>
+                  <a:fillRect l="-1043" t="-2241" r="-580"/>
+                </a:stretch>
+              </a:blipFill>
+            </p:spPr>
+            <p:txBody>
+              <a:bodyPr/>
+              <a:lstStyle/>
+              <a:p>
+                <a:r>
+                  <a:rPr lang="en-US">
+                    <a:noFill/>
+                  </a:rPr>
+                  <a:t> </a:t>
+                </a:r>
+              </a:p>
+            </p:txBody>
+          </p:sp>
+        </mc:Fallback>
+      </mc:AlternateContent>
+    </p:spTree>
+    <p:extLst>
+      <p:ext uri="{BB962C8B-B14F-4D97-AF65-F5344CB8AC3E}">
+        <p14:creationId xmlns:p14="http://schemas.microsoft.com/office/powerpoint/2010/main" val="308616190"/>
       </p:ext>
     </p:extLst>
   </p:cSld>

</xml_diff>

<commit_message>
prop_letter.tex and "Kochen-Specker Theorem in QIVPM.pptx" Updating...
</commit_message>
<xml_diff>
--- a/Kochen-Specker Theorem in QIVPM.pptx
+++ b/Kochen-Specker Theorem in QIVPM.pptx
@@ -5,18 +5,17 @@
     <p:sldMasterId id="2147483648" r:id="rId1"/>
   </p:sldMasterIdLst>
   <p:notesMasterIdLst>
-    <p:notesMasterId r:id="rId8"/>
+    <p:notesMasterId r:id="rId7"/>
   </p:notesMasterIdLst>
   <p:handoutMasterIdLst>
-    <p:handoutMasterId r:id="rId9"/>
+    <p:handoutMasterId r:id="rId8"/>
   </p:handoutMasterIdLst>
   <p:sldIdLst>
     <p:sldId id="256" r:id="rId2"/>
     <p:sldId id="261" r:id="rId3"/>
     <p:sldId id="257" r:id="rId4"/>
-    <p:sldId id="258" r:id="rId5"/>
-    <p:sldId id="259" r:id="rId6"/>
-    <p:sldId id="260" r:id="rId7"/>
+    <p:sldId id="259" r:id="rId5"/>
+    <p:sldId id="260" r:id="rId6"/>
   </p:sldIdLst>
   <p:sldSz cx="12192000" cy="6858000"/>
   <p:notesSz cx="6858000" cy="9144000"/>
@@ -959,31 +958,6 @@
           <a:bodyPr/>
           <a:lstStyle/>
           <a:p>
-            <a:r>
-              <a:rPr lang="en-US" dirty="0" smtClean="0"/>
-              <a:t>XITS font is required</a:t>
-            </a:r>
-            <a:r>
-              <a:rPr lang="en-US" baseline="0" dirty="0" smtClean="0"/>
-              <a:t> to display Formal Script (\</a:t>
-            </a:r>
-            <a:r>
-              <a:rPr lang="en-US" baseline="0" dirty="0" err="1" smtClean="0"/>
-              <a:t>mathscr</a:t>
-            </a:r>
-            <a:r>
-              <a:rPr lang="en-US" baseline="0" dirty="0" smtClean="0"/>
-              <a:t>) font correctly.</a:t>
-            </a:r>
-            <a:endParaRPr lang="en-US" dirty="0" smtClean="0"/>
-          </a:p>
-          <a:p>
-            <a:r>
-              <a:rPr lang="en-US" dirty="0" smtClean="0"/>
-              <a:t>https://www.ctan.org/tex-archive/fonts/xits/</a:t>
-            </a:r>
-          </a:p>
-          <a:p>
             <a:endParaRPr lang="en-US" dirty="0"/>
           </a:p>
         </p:txBody>
@@ -1014,7 +988,7 @@
     </p:spTree>
     <p:extLst>
       <p:ext uri="{BB962C8B-B14F-4D97-AF65-F5344CB8AC3E}">
-        <p14:creationId xmlns:p14="http://schemas.microsoft.com/office/powerpoint/2010/main" val="2827294382"/>
+        <p14:creationId xmlns:p14="http://schemas.microsoft.com/office/powerpoint/2010/main" val="4134836130"/>
       </p:ext>
     </p:extLst>
   </p:cSld>
@@ -1090,90 +1064,6 @@
             <a:fld id="{553141C9-E3AF-4773-84E5-4C6860670B56}" type="slidenum">
               <a:rPr lang="en-US" smtClean="0"/>
               <a:t>5</a:t>
-            </a:fld>
-            <a:endParaRPr lang="en-US"/>
-          </a:p>
-        </p:txBody>
-      </p:sp>
-    </p:spTree>
-    <p:extLst>
-      <p:ext uri="{BB962C8B-B14F-4D97-AF65-F5344CB8AC3E}">
-        <p14:creationId xmlns:p14="http://schemas.microsoft.com/office/powerpoint/2010/main" val="4134836130"/>
-      </p:ext>
-    </p:extLst>
-  </p:cSld>
-  <p:clrMapOvr>
-    <a:masterClrMapping/>
-  </p:clrMapOvr>
-</p:notes>
-</file>
-
-<file path=ppt/notesSlides/notesSlide6.xml><?xml version="1.0" encoding="utf-8"?>
-<p:notes xmlns:a="http://schemas.openxmlformats.org/drawingml/2006/main" xmlns:r="http://schemas.openxmlformats.org/officeDocument/2006/relationships" xmlns:p="http://schemas.openxmlformats.org/presentationml/2006/main">
-  <p:cSld>
-    <p:spTree>
-      <p:nvGrpSpPr>
-        <p:cNvPr id="1" name=""/>
-        <p:cNvGrpSpPr/>
-        <p:nvPr/>
-      </p:nvGrpSpPr>
-      <p:grpSpPr>
-        <a:xfrm>
-          <a:off x="0" y="0"/>
-          <a:ext cx="0" cy="0"/>
-          <a:chOff x="0" y="0"/>
-          <a:chExt cx="0" cy="0"/>
-        </a:xfrm>
-      </p:grpSpPr>
-      <p:sp>
-        <p:nvSpPr>
-          <p:cNvPr id="2" name="Slide Image Placeholder 1"/>
-          <p:cNvSpPr>
-            <a:spLocks noGrp="1" noRot="1" noChangeAspect="1"/>
-          </p:cNvSpPr>
-          <p:nvPr>
-            <p:ph type="sldImg"/>
-          </p:nvPr>
-        </p:nvSpPr>
-        <p:spPr/>
-      </p:sp>
-      <p:sp>
-        <p:nvSpPr>
-          <p:cNvPr id="3" name="Notes Placeholder 2"/>
-          <p:cNvSpPr>
-            <a:spLocks noGrp="1"/>
-          </p:cNvSpPr>
-          <p:nvPr>
-            <p:ph type="body" idx="1"/>
-          </p:nvPr>
-        </p:nvSpPr>
-        <p:spPr/>
-        <p:txBody>
-          <a:bodyPr/>
-          <a:lstStyle/>
-          <a:p>
-            <a:endParaRPr lang="en-US" dirty="0"/>
-          </a:p>
-        </p:txBody>
-      </p:sp>
-      <p:sp>
-        <p:nvSpPr>
-          <p:cNvPr id="4" name="Slide Number Placeholder 3"/>
-          <p:cNvSpPr>
-            <a:spLocks noGrp="1"/>
-          </p:cNvSpPr>
-          <p:nvPr>
-            <p:ph type="sldNum" sz="quarter" idx="10"/>
-          </p:nvPr>
-        </p:nvSpPr>
-        <p:spPr/>
-        <p:txBody>
-          <a:bodyPr/>
-          <a:lstStyle/>
-          <a:p>
-            <a:fld id="{553141C9-E3AF-4773-84E5-4C6860670B56}" type="slidenum">
-              <a:rPr lang="en-US" smtClean="0"/>
-              <a:t>6</a:t>
             </a:fld>
             <a:endParaRPr lang="en-US"/>
           </a:p>
@@ -4175,7 +4065,46 @@
                 </a:pPr>
                 <a:r>
                   <a:rPr lang="en-US" dirty="0" smtClean="0"/>
-                  <a:t>A QIVPM</a:t>
+                  <a:t>Given </a:t>
+                </a:r>
+                <a:r>
+                  <a:rPr lang="en-US" dirty="0" smtClean="0"/>
+                  <a:t>the </a:t>
+                </a:r>
+                <a:r>
+                  <a:rPr lang="en-US" dirty="0"/>
+                  <a:t>set of projectors on a Hilbert space</a:t>
+                </a:r>
+                <a:r>
+                  <a:rPr lang="en-US" dirty="0"/>
+                  <a:t> </a:t>
+                </a:r>
+                <a14:m>
+                  <m:oMath xmlns:m="http://schemas.openxmlformats.org/officeDocument/2006/math">
+                    <m:r>
+                      <a:rPr lang="en-US" i="1">
+                        <a:latin typeface="Cambria Math" panose="02040503050406030204" pitchFamily="18" charset="0"/>
+                        <a:ea typeface="Cambria Math" panose="02040503050406030204" pitchFamily="18" charset="0"/>
+                      </a:rPr>
+                      <m:t>ℰ</m:t>
+                    </m:r>
+                  </m:oMath>
+                </a14:m>
+                <a:r>
+                  <a:rPr lang="en-US" dirty="0" smtClean="0"/>
+                  <a:t>,</a:t>
+                </a:r>
+                <a:r>
+                  <a:rPr lang="en-US" dirty="0"/>
+                  <a:t> a</a:t>
+                </a:r>
+                <a:r>
+                  <a:rPr lang="en-US" dirty="0" smtClean="0"/>
+                  <a:t> </a:t>
+                </a:r>
+                <a:r>
+                  <a:rPr lang="en-US" dirty="0" smtClean="0"/>
+                  <a:t>QIVPM</a:t>
                 </a:r>
                 <a:r>
                   <a:rPr lang="en-US" dirty="0"/>
@@ -4305,9 +4234,36 @@
                   </m:oMath>
                 </a14:m>
                 <a:r>
+                  <a:rPr lang="en-US" dirty="0"/>
+                  <a:t>, </a:t>
+                </a:r>
+                <a:r>
+                  <a:rPr lang="en-US" dirty="0" smtClean="0"/>
+                  <a:t>where </a:t>
+                </a:r>
+                <a14:m>
+                  <m:oMath xmlns:m="http://schemas.openxmlformats.org/officeDocument/2006/math">
+                    <m:r>
+                      <a:rPr lang="en-US" i="1">
+                        <a:latin typeface="Cambria Math" panose="02040503050406030204" pitchFamily="18" charset="0"/>
+                      </a:rPr>
+                      <m:t>𝟘</m:t>
+                    </m:r>
+                  </m:oMath>
+                </a14:m>
+                <a:r>
+                  <a:rPr lang="en-US" dirty="0"/>
+                  <a:t> is the zero </a:t>
+                </a:r>
+                <a:r>
+                  <a:rPr lang="en-US" dirty="0" smtClean="0"/>
+                  <a:t>matrix</a:t>
+                </a:r>
+                <a:r>
                   <a:rPr lang="en-US" dirty="0" smtClean="0"/>
                   <a:t>.</a:t>
                 </a:r>
+                <a:endParaRPr lang="en-US" dirty="0" smtClean="0"/>
               </a:p>
               <a:p>
                 <a14:m>
@@ -4376,8 +4332,39 @@
                 </a14:m>
                 <a:r>
                   <a:rPr lang="en-US" dirty="0" smtClean="0"/>
+                  <a:t>, where </a:t>
+                </a:r>
+                <a14:m>
+                  <m:oMath xmlns:m="http://schemas.openxmlformats.org/officeDocument/2006/math">
+                    <m:r>
+                      <a:rPr lang="en-US" i="1">
+                        <a:latin typeface="Cambria Math" panose="02040503050406030204" pitchFamily="18" charset="0"/>
+                      </a:rPr>
+                      <m:t>𝟙</m:t>
+                    </m:r>
+                  </m:oMath>
+                </a14:m>
+                <a:r>
+                  <a:rPr lang="en-US" dirty="0"/>
+                  <a:t> </a:t>
+                </a:r>
+                <a:r>
+                  <a:rPr lang="en-US" dirty="0"/>
+                  <a:t>is the </a:t>
+                </a:r>
+                <a:r>
+                  <a:rPr lang="en-US" dirty="0"/>
+                  <a:t>identity </a:t>
+                </a:r>
+                <a:r>
+                  <a:rPr lang="en-US" dirty="0"/>
+                  <a:t>matrix</a:t>
+                </a:r>
+                <a:r>
+                  <a:rPr lang="en-US" dirty="0" smtClean="0"/>
                   <a:t>.</a:t>
                 </a:r>
+                <a:endParaRPr lang="en-US" dirty="0" smtClean="0"/>
               </a:p>
               <a:p>
                 <a:r>
@@ -4725,8 +4712,85 @@
                   </m:oMath>
                 </a14:m>
                 <a:r>
-                  <a:rPr lang="en-US" dirty="0"/>
-                  <a:t>, if </a:t>
+                  <a:rPr lang="en-US" dirty="0" smtClean="0"/>
+                  <a:t> (</a:t>
+                </a:r>
+                <a14:m>
+                  <m:oMath xmlns:m="http://schemas.openxmlformats.org/officeDocument/2006/math">
+                    <m:sSub>
+                      <m:sSubPr>
+                        <m:ctrlPr>
+                          <a:rPr lang="en-US" i="1">
+                            <a:latin typeface="Cambria Math" panose="02040503050406030204" pitchFamily="18" charset="0"/>
+                          </a:rPr>
+                        </m:ctrlPr>
+                      </m:sSubPr>
+                      <m:e>
+                        <m:r>
+                          <a:rPr lang="en-US" i="1">
+                            <a:latin typeface="Cambria Math" panose="02040503050406030204" pitchFamily="18" charset="0"/>
+                          </a:rPr>
+                          <m:t>𝑃</m:t>
+                        </m:r>
+                      </m:e>
+                      <m:sub>
+                        <m:r>
+                          <a:rPr lang="en-US" i="1">
+                            <a:latin typeface="Cambria Math" panose="02040503050406030204" pitchFamily="18" charset="0"/>
+                          </a:rPr>
+                          <m:t>0</m:t>
+                        </m:r>
+                      </m:sub>
+                    </m:sSub>
+                    <m:sSub>
+                      <m:sSubPr>
+                        <m:ctrlPr>
+                          <a:rPr lang="en-US" i="1">
+                            <a:latin typeface="Cambria Math" panose="02040503050406030204" pitchFamily="18" charset="0"/>
+                          </a:rPr>
+                        </m:ctrlPr>
+                      </m:sSubPr>
+                      <m:e>
+                        <m:r>
+                          <a:rPr lang="en-US" i="1">
+                            <a:latin typeface="Cambria Math" panose="02040503050406030204" pitchFamily="18" charset="0"/>
+                          </a:rPr>
+                          <m:t>𝑃</m:t>
+                        </m:r>
+                      </m:e>
+                      <m:sub>
+                        <m:r>
+                          <a:rPr lang="en-US" i="1">
+                            <a:latin typeface="Cambria Math" panose="02040503050406030204" pitchFamily="18" charset="0"/>
+                          </a:rPr>
+                          <m:t>1</m:t>
+                        </m:r>
+                      </m:sub>
+                    </m:sSub>
+                    <m:r>
+                      <a:rPr lang="en-US" b="0" i="1" smtClean="0">
+                        <a:latin typeface="Cambria Math" panose="02040503050406030204" pitchFamily="18" charset="0"/>
+                      </a:rPr>
+                      <m:t>=</m:t>
+                    </m:r>
+                    <m:r>
+                      <a:rPr lang="en-US" i="1">
+                        <a:latin typeface="Cambria Math" panose="02040503050406030204" pitchFamily="18" charset="0"/>
+                      </a:rPr>
+                      <m:t>𝟘</m:t>
+                    </m:r>
+                  </m:oMath>
+                </a14:m>
+                <a:r>
+                  <a:rPr lang="en-US" dirty="0" smtClean="0"/>
+                  <a:t>), </a:t>
+                </a:r>
+                <a:br>
+                  <a:rPr lang="en-US" dirty="0" smtClean="0"/>
+                </a:br>
+                <a:r>
+                  <a:rPr lang="en-US" dirty="0" smtClean="0"/>
+                  <a:t>if </a:t>
                 </a:r>
                 <a14:m>
                   <m:oMath xmlns:m="http://schemas.openxmlformats.org/officeDocument/2006/math">
@@ -5467,8 +5531,8 @@
           </a:p>
         </p:txBody>
       </p:sp>
-      <mc:AlternateContent xmlns:mc="http://schemas.openxmlformats.org/markup-compatibility/2006" xmlns:a14="http://schemas.microsoft.com/office/drawing/2010/main">
-        <mc:Choice Requires="a14">
+      <mc:AlternateContent xmlns:mc="http://schemas.openxmlformats.org/markup-compatibility/2006">
+        <mc:Choice xmlns:a14="http://schemas.microsoft.com/office/drawing/2010/main" Requires="a14">
           <p:sp>
             <p:nvSpPr>
               <p:cNvPr id="3" name="Content Placeholder 2"/>
@@ -5479,20 +5543,42 @@
                 <p:ph idx="1"/>
               </p:nvPr>
             </p:nvSpPr>
-            <p:spPr/>
+            <p:spPr>
+              <a:xfrm>
+                <a:off x="838200" y="1825625"/>
+                <a:ext cx="10515600" cy="588391"/>
+              </a:xfrm>
+            </p:spPr>
             <p:txBody>
               <a:bodyPr/>
               <a:lstStyle/>
               <a:p>
+                <a:pPr marL="0" indent="0">
+                  <a:buNone/>
+                </a:pPr>
+                <a:r>
+                  <a:rPr lang="en-US" b="1" dirty="0"/>
+                  <a:t>Theorem</a:t>
+                </a:r>
+                <a:r>
+                  <a:rPr lang="en-US" dirty="0"/>
+                  <a:t> There </a:t>
+                </a:r>
                 <a:r>
                   <a:rPr lang="en-US" dirty="0" smtClean="0"/>
-                  <a:t>There is no </a:t>
+                  <a:t>is no </a:t>
                 </a:r>
                 <a:r>
                   <a:rPr lang="en-US" dirty="0" smtClean="0">
                     <a:effectLst/>
                   </a:rPr>
-                  <a:t>cryptodeterministic measure</a:t>
+                  <a:t>cryptodeterministic </a:t>
+                </a:r>
+                <a:r>
+                  <a:rPr lang="en-US" dirty="0" smtClean="0">
+                    <a:effectLst/>
+                  </a:rPr>
+                  <a:t>QIVPM</a:t>
                 </a:r>
                 <a:r>
                   <a:rPr lang="en-US" dirty="0"/>
@@ -5509,12 +5595,24 @@
                         </m:ctrlPr>
                       </m:sSupPr>
                       <m:e>
-                        <m:r>
-                          <a:rPr lang="en-US" b="0" i="1" smtClean="0">
-                            <a:latin typeface="Cambria Math" panose="02040503050406030204" pitchFamily="18" charset="0"/>
-                          </a:rPr>
-                          <m:t>𝜇</m:t>
-                        </m:r>
+                        <m:acc>
+                          <m:accPr>
+                            <m:chr m:val="̅"/>
+                            <m:ctrlPr>
+                              <a:rPr lang="en-US" i="1">
+                                <a:latin typeface="Cambria Math" panose="02040503050406030204" pitchFamily="18" charset="0"/>
+                              </a:rPr>
+                            </m:ctrlPr>
+                          </m:accPr>
+                          <m:e>
+                            <m:r>
+                              <a:rPr lang="en-US" i="1">
+                                <a:latin typeface="Cambria Math" panose="02040503050406030204" pitchFamily="18" charset="0"/>
+                              </a:rPr>
+                              <m:t>𝜇</m:t>
+                            </m:r>
+                          </m:e>
+                        </m:acc>
                       </m:e>
                       <m:sup>
                         <m:r>
@@ -5560,227 +5658,430 @@
                         </m:ctrlPr>
                       </m:dPr>
                       <m:e>
+                        <m:d>
+                          <m:dPr>
+                            <m:begChr m:val="["/>
+                            <m:endChr m:val="]"/>
+                            <m:ctrlPr>
+                              <a:rPr lang="en-US" i="1">
+                                <a:latin typeface="Cambria Math" panose="02040503050406030204" pitchFamily="18" charset="0"/>
+                              </a:rPr>
+                            </m:ctrlPr>
+                          </m:dPr>
+                          <m:e>
+                            <m:r>
+                              <a:rPr lang="en-US" i="1">
+                                <a:latin typeface="Cambria Math" panose="02040503050406030204" pitchFamily="18" charset="0"/>
+                              </a:rPr>
+                              <m:t>0,0</m:t>
+                            </m:r>
+                          </m:e>
+                        </m:d>
                         <m:r>
                           <a:rPr lang="en-US" b="0" i="1" smtClean="0">
                             <a:latin typeface="Cambria Math" panose="02040503050406030204" pitchFamily="18" charset="0"/>
                             <a:ea typeface="Cambria Math" panose="02040503050406030204" pitchFamily="18" charset="0"/>
                           </a:rPr>
-                          <m:t>0,1</m:t>
+                          <m:t>,</m:t>
                         </m:r>
+                        <m:d>
+                          <m:dPr>
+                            <m:begChr m:val="["/>
+                            <m:endChr m:val="]"/>
+                            <m:ctrlPr>
+                              <a:rPr lang="en-US" i="1">
+                                <a:latin typeface="Cambria Math" panose="02040503050406030204" pitchFamily="18" charset="0"/>
+                              </a:rPr>
+                            </m:ctrlPr>
+                          </m:dPr>
+                          <m:e>
+                            <m:r>
+                              <a:rPr lang="en-US" i="1">
+                                <a:latin typeface="Cambria Math" panose="02040503050406030204" pitchFamily="18" charset="0"/>
+                              </a:rPr>
+                              <m:t>1,1</m:t>
+                            </m:r>
+                          </m:e>
+                        </m:d>
                       </m:e>
                     </m:d>
                   </m:oMath>
                 </a14:m>
                 <a:r>
                   <a:rPr lang="en-US" dirty="0" smtClean="0"/>
-                  <a:t>, where </a:t>
+                  <a:t>.</a:t>
+                </a:r>
+                <a:endParaRPr lang="en-US" dirty="0"/>
+              </a:p>
+              <a:p>
+                <a:pPr lvl="1"/>
+                <a:endParaRPr lang="en-US" dirty="0"/>
+              </a:p>
+            </p:txBody>
+          </p:sp>
+        </mc:Choice>
+        <mc:Fallback>
+          <p:sp>
+            <p:nvSpPr>
+              <p:cNvPr id="3" name="Content Placeholder 2"/>
+              <p:cNvSpPr>
+                <a:spLocks noGrp="1" noRot="1" noChangeAspect="1" noMove="1" noResize="1" noEditPoints="1" noAdjustHandles="1" noChangeArrowheads="1" noChangeShapeType="1" noTextEdit="1"/>
+              </p:cNvSpPr>
+              <p:nvPr>
+                <p:ph idx="1"/>
+              </p:nvPr>
+            </p:nvSpPr>
+            <p:spPr>
+              <a:xfrm>
+                <a:off x="838200" y="1825625"/>
+                <a:ext cx="10515600" cy="588391"/>
+              </a:xfrm>
+              <a:blipFill rotWithShape="0">
+                <a:blip r:embed="rId3"/>
+                <a:stretch>
+                  <a:fillRect l="-1217" t="-5155" r="-1159" b="-21649"/>
+                </a:stretch>
+              </a:blipFill>
+            </p:spPr>
+            <p:txBody>
+              <a:bodyPr/>
+              <a:lstStyle/>
+              <a:p>
+                <a:r>
+                  <a:rPr lang="en-US">
+                    <a:noFill/>
+                  </a:rPr>
+                  <a:t> </a:t>
+                </a:r>
+              </a:p>
+            </p:txBody>
+          </p:sp>
+        </mc:Fallback>
+      </mc:AlternateContent>
+      <p:sp>
+        <p:nvSpPr>
+          <p:cNvPr id="4" name="Title 1"/>
+          <p:cNvSpPr txBox="1">
+            <a:spLocks/>
+          </p:cNvSpPr>
+          <p:nvPr/>
+        </p:nvSpPr>
+        <p:spPr>
+          <a:xfrm>
+            <a:off x="838200" y="2986405"/>
+            <a:ext cx="10515600" cy="1325563"/>
+          </a:xfrm>
+          <a:prstGeom prst="rect">
+            <a:avLst/>
+          </a:prstGeom>
+        </p:spPr>
+        <p:txBody>
+          <a:bodyPr vert="horz" lIns="91440" tIns="45720" rIns="91440" bIns="45720" rtlCol="0" anchor="ctr">
+            <a:normAutofit/>
+          </a:bodyPr>
+          <a:lstStyle>
+            <a:lvl1pPr algn="l" defTabSz="914400" rtl="0" eaLnBrk="1" latinLnBrk="0" hangingPunct="1">
+              <a:lnSpc>
+                <a:spcPct val="90000"/>
+              </a:lnSpc>
+              <a:spcBef>
+                <a:spcPct val="0"/>
+              </a:spcBef>
+              <a:buNone/>
+              <a:defRPr sz="4400" kern="1200">
+                <a:solidFill>
+                  <a:schemeClr val="tx1"/>
+                </a:solidFill>
+                <a:latin typeface="+mj-lt"/>
+                <a:ea typeface="+mj-ea"/>
+                <a:cs typeface="+mj-cs"/>
+              </a:defRPr>
+            </a:lvl1pPr>
+          </a:lstStyle>
+          <a:p>
+            <a:r>
+              <a:rPr lang="en-US" smtClean="0"/>
+              <a:t>Finite Precision Measurement</a:t>
+            </a:r>
+            <a:endParaRPr lang="en-US" dirty="0"/>
+          </a:p>
+        </p:txBody>
+      </p:sp>
+      <mc:AlternateContent xmlns:mc="http://schemas.openxmlformats.org/markup-compatibility/2006">
+        <mc:Choice xmlns:a14="http://schemas.microsoft.com/office/drawing/2010/main" Requires="a14">
+          <p:sp>
+            <p:nvSpPr>
+              <p:cNvPr id="5" name="Content Placeholder 2"/>
+              <p:cNvSpPr txBox="1">
+                <a:spLocks/>
+              </p:cNvSpPr>
+              <p:nvPr/>
+            </p:nvSpPr>
+            <p:spPr>
+              <a:xfrm>
+                <a:off x="838200" y="4446905"/>
+                <a:ext cx="10515600" cy="1405255"/>
+              </a:xfrm>
+              <a:prstGeom prst="rect">
+                <a:avLst/>
+              </a:prstGeom>
+            </p:spPr>
+            <p:txBody>
+              <a:bodyPr vert="horz" lIns="91440" tIns="45720" rIns="91440" bIns="45720" rtlCol="0">
+                <a:normAutofit/>
+              </a:bodyPr>
+              <a:lstStyle>
+                <a:lvl1pPr marL="228600" indent="-228600" algn="l" defTabSz="914400" rtl="0" eaLnBrk="1" latinLnBrk="0" hangingPunct="1">
+                  <a:lnSpc>
+                    <a:spcPct val="90000"/>
+                  </a:lnSpc>
+                  <a:spcBef>
+                    <a:spcPts val="1000"/>
+                  </a:spcBef>
+                  <a:buFont typeface="Arial" panose="020B0604020202020204" pitchFamily="34" charset="0"/>
+                  <a:buChar char="•"/>
+                  <a:defRPr sz="2800" kern="1200">
+                    <a:solidFill>
+                      <a:schemeClr val="tx1"/>
+                    </a:solidFill>
+                    <a:latin typeface="+mn-lt"/>
+                    <a:ea typeface="+mn-ea"/>
+                    <a:cs typeface="+mn-cs"/>
+                  </a:defRPr>
+                </a:lvl1pPr>
+                <a:lvl2pPr marL="685800" indent="-228600" algn="l" defTabSz="914400" rtl="0" eaLnBrk="1" latinLnBrk="0" hangingPunct="1">
+                  <a:lnSpc>
+                    <a:spcPct val="90000"/>
+                  </a:lnSpc>
+                  <a:spcBef>
+                    <a:spcPts val="500"/>
+                  </a:spcBef>
+                  <a:buFont typeface="Arial" panose="020B0604020202020204" pitchFamily="34" charset="0"/>
+                  <a:buChar char="•"/>
+                  <a:defRPr sz="2400" kern="1200">
+                    <a:solidFill>
+                      <a:schemeClr val="tx1"/>
+                    </a:solidFill>
+                    <a:latin typeface="+mn-lt"/>
+                    <a:ea typeface="+mn-ea"/>
+                    <a:cs typeface="+mn-cs"/>
+                  </a:defRPr>
+                </a:lvl2pPr>
+                <a:lvl3pPr marL="1143000" indent="-228600" algn="l" defTabSz="914400" rtl="0" eaLnBrk="1" latinLnBrk="0" hangingPunct="1">
+                  <a:lnSpc>
+                    <a:spcPct val="90000"/>
+                  </a:lnSpc>
+                  <a:spcBef>
+                    <a:spcPts val="500"/>
+                  </a:spcBef>
+                  <a:buFont typeface="Arial" panose="020B0604020202020204" pitchFamily="34" charset="0"/>
+                  <a:buChar char="•"/>
+                  <a:defRPr sz="2000" kern="1200">
+                    <a:solidFill>
+                      <a:schemeClr val="tx1"/>
+                    </a:solidFill>
+                    <a:latin typeface="+mn-lt"/>
+                    <a:ea typeface="+mn-ea"/>
+                    <a:cs typeface="+mn-cs"/>
+                  </a:defRPr>
+                </a:lvl3pPr>
+                <a:lvl4pPr marL="1600200" indent="-228600" algn="l" defTabSz="914400" rtl="0" eaLnBrk="1" latinLnBrk="0" hangingPunct="1">
+                  <a:lnSpc>
+                    <a:spcPct val="90000"/>
+                  </a:lnSpc>
+                  <a:spcBef>
+                    <a:spcPts val="500"/>
+                  </a:spcBef>
+                  <a:buFont typeface="Arial" panose="020B0604020202020204" pitchFamily="34" charset="0"/>
+                  <a:buChar char="•"/>
+                  <a:defRPr sz="1800" kern="1200">
+                    <a:solidFill>
+                      <a:schemeClr val="tx1"/>
+                    </a:solidFill>
+                    <a:latin typeface="+mn-lt"/>
+                    <a:ea typeface="+mn-ea"/>
+                    <a:cs typeface="+mn-cs"/>
+                  </a:defRPr>
+                </a:lvl4pPr>
+                <a:lvl5pPr marL="2057400" indent="-228600" algn="l" defTabSz="914400" rtl="0" eaLnBrk="1" latinLnBrk="0" hangingPunct="1">
+                  <a:lnSpc>
+                    <a:spcPct val="90000"/>
+                  </a:lnSpc>
+                  <a:spcBef>
+                    <a:spcPts val="500"/>
+                  </a:spcBef>
+                  <a:buFont typeface="Arial" panose="020B0604020202020204" pitchFamily="34" charset="0"/>
+                  <a:buChar char="•"/>
+                  <a:defRPr sz="1800" kern="1200">
+                    <a:solidFill>
+                      <a:schemeClr val="tx1"/>
+                    </a:solidFill>
+                    <a:latin typeface="+mn-lt"/>
+                    <a:ea typeface="+mn-ea"/>
+                    <a:cs typeface="+mn-cs"/>
+                  </a:defRPr>
+                </a:lvl5pPr>
+                <a:lvl6pPr marL="2514600" indent="-228600" algn="l" defTabSz="914400" rtl="0" eaLnBrk="1" latinLnBrk="0" hangingPunct="1">
+                  <a:lnSpc>
+                    <a:spcPct val="90000"/>
+                  </a:lnSpc>
+                  <a:spcBef>
+                    <a:spcPts val="500"/>
+                  </a:spcBef>
+                  <a:buFont typeface="Arial" panose="020B0604020202020204" pitchFamily="34" charset="0"/>
+                  <a:buChar char="•"/>
+                  <a:defRPr sz="1800" kern="1200">
+                    <a:solidFill>
+                      <a:schemeClr val="tx1"/>
+                    </a:solidFill>
+                    <a:latin typeface="+mn-lt"/>
+                    <a:ea typeface="+mn-ea"/>
+                    <a:cs typeface="+mn-cs"/>
+                  </a:defRPr>
+                </a:lvl6pPr>
+                <a:lvl7pPr marL="2971800" indent="-228600" algn="l" defTabSz="914400" rtl="0" eaLnBrk="1" latinLnBrk="0" hangingPunct="1">
+                  <a:lnSpc>
+                    <a:spcPct val="90000"/>
+                  </a:lnSpc>
+                  <a:spcBef>
+                    <a:spcPts val="500"/>
+                  </a:spcBef>
+                  <a:buFont typeface="Arial" panose="020B0604020202020204" pitchFamily="34" charset="0"/>
+                  <a:buChar char="•"/>
+                  <a:defRPr sz="1800" kern="1200">
+                    <a:solidFill>
+                      <a:schemeClr val="tx1"/>
+                    </a:solidFill>
+                    <a:latin typeface="+mn-lt"/>
+                    <a:ea typeface="+mn-ea"/>
+                    <a:cs typeface="+mn-cs"/>
+                  </a:defRPr>
+                </a:lvl7pPr>
+                <a:lvl8pPr marL="3429000" indent="-228600" algn="l" defTabSz="914400" rtl="0" eaLnBrk="1" latinLnBrk="0" hangingPunct="1">
+                  <a:lnSpc>
+                    <a:spcPct val="90000"/>
+                  </a:lnSpc>
+                  <a:spcBef>
+                    <a:spcPts val="500"/>
+                  </a:spcBef>
+                  <a:buFont typeface="Arial" panose="020B0604020202020204" pitchFamily="34" charset="0"/>
+                  <a:buChar char="•"/>
+                  <a:defRPr sz="1800" kern="1200">
+                    <a:solidFill>
+                      <a:schemeClr val="tx1"/>
+                    </a:solidFill>
+                    <a:latin typeface="+mn-lt"/>
+                    <a:ea typeface="+mn-ea"/>
+                    <a:cs typeface="+mn-cs"/>
+                  </a:defRPr>
+                </a:lvl8pPr>
+                <a:lvl9pPr marL="3886200" indent="-228600" algn="l" defTabSz="914400" rtl="0" eaLnBrk="1" latinLnBrk="0" hangingPunct="1">
+                  <a:lnSpc>
+                    <a:spcPct val="90000"/>
+                  </a:lnSpc>
+                  <a:spcBef>
+                    <a:spcPts val="500"/>
+                  </a:spcBef>
+                  <a:buFont typeface="Arial" panose="020B0604020202020204" pitchFamily="34" charset="0"/>
+                  <a:buChar char="•"/>
+                  <a:defRPr sz="1800" kern="1200">
+                    <a:solidFill>
+                      <a:schemeClr val="tx1"/>
+                    </a:solidFill>
+                    <a:latin typeface="+mn-lt"/>
+                    <a:ea typeface="+mn-ea"/>
+                    <a:cs typeface="+mn-cs"/>
+                  </a:defRPr>
+                </a:lvl9pPr>
+              </a:lstStyle>
+              <a:p>
+                <a:r>
+                  <a:rPr lang="en-US" dirty="0" smtClean="0"/>
+                  <a:t>Relax </a:t>
+                </a:r>
+                <a14:m>
+                  <m:oMath xmlns:m="http://schemas.openxmlformats.org/officeDocument/2006/math">
+                    <m:d>
+                      <m:dPr>
+                        <m:begChr m:val="{"/>
+                        <m:endChr m:val="}"/>
+                        <m:ctrlPr>
+                          <a:rPr lang="en-US" i="1">
+                            <a:latin typeface="Cambria Math" panose="02040503050406030204" pitchFamily="18" charset="0"/>
+                            <a:ea typeface="Cambria Math" panose="02040503050406030204" pitchFamily="18" charset="0"/>
+                          </a:rPr>
+                        </m:ctrlPr>
+                      </m:dPr>
+                      <m:e>
+                        <m:d>
+                          <m:dPr>
+                            <m:begChr m:val="["/>
+                            <m:endChr m:val="]"/>
+                            <m:ctrlPr>
+                              <a:rPr lang="en-US" i="1">
+                                <a:latin typeface="Cambria Math" panose="02040503050406030204" pitchFamily="18" charset="0"/>
+                              </a:rPr>
+                            </m:ctrlPr>
+                          </m:dPr>
+                          <m:e>
+                            <m:r>
+                              <a:rPr lang="en-US" i="1">
+                                <a:latin typeface="Cambria Math" panose="02040503050406030204" pitchFamily="18" charset="0"/>
+                              </a:rPr>
+                              <m:t>0,0</m:t>
+                            </m:r>
+                          </m:e>
+                        </m:d>
+                        <m:r>
+                          <a:rPr lang="en-US" i="1">
+                            <a:latin typeface="Cambria Math" panose="02040503050406030204" pitchFamily="18" charset="0"/>
+                            <a:ea typeface="Cambria Math" panose="02040503050406030204" pitchFamily="18" charset="0"/>
+                          </a:rPr>
+                          <m:t>,</m:t>
+                        </m:r>
+                        <m:d>
+                          <m:dPr>
+                            <m:begChr m:val="["/>
+                            <m:endChr m:val="]"/>
+                            <m:ctrlPr>
+                              <a:rPr lang="en-US" i="1">
+                                <a:latin typeface="Cambria Math" panose="02040503050406030204" pitchFamily="18" charset="0"/>
+                              </a:rPr>
+                            </m:ctrlPr>
+                          </m:dPr>
+                          <m:e>
+                            <m:r>
+                              <a:rPr lang="en-US" i="1">
+                                <a:latin typeface="Cambria Math" panose="02040503050406030204" pitchFamily="18" charset="0"/>
+                              </a:rPr>
+                              <m:t>1,1</m:t>
+                            </m:r>
+                          </m:e>
+                        </m:d>
+                      </m:e>
+                    </m:d>
+                  </m:oMath>
+                </a14:m>
+                <a:r>
+                  <a:rPr lang="en-US" dirty="0" smtClean="0"/>
+                  <a:t> to a set of intervals</a:t>
+                </a:r>
+                <a:r>
+                  <a:rPr lang="en-US" dirty="0"/>
+                  <a:t> </a:t>
                 </a:r>
                 <a14:m>
                   <m:oMath xmlns:m="http://schemas.openxmlformats.org/officeDocument/2006/math">
                     <m:r>
-                      <a:rPr lang="en-US" i="1">
-                        <a:latin typeface="Cambria Math" panose="02040503050406030204" pitchFamily="18" charset="0"/>
-                        <a:ea typeface="Cambria Math" panose="02040503050406030204" pitchFamily="18" charset="0"/>
+                      <m:rPr>
+                        <m:nor/>
+                      </m:rPr>
+                      <a:rPr lang="en-US" dirty="0">
+                        <a:latin typeface="XITS Math" panose="02000503000000000000" pitchFamily="50" charset="0"/>
+                        <a:ea typeface="XITS Math" panose="02000503000000000000" pitchFamily="50" charset="0"/>
+                        <a:cs typeface="XITS Math" panose="02000503000000000000" pitchFamily="50" charset="0"/>
                       </a:rPr>
-                      <m:t>ℰ</m:t>
-                    </m:r>
-                  </m:oMath>
-                </a14:m>
-                <a:r>
-                  <a:rPr lang="en-US" dirty="0" smtClean="0"/>
-                  <a:t> is the set of projectors on a Hilbert space, and </a:t>
-                </a:r>
-                <a14:m>
-                  <m:oMath xmlns:m="http://schemas.openxmlformats.org/officeDocument/2006/math">
-                    <m:sSup>
-                      <m:sSupPr>
-                        <m:ctrlPr>
-                          <a:rPr lang="en-US" i="1">
-                            <a:latin typeface="Cambria Math" panose="02040503050406030204" pitchFamily="18" charset="0"/>
-                          </a:rPr>
-                        </m:ctrlPr>
-                      </m:sSupPr>
-                      <m:e>
-                        <m:r>
-                          <a:rPr lang="en-US" i="1">
-                            <a:latin typeface="Cambria Math" panose="02040503050406030204" pitchFamily="18" charset="0"/>
-                          </a:rPr>
-                          <m:t>𝜇</m:t>
-                        </m:r>
-                      </m:e>
-                      <m:sup>
-                        <m:r>
-                          <m:rPr>
-                            <m:nor/>
-                          </m:rPr>
-                          <a:rPr lang="en-US">
-                            <a:latin typeface="Cambria Math" panose="02040503050406030204" pitchFamily="18" charset="0"/>
-                          </a:rPr>
-                          <m:t>D</m:t>
-                        </m:r>
-                      </m:sup>
-                    </m:sSup>
-                  </m:oMath>
-                </a14:m>
-                <a:r>
-                  <a:rPr lang="en-US" dirty="0" smtClean="0"/>
-                  <a:t> satisfies the following axioms:</a:t>
-                </a:r>
-              </a:p>
-              <a:p>
-                <a:pPr lvl="1"/>
-                <a14:m>
-                  <m:oMath xmlns:m="http://schemas.openxmlformats.org/officeDocument/2006/math">
-                    <m:sSup>
-                      <m:sSupPr>
-                        <m:ctrlPr>
-                          <a:rPr lang="en-US" i="1">
-                            <a:latin typeface="Cambria Math" panose="02040503050406030204" pitchFamily="18" charset="0"/>
-                          </a:rPr>
-                        </m:ctrlPr>
-                      </m:sSupPr>
-                      <m:e>
-                        <m:r>
-                          <a:rPr lang="en-US" i="1">
-                            <a:latin typeface="Cambria Math" panose="02040503050406030204" pitchFamily="18" charset="0"/>
-                          </a:rPr>
-                          <m:t>𝜇</m:t>
-                        </m:r>
-                      </m:e>
-                      <m:sup>
-                        <m:r>
-                          <m:rPr>
-                            <m:nor/>
-                          </m:rPr>
-                          <a:rPr lang="en-US">
-                            <a:latin typeface="Cambria Math" panose="02040503050406030204" pitchFamily="18" charset="0"/>
-                          </a:rPr>
-                          <m:t>D</m:t>
-                        </m:r>
-                      </m:sup>
-                    </m:sSup>
-                    <m:d>
-                      <m:dPr>
-                        <m:ctrlPr>
-                          <a:rPr lang="en-US" b="0" i="1" smtClean="0">
-                            <a:latin typeface="Cambria Math" panose="02040503050406030204" pitchFamily="18" charset="0"/>
-                          </a:rPr>
-                        </m:ctrlPr>
-                      </m:dPr>
-                      <m:e>
-                        <m:r>
-                          <a:rPr lang="en-US" i="1">
-                            <a:latin typeface="Cambria Math" panose="02040503050406030204" pitchFamily="18" charset="0"/>
-                          </a:rPr>
-                          <m:t>𝟘</m:t>
-                        </m:r>
-                      </m:e>
-                    </m:d>
-                    <m:r>
-                      <a:rPr lang="en-US" b="0" i="1" smtClean="0">
-                        <a:latin typeface="Cambria Math" panose="02040503050406030204" pitchFamily="18" charset="0"/>
-                      </a:rPr>
-                      <m:t>=0</m:t>
-                    </m:r>
-                  </m:oMath>
-                </a14:m>
-                <a:r>
-                  <a:rPr lang="en-US" dirty="0" smtClean="0"/>
-                  <a:t>, where </a:t>
-                </a:r>
-                <a14:m>
-                  <m:oMath xmlns:m="http://schemas.openxmlformats.org/officeDocument/2006/math">
-                    <m:r>
-                      <a:rPr lang="en-US" i="1">
-                        <a:latin typeface="Cambria Math" panose="02040503050406030204" pitchFamily="18" charset="0"/>
-                      </a:rPr>
-                      <m:t>𝟘</m:t>
-                    </m:r>
-                  </m:oMath>
-                </a14:m>
-                <a:r>
-                  <a:rPr lang="en-US" dirty="0" smtClean="0"/>
-                  <a:t> is the zero matrix.</a:t>
-                </a:r>
-              </a:p>
-              <a:p>
-                <a:pPr lvl="1"/>
-                <a14:m>
-                  <m:oMath xmlns:m="http://schemas.openxmlformats.org/officeDocument/2006/math">
-                    <m:sSup>
-                      <m:sSupPr>
-                        <m:ctrlPr>
-                          <a:rPr lang="en-US" i="1">
-                            <a:latin typeface="Cambria Math" panose="02040503050406030204" pitchFamily="18" charset="0"/>
-                          </a:rPr>
-                        </m:ctrlPr>
-                      </m:sSupPr>
-                      <m:e>
-                        <m:r>
-                          <a:rPr lang="en-US" i="1">
-                            <a:latin typeface="Cambria Math" panose="02040503050406030204" pitchFamily="18" charset="0"/>
-                          </a:rPr>
-                          <m:t>𝜇</m:t>
-                        </m:r>
-                      </m:e>
-                      <m:sup>
-                        <m:r>
-                          <m:rPr>
-                            <m:nor/>
-                          </m:rPr>
-                          <a:rPr lang="en-US">
-                            <a:latin typeface="Cambria Math" panose="02040503050406030204" pitchFamily="18" charset="0"/>
-                          </a:rPr>
-                          <m:t>D</m:t>
-                        </m:r>
-                      </m:sup>
-                    </m:sSup>
-                    <m:d>
-                      <m:dPr>
-                        <m:ctrlPr>
-                          <a:rPr lang="en-US" i="1">
-                            <a:latin typeface="Cambria Math" panose="02040503050406030204" pitchFamily="18" charset="0"/>
-                          </a:rPr>
-                        </m:ctrlPr>
-                      </m:dPr>
-                      <m:e>
-                        <m:r>
-                          <a:rPr lang="en-US" i="1">
-                            <a:latin typeface="Cambria Math" panose="02040503050406030204" pitchFamily="18" charset="0"/>
-                          </a:rPr>
-                          <m:t>𝟙</m:t>
-                        </m:r>
-                      </m:e>
-                    </m:d>
-                    <m:r>
-                      <a:rPr lang="en-US" i="1">
-                        <a:latin typeface="Cambria Math" panose="02040503050406030204" pitchFamily="18" charset="0"/>
-                      </a:rPr>
-                      <m:t>=</m:t>
-                    </m:r>
-                    <m:r>
-                      <a:rPr lang="en-US" b="0" i="1" smtClean="0">
-                        <a:latin typeface="Cambria Math" panose="02040503050406030204" pitchFamily="18" charset="0"/>
-                      </a:rPr>
-                      <m:t>1</m:t>
-                    </m:r>
-                  </m:oMath>
-                </a14:m>
-                <a:r>
-                  <a:rPr lang="en-US" dirty="0"/>
-                  <a:t>, where</a:t>
-                </a:r>
-                <a:r>
-                  <a:rPr lang="en-US" dirty="0" smtClean="0"/>
-                  <a:t> </a:t>
-                </a:r>
-                <a14:m>
-                  <m:oMath xmlns:m="http://schemas.openxmlformats.org/officeDocument/2006/math">
-                    <m:r>
-                      <a:rPr lang="en-US" i="1">
-                        <a:latin typeface="Cambria Math" panose="02040503050406030204" pitchFamily="18" charset="0"/>
-                      </a:rPr>
-                      <m:t>𝟙</m:t>
+                      <m:t>ℐ</m:t>
                     </m:r>
                   </m:oMath>
                 </a14:m>
@@ -5790,148 +6091,102 @@
                 </a:r>
                 <a:r>
                   <a:rPr lang="en-US" dirty="0"/>
-                  <a:t>is the </a:t>
+                  <a:t>closed </a:t>
                 </a:r>
                 <a:r>
                   <a:rPr lang="en-US" dirty="0" smtClean="0"/>
-                  <a:t>identity </a:t>
+                  <a:t>to </a:t>
                 </a:r>
-                <a:r>
-                  <a:rPr lang="en-US" dirty="0"/>
-                  <a:t>matrix</a:t>
-                </a:r>
-                <a:r>
-                  <a:rPr lang="en-US" dirty="0" smtClean="0"/>
-                  <a:t>.</a:t>
-                </a:r>
-              </a:p>
-              <a:p>
-                <a:pPr lvl="1"/>
                 <a14:m>
                   <m:oMath xmlns:m="http://schemas.openxmlformats.org/officeDocument/2006/math">
-                    <m:sSup>
-                      <m:sSupPr>
+                    <m:d>
+                      <m:dPr>
+                        <m:begChr m:val="{"/>
+                        <m:endChr m:val="}"/>
                         <m:ctrlPr>
                           <a:rPr lang="en-US" i="1">
                             <a:latin typeface="Cambria Math" panose="02040503050406030204" pitchFamily="18" charset="0"/>
-                          </a:rPr>
-                        </m:ctrlPr>
-                      </m:sSupPr>
-                      <m:e>
-                        <m:r>
-                          <a:rPr lang="en-US" i="1">
-                            <a:latin typeface="Cambria Math" panose="02040503050406030204" pitchFamily="18" charset="0"/>
-                          </a:rPr>
-                          <m:t>𝜇</m:t>
-                        </m:r>
-                      </m:e>
-                      <m:sup>
-                        <m:r>
-                          <m:rPr>
-                            <m:nor/>
-                          </m:rPr>
-                          <a:rPr lang="en-US">
-                            <a:latin typeface="Cambria Math" panose="02040503050406030204" pitchFamily="18" charset="0"/>
-                          </a:rPr>
-                          <m:t>D</m:t>
-                        </m:r>
-                      </m:sup>
-                    </m:sSup>
-                    <m:d>
-                      <m:dPr>
-                        <m:ctrlPr>
-                          <a:rPr lang="en-US" i="1">
-                            <a:latin typeface="Cambria Math" panose="02040503050406030204" pitchFamily="18" charset="0"/>
+                            <a:ea typeface="Cambria Math" panose="02040503050406030204" pitchFamily="18" charset="0"/>
                           </a:rPr>
                         </m:ctrlPr>
                       </m:dPr>
                       <m:e>
+                        <m:d>
+                          <m:dPr>
+                            <m:begChr m:val="["/>
+                            <m:endChr m:val="]"/>
+                            <m:ctrlPr>
+                              <a:rPr lang="en-US" i="1">
+                                <a:latin typeface="Cambria Math" panose="02040503050406030204" pitchFamily="18" charset="0"/>
+                              </a:rPr>
+                            </m:ctrlPr>
+                          </m:dPr>
+                          <m:e>
+                            <m:r>
+                              <a:rPr lang="en-US" i="1">
+                                <a:latin typeface="Cambria Math" panose="02040503050406030204" pitchFamily="18" charset="0"/>
+                              </a:rPr>
+                              <m:t>0,0</m:t>
+                            </m:r>
+                          </m:e>
+                        </m:d>
                         <m:r>
                           <a:rPr lang="en-US" i="1">
                             <a:latin typeface="Cambria Math" panose="02040503050406030204" pitchFamily="18" charset="0"/>
-                          </a:rPr>
-                          <m:t>𝟙</m:t>
+                            <a:ea typeface="Cambria Math" panose="02040503050406030204" pitchFamily="18" charset="0"/>
+                          </a:rPr>
+                          <m:t>,</m:t>
                         </m:r>
-                        <m:r>
-                          <a:rPr lang="en-US" b="0" i="1" smtClean="0">
-                            <a:latin typeface="Cambria Math" panose="02040503050406030204" pitchFamily="18" charset="0"/>
-                          </a:rPr>
-                          <m:t>−</m:t>
-                        </m:r>
-                        <m:r>
-                          <a:rPr lang="en-US" b="0" i="1" smtClean="0">
-                            <a:latin typeface="Cambria Math" panose="02040503050406030204" pitchFamily="18" charset="0"/>
-                          </a:rPr>
-                          <m:t>𝑃</m:t>
-                        </m:r>
-                      </m:e>
-                    </m:d>
-                    <m:r>
-                      <a:rPr lang="en-US" i="1">
-                        <a:latin typeface="Cambria Math" panose="02040503050406030204" pitchFamily="18" charset="0"/>
-                      </a:rPr>
-                      <m:t>=1</m:t>
-                    </m:r>
-                    <m:r>
-                      <a:rPr lang="en-US" b="0" i="1" smtClean="0">
-                        <a:latin typeface="Cambria Math" panose="02040503050406030204" pitchFamily="18" charset="0"/>
-                      </a:rPr>
-                      <m:t>−</m:t>
-                    </m:r>
-                    <m:sSup>
-                      <m:sSupPr>
-                        <m:ctrlPr>
-                          <a:rPr lang="en-US" i="1">
-                            <a:latin typeface="Cambria Math" panose="02040503050406030204" pitchFamily="18" charset="0"/>
-                          </a:rPr>
-                        </m:ctrlPr>
-                      </m:sSupPr>
-                      <m:e>
-                        <m:r>
-                          <a:rPr lang="en-US" i="1">
-                            <a:latin typeface="Cambria Math" panose="02040503050406030204" pitchFamily="18" charset="0"/>
-                          </a:rPr>
-                          <m:t>𝜇</m:t>
-                        </m:r>
-                      </m:e>
-                      <m:sup>
-                        <m:r>
-                          <m:rPr>
-                            <m:nor/>
-                          </m:rPr>
-                          <a:rPr lang="en-US">
-                            <a:latin typeface="Cambria Math" panose="02040503050406030204" pitchFamily="18" charset="0"/>
-                          </a:rPr>
-                          <m:t>D</m:t>
-                        </m:r>
-                      </m:sup>
-                    </m:sSup>
-                    <m:d>
-                      <m:dPr>
-                        <m:ctrlPr>
-                          <a:rPr lang="en-US" i="1">
-                            <a:latin typeface="Cambria Math" panose="02040503050406030204" pitchFamily="18" charset="0"/>
-                          </a:rPr>
-                        </m:ctrlPr>
-                      </m:dPr>
-                      <m:e>
-                        <m:r>
-                          <a:rPr lang="en-US" i="1">
-                            <a:latin typeface="Cambria Math" panose="02040503050406030204" pitchFamily="18" charset="0"/>
-                          </a:rPr>
-                          <m:t>𝑃</m:t>
-                        </m:r>
+                        <m:d>
+                          <m:dPr>
+                            <m:begChr m:val="["/>
+                            <m:endChr m:val="]"/>
+                            <m:ctrlPr>
+                              <a:rPr lang="en-US" i="1">
+                                <a:latin typeface="Cambria Math" panose="02040503050406030204" pitchFamily="18" charset="0"/>
+                              </a:rPr>
+                            </m:ctrlPr>
+                          </m:dPr>
+                          <m:e>
+                            <m:r>
+                              <a:rPr lang="en-US" i="1">
+                                <a:latin typeface="Cambria Math" panose="02040503050406030204" pitchFamily="18" charset="0"/>
+                              </a:rPr>
+                              <m:t>1,1</m:t>
+                            </m:r>
+                          </m:e>
+                        </m:d>
                       </m:e>
                     </m:d>
                   </m:oMath>
                 </a14:m>
                 <a:r>
                   <a:rPr lang="en-US" dirty="0" smtClean="0"/>
-                  <a:t> for any projector</a:t>
+                  <a:t>, i.e., given </a:t>
                 </a:r>
                 <a:r>
                   <a:rPr lang="en-US" dirty="0"/>
-                  <a:t> </a:t>
+                  <a:t>a small </a:t>
+                </a:r>
+                <a14:m>
+                  <m:oMath xmlns:m="http://schemas.openxmlformats.org/officeDocument/2006/math">
+                    <m:r>
+                      <a:rPr lang="en-US" i="1">
+                        <a:latin typeface="Cambria Math" panose="02040503050406030204" pitchFamily="18" charset="0"/>
+                      </a:rPr>
+                      <m:t>𝛿</m:t>
+                    </m:r>
+                    <m:r>
+                      <a:rPr lang="en-US" i="1">
+                        <a:latin typeface="Cambria Math" panose="02040503050406030204" pitchFamily="18" charset="0"/>
+                      </a:rPr>
+                      <m:t>≥0</m:t>
+                    </m:r>
+                  </m:oMath>
+                </a14:m>
+                <a:r>
+                  <a:rPr lang="en-US" dirty="0"/>
+                  <a:t>, we want for any projector </a:t>
                 </a:r>
                 <a14:m>
                   <m:oMath xmlns:m="http://schemas.openxmlformats.org/officeDocument/2006/math">
@@ -5944,131 +6199,45 @@
                   </m:oMath>
                 </a14:m>
                 <a:r>
-                  <a:rPr lang="en-US" dirty="0" smtClean="0"/>
-                  <a:t>.</a:t>
+                  <a:rPr lang="en-US" dirty="0"/>
+                  <a:t>, </a:t>
                 </a:r>
-              </a:p>
-              <a:p>
-                <a:pPr lvl="1"/>
-                <a:r>
-                  <a:rPr lang="en-US" dirty="0" smtClean="0"/>
-                  <a:t>For </a:t>
-                </a:r>
-                <a:r>
+                <a:br>
                   <a:rPr lang="en-US" dirty="0"/>
-                  <a:t>any </a:t>
-                </a:r>
-                <a:r>
-                  <a:rPr lang="en-US" i="1" dirty="0" smtClean="0"/>
-                  <a:t>orthogonal</a:t>
-                </a:r>
-                <a:r>
-                  <a:rPr lang="en-US" dirty="0" smtClean="0"/>
-                  <a:t> projector</a:t>
-                </a:r>
-                <a:r>
-                  <a:rPr lang="en-US" dirty="0"/>
-                  <a:t> </a:t>
-                </a:r>
+                </a:br>
                 <a14:m>
                   <m:oMath xmlns:m="http://schemas.openxmlformats.org/officeDocument/2006/math">
-                    <m:sSub>
-                      <m:sSubPr>
+                    <m:r>
+                      <m:rPr>
+                        <m:nor/>
+                      </m:rPr>
+                      <a:rPr lang="en-US" dirty="0"/>
+                      <m:t>either</m:t>
+                    </m:r>
+                    <m:r>
+                      <a:rPr lang="en-US" i="1" dirty="0">
+                        <a:latin typeface="Cambria Math" panose="02040503050406030204" pitchFamily="18" charset="0"/>
+                      </a:rPr>
+                      <m:t> </m:t>
+                    </m:r>
+                    <m:acc>
+                      <m:accPr>
+                        <m:chr m:val="̅"/>
                         <m:ctrlPr>
-                          <a:rPr lang="en-US" b="0" i="1" smtClean="0">
+                          <a:rPr lang="en-US" i="1">
                             <a:latin typeface="Cambria Math" panose="02040503050406030204" pitchFamily="18" charset="0"/>
                           </a:rPr>
                         </m:ctrlPr>
-                      </m:sSubPr>
+                      </m:accPr>
                       <m:e>
                         <m:r>
                           <a:rPr lang="en-US" i="1">
                             <a:latin typeface="Cambria Math" panose="02040503050406030204" pitchFamily="18" charset="0"/>
                           </a:rPr>
-                          <m:t>𝑃</m:t>
-                        </m:r>
-                      </m:e>
-                      <m:sub>
-                        <m:r>
-                          <a:rPr lang="en-US" b="0" i="1" smtClean="0">
-                            <a:latin typeface="Cambria Math" panose="02040503050406030204" pitchFamily="18" charset="0"/>
-                          </a:rPr>
-                          <m:t>0</m:t>
-                        </m:r>
-                      </m:sub>
-                    </m:sSub>
-                  </m:oMath>
-                </a14:m>
-                <a:r>
-                  <a:rPr lang="en-US" dirty="0" smtClean="0"/>
-                  <a:t> and </a:t>
-                </a:r>
-                <a14:m>
-                  <m:oMath xmlns:m="http://schemas.openxmlformats.org/officeDocument/2006/math">
-                    <m:sSub>
-                      <m:sSubPr>
-                        <m:ctrlPr>
-                          <a:rPr lang="en-US" i="1">
-                            <a:latin typeface="Cambria Math" panose="02040503050406030204" pitchFamily="18" charset="0"/>
-                          </a:rPr>
-                        </m:ctrlPr>
-                      </m:sSubPr>
-                      <m:e>
-                        <m:r>
-                          <a:rPr lang="en-US" i="1">
-                            <a:latin typeface="Cambria Math" panose="02040503050406030204" pitchFamily="18" charset="0"/>
-                          </a:rPr>
-                          <m:t>𝑃</m:t>
-                        </m:r>
-                      </m:e>
-                      <m:sub>
-                        <m:r>
-                          <a:rPr lang="en-US" b="0" i="1" smtClean="0">
-                            <a:latin typeface="Cambria Math" panose="02040503050406030204" pitchFamily="18" charset="0"/>
-                          </a:rPr>
-                          <m:t>1</m:t>
-                        </m:r>
-                      </m:sub>
-                    </m:sSub>
-                  </m:oMath>
-                </a14:m>
-                <a:r>
-                  <a:rPr lang="en-US" dirty="0" smtClean="0"/>
-                  <a:t>, we have</a:t>
-                </a:r>
-                <a:br>
-                  <a:rPr lang="en-US" dirty="0" smtClean="0"/>
-                </a:br>
-                <a14:m>
-                  <m:oMath xmlns:m="http://schemas.openxmlformats.org/officeDocument/2006/math">
-                    <m:sSup>
-                      <m:sSupPr>
-                        <m:ctrlPr>
-                          <a:rPr lang="en-US" i="1" smtClean="0">
-                            <a:latin typeface="Cambria Math" panose="02040503050406030204" pitchFamily="18" charset="0"/>
-                          </a:rPr>
-                        </m:ctrlPr>
-                      </m:sSupPr>
-                      <m:e>
-                        <m:r>
-                          <a:rPr lang="en-US" i="1" smtClean="0">
-                            <a:latin typeface="Cambria Math" panose="02040503050406030204" pitchFamily="18" charset="0"/>
-                          </a:rPr>
                           <m:t>𝜇</m:t>
                         </m:r>
                       </m:e>
-                      <m:sup>
-                        <m:r>
-                          <m:rPr>
-                            <m:nor/>
-                          </m:rPr>
-                          <a:rPr lang="en-US">
-                            <a:latin typeface="Cambria Math" panose="02040503050406030204" pitchFamily="18" charset="0"/>
-                          </a:rPr>
-                          <m:t>D</m:t>
-                        </m:r>
-                      </m:sup>
-                    </m:sSup>
+                    </m:acc>
                     <m:d>
                       <m:dPr>
                         <m:ctrlPr>
@@ -6078,244 +6247,173 @@
                         </m:ctrlPr>
                       </m:dPr>
                       <m:e>
-                        <m:sSub>
-                          <m:sSubPr>
-                            <m:ctrlPr>
-                              <a:rPr lang="en-US" i="1">
-                                <a:latin typeface="Cambria Math" panose="02040503050406030204" pitchFamily="18" charset="0"/>
-                              </a:rPr>
-                            </m:ctrlPr>
-                          </m:sSubPr>
-                          <m:e>
-                            <m:r>
-                              <a:rPr lang="en-US" i="1">
-                                <a:latin typeface="Cambria Math" panose="02040503050406030204" pitchFamily="18" charset="0"/>
-                              </a:rPr>
-                              <m:t>𝑃</m:t>
-                            </m:r>
-                          </m:e>
-                          <m:sub>
-                            <m:r>
-                              <a:rPr lang="en-US" i="1">
-                                <a:latin typeface="Cambria Math" panose="02040503050406030204" pitchFamily="18" charset="0"/>
-                              </a:rPr>
-                              <m:t>0</m:t>
-                            </m:r>
-                          </m:sub>
-                        </m:sSub>
                         <m:r>
-                          <a:rPr lang="en-US" b="0" i="1" smtClean="0">
-                            <a:latin typeface="Cambria Math" panose="02040503050406030204" pitchFamily="18" charset="0"/>
-                          </a:rPr>
-                          <m:t>+</m:t>
+                          <a:rPr lang="en-US" i="1">
+                            <a:latin typeface="Cambria Math" panose="02040503050406030204" pitchFamily="18" charset="0"/>
+                          </a:rPr>
+                          <m:t>𝑃</m:t>
                         </m:r>
-                        <m:sSub>
-                          <m:sSubPr>
-                            <m:ctrlPr>
-                              <a:rPr lang="en-US" i="1">
-                                <a:latin typeface="Cambria Math" panose="02040503050406030204" pitchFamily="18" charset="0"/>
-                              </a:rPr>
-                            </m:ctrlPr>
-                          </m:sSubPr>
-                          <m:e>
-                            <m:r>
-                              <a:rPr lang="en-US" i="1">
-                                <a:latin typeface="Cambria Math" panose="02040503050406030204" pitchFamily="18" charset="0"/>
-                              </a:rPr>
-                              <m:t>𝑃</m:t>
-                            </m:r>
-                          </m:e>
-                          <m:sub>
-                            <m:r>
-                              <a:rPr lang="en-US" b="0" i="1" smtClean="0">
-                                <a:latin typeface="Cambria Math" panose="02040503050406030204" pitchFamily="18" charset="0"/>
-                              </a:rPr>
-                              <m:t>1</m:t>
-                            </m:r>
-                          </m:sub>
-                        </m:sSub>
                       </m:e>
                     </m:d>
                     <m:r>
                       <a:rPr lang="en-US" i="1">
                         <a:latin typeface="Cambria Math" panose="02040503050406030204" pitchFamily="18" charset="0"/>
                       </a:rPr>
-                      <m:t>=</m:t>
+                      <m:t>⊆</m:t>
                     </m:r>
-                    <m:sSup>
-                      <m:sSupPr>
+                    <m:d>
+                      <m:dPr>
+                        <m:begChr m:val="["/>
+                        <m:endChr m:val="]"/>
                         <m:ctrlPr>
                           <a:rPr lang="en-US" i="1">
                             <a:latin typeface="Cambria Math" panose="02040503050406030204" pitchFamily="18" charset="0"/>
                           </a:rPr>
                         </m:ctrlPr>
-                      </m:sSupPr>
+                      </m:dPr>
                       <m:e>
                         <m:r>
                           <a:rPr lang="en-US" i="1">
                             <a:latin typeface="Cambria Math" panose="02040503050406030204" pitchFamily="18" charset="0"/>
                           </a:rPr>
-                          <m:t>𝜇</m:t>
+                          <m:t>0,</m:t>
                         </m:r>
-                      </m:e>
-                      <m:sup>
                         <m:r>
-                          <m:rPr>
-                            <m:nor/>
-                          </m:rPr>
-                          <a:rPr lang="en-US">
-                            <a:latin typeface="Cambria Math" panose="02040503050406030204" pitchFamily="18" charset="0"/>
-                          </a:rPr>
-                          <m:t>D</m:t>
+                          <a:rPr lang="en-US" i="1">
+                            <a:latin typeface="Cambria Math" panose="02040503050406030204" pitchFamily="18" charset="0"/>
+                          </a:rPr>
+                          <m:t>𝛿</m:t>
                         </m:r>
-                      </m:sup>
-                    </m:sSup>
-                    <m:d>
-                      <m:dPr>
-                        <m:ctrlPr>
-                          <a:rPr lang="en-US" i="1">
-                            <a:latin typeface="Cambria Math" panose="02040503050406030204" pitchFamily="18" charset="0"/>
-                          </a:rPr>
-                        </m:ctrlPr>
-                      </m:dPr>
-                      <m:e>
-                        <m:sSub>
-                          <m:sSubPr>
-                            <m:ctrlPr>
-                              <a:rPr lang="en-US" b="0" i="1" smtClean="0">
-                                <a:latin typeface="Cambria Math" panose="02040503050406030204" pitchFamily="18" charset="0"/>
-                              </a:rPr>
-                            </m:ctrlPr>
-                          </m:sSubPr>
-                          <m:e>
-                            <m:r>
-                              <a:rPr lang="en-US" i="1">
-                                <a:latin typeface="Cambria Math" panose="02040503050406030204" pitchFamily="18" charset="0"/>
-                              </a:rPr>
-                              <m:t>𝑃</m:t>
-                            </m:r>
-                          </m:e>
-                          <m:sub>
-                            <m:r>
-                              <a:rPr lang="en-US" b="0" i="1" smtClean="0">
-                                <a:latin typeface="Cambria Math" panose="02040503050406030204" pitchFamily="18" charset="0"/>
-                              </a:rPr>
-                              <m:t>0</m:t>
-                            </m:r>
-                          </m:sub>
-                        </m:sSub>
                       </m:e>
                     </m:d>
                     <m:r>
-                      <a:rPr lang="en-US" b="0" i="1" smtClean="0">
+                      <m:rPr>
+                        <m:nor/>
+                      </m:rPr>
+                      <a:rPr lang="en-US">
                         <a:latin typeface="Cambria Math" panose="02040503050406030204" pitchFamily="18" charset="0"/>
                       </a:rPr>
-                      <m:t>+</m:t>
-                    </m:r>
-                    <m:sSup>
-                      <m:sSupPr>
-                        <m:ctrlPr>
-                          <a:rPr lang="en-US" i="1">
-                            <a:latin typeface="Cambria Math" panose="02040503050406030204" pitchFamily="18" charset="0"/>
-                          </a:rPr>
-                        </m:ctrlPr>
-                      </m:sSupPr>
-                      <m:e>
-                        <m:r>
-                          <a:rPr lang="en-US" i="1">
-                            <a:latin typeface="Cambria Math" panose="02040503050406030204" pitchFamily="18" charset="0"/>
-                          </a:rPr>
-                          <m:t>𝜇</m:t>
-                        </m:r>
-                      </m:e>
-                      <m:sup>
-                        <m:r>
-                          <m:rPr>
-                            <m:nor/>
-                          </m:rPr>
-                          <a:rPr lang="en-US">
-                            <a:latin typeface="Cambria Math" panose="02040503050406030204" pitchFamily="18" charset="0"/>
-                          </a:rPr>
-                          <m:t>D</m:t>
-                        </m:r>
-                      </m:sup>
-                    </m:sSup>
-                    <m:d>
-                      <m:dPr>
-                        <m:ctrlPr>
-                          <a:rPr lang="en-US" i="1">
-                            <a:latin typeface="Cambria Math" panose="02040503050406030204" pitchFamily="18" charset="0"/>
-                          </a:rPr>
-                        </m:ctrlPr>
-                      </m:dPr>
-                      <m:e>
-                        <m:sSub>
-                          <m:sSubPr>
-                            <m:ctrlPr>
-                              <a:rPr lang="en-US" b="0" i="1" smtClean="0">
-                                <a:latin typeface="Cambria Math" panose="02040503050406030204" pitchFamily="18" charset="0"/>
-                              </a:rPr>
-                            </m:ctrlPr>
-                          </m:sSubPr>
-                          <m:e>
-                            <m:r>
-                              <a:rPr lang="en-US" i="1">
-                                <a:latin typeface="Cambria Math" panose="02040503050406030204" pitchFamily="18" charset="0"/>
-                              </a:rPr>
-                              <m:t>𝑃</m:t>
-                            </m:r>
-                          </m:e>
-                          <m:sub>
-                            <m:r>
-                              <a:rPr lang="en-US" b="0" i="1" smtClean="0">
-                                <a:latin typeface="Cambria Math" panose="02040503050406030204" pitchFamily="18" charset="0"/>
-                              </a:rPr>
-                              <m:t>1</m:t>
-                            </m:r>
-                          </m:sub>
-                        </m:sSub>
-                      </m:e>
-                    </m:d>
-                    <m:r>
-                      <a:rPr lang="en-US" b="0" i="1" smtClean="0">
-                        <a:latin typeface="Cambria Math" panose="02040503050406030204" pitchFamily="18" charset="0"/>
-                      </a:rPr>
-                      <m:t> .</m:t>
+                      <m:t> </m:t>
                     </m:r>
                     <m:r>
                       <m:rPr>
                         <m:nor/>
                       </m:rPr>
                       <a:rPr lang="en-US" dirty="0"/>
-                      <m:t>	</m:t>
+                      <m:t>or</m:t>
+                    </m:r>
+                    <m:r>
+                      <a:rPr lang="en-US" i="1" dirty="0">
+                        <a:latin typeface="Cambria Math" panose="02040503050406030204" pitchFamily="18" charset="0"/>
+                      </a:rPr>
+                      <m:t> </m:t>
+                    </m:r>
+                    <m:acc>
+                      <m:accPr>
+                        <m:chr m:val="̅"/>
+                        <m:ctrlPr>
+                          <a:rPr lang="en-US" i="1">
+                            <a:latin typeface="Cambria Math" panose="02040503050406030204" pitchFamily="18" charset="0"/>
+                          </a:rPr>
+                        </m:ctrlPr>
+                      </m:accPr>
+                      <m:e>
+                        <m:r>
+                          <a:rPr lang="en-US" i="1">
+                            <a:latin typeface="Cambria Math" panose="02040503050406030204" pitchFamily="18" charset="0"/>
+                          </a:rPr>
+                          <m:t>𝜇</m:t>
+                        </m:r>
+                      </m:e>
+                    </m:acc>
+                    <m:d>
+                      <m:dPr>
+                        <m:ctrlPr>
+                          <a:rPr lang="en-US" i="1">
+                            <a:latin typeface="Cambria Math" panose="02040503050406030204" pitchFamily="18" charset="0"/>
+                          </a:rPr>
+                        </m:ctrlPr>
+                      </m:dPr>
+                      <m:e>
+                        <m:r>
+                          <a:rPr lang="en-US" i="1">
+                            <a:latin typeface="Cambria Math" panose="02040503050406030204" pitchFamily="18" charset="0"/>
+                          </a:rPr>
+                          <m:t>𝑃</m:t>
+                        </m:r>
+                      </m:e>
+                    </m:d>
+                    <m:r>
+                      <a:rPr lang="en-US" i="1">
+                        <a:latin typeface="Cambria Math" panose="02040503050406030204" pitchFamily="18" charset="0"/>
+                      </a:rPr>
+                      <m:t>⊆</m:t>
+                    </m:r>
+                    <m:d>
+                      <m:dPr>
+                        <m:begChr m:val="["/>
+                        <m:endChr m:val="]"/>
+                        <m:ctrlPr>
+                          <a:rPr lang="en-US" i="1">
+                            <a:latin typeface="Cambria Math" panose="02040503050406030204" pitchFamily="18" charset="0"/>
+                          </a:rPr>
+                        </m:ctrlPr>
+                      </m:dPr>
+                      <m:e>
+                        <m:r>
+                          <a:rPr lang="en-US" i="1">
+                            <a:latin typeface="Cambria Math" panose="02040503050406030204" pitchFamily="18" charset="0"/>
+                          </a:rPr>
+                          <m:t>1−</m:t>
+                        </m:r>
+                        <m:r>
+                          <a:rPr lang="en-US" i="1">
+                            <a:latin typeface="Cambria Math" panose="02040503050406030204" pitchFamily="18" charset="0"/>
+                          </a:rPr>
+                          <m:t>𝛿</m:t>
+                        </m:r>
+                        <m:r>
+                          <a:rPr lang="en-US" i="1">
+                            <a:latin typeface="Cambria Math" panose="02040503050406030204" pitchFamily="18" charset="0"/>
+                          </a:rPr>
+                          <m:t>,1</m:t>
+                        </m:r>
+                      </m:e>
+                    </m:d>
+                    <m:r>
+                      <a:rPr lang="en-US" i="1" smtClean="0">
+                        <a:latin typeface="Cambria Math" panose="02040503050406030204" pitchFamily="18" charset="0"/>
+                      </a:rPr>
+                      <m:t> .</m:t>
                     </m:r>
                   </m:oMath>
                 </a14:m>
-                <a:endParaRPr lang="en-US" dirty="0"/>
-              </a:p>
-              <a:p>
-                <a:pPr lvl="1"/>
-                <a:endParaRPr lang="en-US" dirty="0"/>
+                <a:endParaRPr lang="en-US" dirty="0" smtClean="0"/>
               </a:p>
             </p:txBody>
           </p:sp>
         </mc:Choice>
-        <mc:Fallback xmlns="">
+        <mc:Fallback>
           <p:sp>
             <p:nvSpPr>
-              <p:cNvPr id="3" name="Content Placeholder 2"/>
-              <p:cNvSpPr>
-                <a:spLocks noGrp="1" noRot="1" noChangeAspect="1" noMove="1" noResize="1" noEditPoints="1" noAdjustHandles="1" noChangeArrowheads="1" noChangeShapeType="1" noTextEdit="1"/>
+              <p:cNvPr id="5" name="Content Placeholder 2"/>
+              <p:cNvSpPr txBox="1">
+                <a:spLocks noRot="1" noChangeAspect="1" noMove="1" noResize="1" noEditPoints="1" noAdjustHandles="1" noChangeArrowheads="1" noChangeShapeType="1" noTextEdit="1"/>
               </p:cNvSpPr>
-              <p:nvPr>
-                <p:ph idx="1"/>
-              </p:nvPr>
+              <p:nvPr/>
             </p:nvSpPr>
             <p:spPr>
+              <a:xfrm>
+                <a:off x="838200" y="4446905"/>
+                <a:ext cx="10515600" cy="1405255"/>
+              </a:xfrm>
+              <a:prstGeom prst="rect">
+                <a:avLst/>
+              </a:prstGeom>
               <a:blipFill rotWithShape="0">
-                <a:blip r:embed="rId3"/>
+                <a:blip r:embed="rId4"/>
                 <a:stretch>
-                  <a:fillRect l="-1043" t="-700" r="-1449"/>
+                  <a:fillRect l="-1043" t="-6926"/>
                 </a:stretch>
               </a:blipFill>
             </p:spPr>
@@ -6387,1639 +6485,6 @@
           <a:lstStyle/>
           <a:p>
             <a:r>
-              <a:rPr lang="en-US" dirty="0" smtClean="0"/>
-              <a:t>Finite Precision Measurement</a:t>
-            </a:r>
-            <a:endParaRPr lang="en-US" dirty="0"/>
-          </a:p>
-        </p:txBody>
-      </p:sp>
-      <mc:AlternateContent xmlns:mc="http://schemas.openxmlformats.org/markup-compatibility/2006" xmlns:a14="http://schemas.microsoft.com/office/drawing/2010/main">
-        <mc:Choice Requires="a14">
-          <p:sp>
-            <p:nvSpPr>
-              <p:cNvPr id="3" name="Content Placeholder 2"/>
-              <p:cNvSpPr>
-                <a:spLocks noGrp="1"/>
-              </p:cNvSpPr>
-              <p:nvPr>
-                <p:ph idx="1"/>
-              </p:nvPr>
-            </p:nvSpPr>
-            <p:spPr/>
-            <p:txBody>
-              <a:bodyPr>
-                <a:normAutofit lnSpcReduction="10000"/>
-              </a:bodyPr>
-              <a:lstStyle/>
-              <a:p>
-                <a:r>
-                  <a:rPr lang="en-US" dirty="0" smtClean="0"/>
-                  <a:t>Relax </a:t>
-                </a:r>
-                <a14:m>
-                  <m:oMath xmlns:m="http://schemas.openxmlformats.org/officeDocument/2006/math">
-                    <m:d>
-                      <m:dPr>
-                        <m:begChr m:val="{"/>
-                        <m:endChr m:val="}"/>
-                        <m:ctrlPr>
-                          <a:rPr lang="en-US" i="1">
-                            <a:latin typeface="Cambria Math" panose="02040503050406030204" pitchFamily="18" charset="0"/>
-                            <a:ea typeface="Cambria Math" panose="02040503050406030204" pitchFamily="18" charset="0"/>
-                          </a:rPr>
-                        </m:ctrlPr>
-                      </m:dPr>
-                      <m:e>
-                        <m:r>
-                          <a:rPr lang="en-US" i="1">
-                            <a:latin typeface="Cambria Math" panose="02040503050406030204" pitchFamily="18" charset="0"/>
-                            <a:ea typeface="Cambria Math" panose="02040503050406030204" pitchFamily="18" charset="0"/>
-                          </a:rPr>
-                          <m:t>0,1</m:t>
-                        </m:r>
-                      </m:e>
-                    </m:d>
-                  </m:oMath>
-                </a14:m>
-                <a:r>
-                  <a:rPr lang="en-US" dirty="0" smtClean="0"/>
-                  <a:t> to a set of intervals</a:t>
-                </a:r>
-                <a:r>
-                  <a:rPr lang="en-US" dirty="0"/>
-                  <a:t> </a:t>
-                </a:r>
-                <a14:m>
-                  <m:oMath xmlns:m="http://schemas.openxmlformats.org/officeDocument/2006/math">
-                    <m:r>
-                      <m:rPr>
-                        <m:nor/>
-                      </m:rPr>
-                      <a:rPr lang="en-US" dirty="0">
-                        <a:latin typeface="XITS Math" panose="02000503000000000000" pitchFamily="50" charset="0"/>
-                        <a:ea typeface="XITS Math" panose="02000503000000000000" pitchFamily="50" charset="0"/>
-                        <a:cs typeface="XITS Math" panose="02000503000000000000" pitchFamily="50" charset="0"/>
-                      </a:rPr>
-                      <m:t>ℐ</m:t>
-                    </m:r>
-                  </m:oMath>
-                </a14:m>
-                <a:r>
-                  <a:rPr lang="en-US" dirty="0" smtClean="0"/>
-                  <a:t> </a:t>
-                </a:r>
-                <a:r>
-                  <a:rPr lang="en-US" dirty="0"/>
-                  <a:t>closed to </a:t>
-                </a:r>
-                <a14:m>
-                  <m:oMath xmlns:m="http://schemas.openxmlformats.org/officeDocument/2006/math">
-                    <m:d>
-                      <m:dPr>
-                        <m:begChr m:val="{"/>
-                        <m:endChr m:val="}"/>
-                        <m:ctrlPr>
-                          <a:rPr lang="en-US" i="1">
-                            <a:latin typeface="Cambria Math" panose="02040503050406030204" pitchFamily="18" charset="0"/>
-                            <a:ea typeface="Cambria Math" panose="02040503050406030204" pitchFamily="18" charset="0"/>
-                          </a:rPr>
-                        </m:ctrlPr>
-                      </m:dPr>
-                      <m:e>
-                        <m:r>
-                          <a:rPr lang="en-US" i="1">
-                            <a:latin typeface="Cambria Math" panose="02040503050406030204" pitchFamily="18" charset="0"/>
-                            <a:ea typeface="Cambria Math" panose="02040503050406030204" pitchFamily="18" charset="0"/>
-                          </a:rPr>
-                          <m:t>0,1</m:t>
-                        </m:r>
-                      </m:e>
-                    </m:d>
-                  </m:oMath>
-                </a14:m>
-                <a:r>
-                  <a:rPr lang="en-US" dirty="0" smtClean="0"/>
-                  <a:t>, i.e., given </a:t>
-                </a:r>
-                <a:r>
-                  <a:rPr lang="en-US" dirty="0"/>
-                  <a:t>a small </a:t>
-                </a:r>
-                <a14:m>
-                  <m:oMath xmlns:m="http://schemas.openxmlformats.org/officeDocument/2006/math">
-                    <m:r>
-                      <a:rPr lang="en-US" i="1">
-                        <a:latin typeface="Cambria Math" panose="02040503050406030204" pitchFamily="18" charset="0"/>
-                      </a:rPr>
-                      <m:t>𝛿</m:t>
-                    </m:r>
-                    <m:r>
-                      <a:rPr lang="en-US" i="1">
-                        <a:latin typeface="Cambria Math" panose="02040503050406030204" pitchFamily="18" charset="0"/>
-                      </a:rPr>
-                      <m:t>≥0</m:t>
-                    </m:r>
-                  </m:oMath>
-                </a14:m>
-                <a:r>
-                  <a:rPr lang="en-US" dirty="0"/>
-                  <a:t>, we want for any projector </a:t>
-                </a:r>
-                <a14:m>
-                  <m:oMath xmlns:m="http://schemas.openxmlformats.org/officeDocument/2006/math">
-                    <m:r>
-                      <a:rPr lang="en-US" i="1">
-                        <a:latin typeface="Cambria Math" panose="02040503050406030204" pitchFamily="18" charset="0"/>
-                      </a:rPr>
-                      <m:t>𝑃</m:t>
-                    </m:r>
-                  </m:oMath>
-                </a14:m>
-                <a:r>
-                  <a:rPr lang="en-US" dirty="0"/>
-                  <a:t>, </a:t>
-                </a:r>
-                <a:br>
-                  <a:rPr lang="en-US" dirty="0"/>
-                </a:br>
-                <a14:m>
-                  <m:oMath xmlns:m="http://schemas.openxmlformats.org/officeDocument/2006/math">
-                    <m:r>
-                      <m:rPr>
-                        <m:nor/>
-                      </m:rPr>
-                      <a:rPr lang="en-US" dirty="0"/>
-                      <m:t>either</m:t>
-                    </m:r>
-                    <m:r>
-                      <a:rPr lang="en-US" i="1" dirty="0">
-                        <a:latin typeface="Cambria Math" panose="02040503050406030204" pitchFamily="18" charset="0"/>
-                      </a:rPr>
-                      <m:t> </m:t>
-                    </m:r>
-                    <m:acc>
-                      <m:accPr>
-                        <m:chr m:val="̅"/>
-                        <m:ctrlPr>
-                          <a:rPr lang="en-US" i="1">
-                            <a:latin typeface="Cambria Math" panose="02040503050406030204" pitchFamily="18" charset="0"/>
-                          </a:rPr>
-                        </m:ctrlPr>
-                      </m:accPr>
-                      <m:e>
-                        <m:r>
-                          <a:rPr lang="en-US" i="1">
-                            <a:latin typeface="Cambria Math" panose="02040503050406030204" pitchFamily="18" charset="0"/>
-                          </a:rPr>
-                          <m:t>𝜇</m:t>
-                        </m:r>
-                      </m:e>
-                    </m:acc>
-                    <m:d>
-                      <m:dPr>
-                        <m:ctrlPr>
-                          <a:rPr lang="en-US" i="1">
-                            <a:latin typeface="Cambria Math" panose="02040503050406030204" pitchFamily="18" charset="0"/>
-                          </a:rPr>
-                        </m:ctrlPr>
-                      </m:dPr>
-                      <m:e>
-                        <m:r>
-                          <a:rPr lang="en-US" i="1">
-                            <a:latin typeface="Cambria Math" panose="02040503050406030204" pitchFamily="18" charset="0"/>
-                          </a:rPr>
-                          <m:t>𝑃</m:t>
-                        </m:r>
-                      </m:e>
-                    </m:d>
-                    <m:r>
-                      <a:rPr lang="en-US" i="1">
-                        <a:latin typeface="Cambria Math" panose="02040503050406030204" pitchFamily="18" charset="0"/>
-                      </a:rPr>
-                      <m:t>⊆</m:t>
-                    </m:r>
-                    <m:d>
-                      <m:dPr>
-                        <m:begChr m:val="["/>
-                        <m:endChr m:val="]"/>
-                        <m:ctrlPr>
-                          <a:rPr lang="en-US" i="1">
-                            <a:latin typeface="Cambria Math" panose="02040503050406030204" pitchFamily="18" charset="0"/>
-                          </a:rPr>
-                        </m:ctrlPr>
-                      </m:dPr>
-                      <m:e>
-                        <m:r>
-                          <a:rPr lang="en-US" i="1">
-                            <a:latin typeface="Cambria Math" panose="02040503050406030204" pitchFamily="18" charset="0"/>
-                          </a:rPr>
-                          <m:t>0,</m:t>
-                        </m:r>
-                        <m:r>
-                          <a:rPr lang="en-US" i="1">
-                            <a:latin typeface="Cambria Math" panose="02040503050406030204" pitchFamily="18" charset="0"/>
-                          </a:rPr>
-                          <m:t>𝛿</m:t>
-                        </m:r>
-                      </m:e>
-                    </m:d>
-                    <m:r>
-                      <m:rPr>
-                        <m:nor/>
-                      </m:rPr>
-                      <a:rPr lang="en-US">
-                        <a:latin typeface="Cambria Math" panose="02040503050406030204" pitchFamily="18" charset="0"/>
-                      </a:rPr>
-                      <m:t> </m:t>
-                    </m:r>
-                    <m:r>
-                      <m:rPr>
-                        <m:nor/>
-                      </m:rPr>
-                      <a:rPr lang="en-US" dirty="0"/>
-                      <m:t>or</m:t>
-                    </m:r>
-                    <m:r>
-                      <a:rPr lang="en-US" i="1" dirty="0">
-                        <a:latin typeface="Cambria Math" panose="02040503050406030204" pitchFamily="18" charset="0"/>
-                      </a:rPr>
-                      <m:t> </m:t>
-                    </m:r>
-                    <m:acc>
-                      <m:accPr>
-                        <m:chr m:val="̅"/>
-                        <m:ctrlPr>
-                          <a:rPr lang="en-US" i="1">
-                            <a:latin typeface="Cambria Math" panose="02040503050406030204" pitchFamily="18" charset="0"/>
-                          </a:rPr>
-                        </m:ctrlPr>
-                      </m:accPr>
-                      <m:e>
-                        <m:r>
-                          <a:rPr lang="en-US" i="1">
-                            <a:latin typeface="Cambria Math" panose="02040503050406030204" pitchFamily="18" charset="0"/>
-                          </a:rPr>
-                          <m:t>𝜇</m:t>
-                        </m:r>
-                      </m:e>
-                    </m:acc>
-                    <m:d>
-                      <m:dPr>
-                        <m:ctrlPr>
-                          <a:rPr lang="en-US" i="1">
-                            <a:latin typeface="Cambria Math" panose="02040503050406030204" pitchFamily="18" charset="0"/>
-                          </a:rPr>
-                        </m:ctrlPr>
-                      </m:dPr>
-                      <m:e>
-                        <m:r>
-                          <a:rPr lang="en-US" i="1">
-                            <a:latin typeface="Cambria Math" panose="02040503050406030204" pitchFamily="18" charset="0"/>
-                          </a:rPr>
-                          <m:t>𝑃</m:t>
-                        </m:r>
-                      </m:e>
-                    </m:d>
-                    <m:r>
-                      <a:rPr lang="en-US" i="1">
-                        <a:latin typeface="Cambria Math" panose="02040503050406030204" pitchFamily="18" charset="0"/>
-                      </a:rPr>
-                      <m:t>⊆</m:t>
-                    </m:r>
-                    <m:d>
-                      <m:dPr>
-                        <m:begChr m:val="["/>
-                        <m:endChr m:val="]"/>
-                        <m:ctrlPr>
-                          <a:rPr lang="en-US" i="1">
-                            <a:latin typeface="Cambria Math" panose="02040503050406030204" pitchFamily="18" charset="0"/>
-                          </a:rPr>
-                        </m:ctrlPr>
-                      </m:dPr>
-                      <m:e>
-                        <m:r>
-                          <a:rPr lang="en-US" i="1">
-                            <a:latin typeface="Cambria Math" panose="02040503050406030204" pitchFamily="18" charset="0"/>
-                          </a:rPr>
-                          <m:t>1−</m:t>
-                        </m:r>
-                        <m:r>
-                          <a:rPr lang="en-US" i="1">
-                            <a:latin typeface="Cambria Math" panose="02040503050406030204" pitchFamily="18" charset="0"/>
-                          </a:rPr>
-                          <m:t>𝛿</m:t>
-                        </m:r>
-                        <m:r>
-                          <a:rPr lang="en-US" i="1">
-                            <a:latin typeface="Cambria Math" panose="02040503050406030204" pitchFamily="18" charset="0"/>
-                          </a:rPr>
-                          <m:t>,1</m:t>
-                        </m:r>
-                      </m:e>
-                    </m:d>
-                    <m:r>
-                      <a:rPr lang="en-US" i="1" smtClean="0">
-                        <a:latin typeface="Cambria Math" panose="02040503050406030204" pitchFamily="18" charset="0"/>
-                      </a:rPr>
-                      <m:t> .</m:t>
-                    </m:r>
-                  </m:oMath>
-                </a14:m>
-                <a:endParaRPr lang="en-US" dirty="0" smtClean="0"/>
-              </a:p>
-              <a:p>
-                <a:r>
-                  <a:rPr lang="en-US" dirty="0" smtClean="0"/>
-                  <a:t>QIVPM</a:t>
-                </a:r>
-                <a:r>
-                  <a:rPr lang="en-US" dirty="0"/>
-                  <a:t> </a:t>
-                </a:r>
-                <a14:m>
-                  <m:oMath xmlns:m="http://schemas.openxmlformats.org/officeDocument/2006/math">
-                    <m:acc>
-                      <m:accPr>
-                        <m:chr m:val="̅"/>
-                        <m:ctrlPr>
-                          <a:rPr lang="en-US" i="1" smtClean="0">
-                            <a:latin typeface="Cambria Math" panose="02040503050406030204" pitchFamily="18" charset="0"/>
-                          </a:rPr>
-                        </m:ctrlPr>
-                      </m:accPr>
-                      <m:e>
-                        <m:r>
-                          <a:rPr lang="en-US" i="1">
-                            <a:latin typeface="Cambria Math" panose="02040503050406030204" pitchFamily="18" charset="0"/>
-                          </a:rPr>
-                          <m:t>𝜇</m:t>
-                        </m:r>
-                      </m:e>
-                    </m:acc>
-                    <m:r>
-                      <a:rPr lang="en-US" i="1">
-                        <a:latin typeface="Cambria Math" panose="02040503050406030204" pitchFamily="18" charset="0"/>
-                      </a:rPr>
-                      <m:t>:</m:t>
-                    </m:r>
-                    <m:r>
-                      <a:rPr lang="en-US" b="0" i="1" smtClean="0">
-                        <a:latin typeface="Cambria Math" panose="02040503050406030204" pitchFamily="18" charset="0"/>
-                        <a:ea typeface="Cambria Math" panose="02040503050406030204" pitchFamily="18" charset="0"/>
-                      </a:rPr>
-                      <m:t>ℰ</m:t>
-                    </m:r>
-                    <m:r>
-                      <a:rPr lang="en-US" b="0" i="1" smtClean="0">
-                        <a:latin typeface="Cambria Math" panose="02040503050406030204" pitchFamily="18" charset="0"/>
-                        <a:ea typeface="Cambria Math" panose="02040503050406030204" pitchFamily="18" charset="0"/>
-                      </a:rPr>
-                      <m:t>→</m:t>
-                    </m:r>
-                    <m:r>
-                      <m:rPr>
-                        <m:nor/>
-                      </m:rPr>
-                      <a:rPr lang="en-US" dirty="0">
-                        <a:latin typeface="XITS Math" panose="02000503000000000000" pitchFamily="50" charset="0"/>
-                        <a:ea typeface="XITS Math" panose="02000503000000000000" pitchFamily="50" charset="0"/>
-                        <a:cs typeface="XITS Math" panose="02000503000000000000" pitchFamily="50" charset="0"/>
-                      </a:rPr>
-                      <m:t>ℐ</m:t>
-                    </m:r>
-                  </m:oMath>
-                </a14:m>
-                <a:r>
-                  <a:rPr lang="en-US" dirty="0" smtClean="0"/>
-                  <a:t> satisfies the following axioms:</a:t>
-                </a:r>
-              </a:p>
-              <a:p>
-                <a:pPr lvl="1"/>
-                <a14:m>
-                  <m:oMath xmlns:m="http://schemas.openxmlformats.org/officeDocument/2006/math">
-                    <m:acc>
-                      <m:accPr>
-                        <m:chr m:val="̅"/>
-                        <m:ctrlPr>
-                          <a:rPr lang="en-US" i="1">
-                            <a:latin typeface="Cambria Math" panose="02040503050406030204" pitchFamily="18" charset="0"/>
-                          </a:rPr>
-                        </m:ctrlPr>
-                      </m:accPr>
-                      <m:e>
-                        <m:r>
-                          <a:rPr lang="en-US" i="1">
-                            <a:latin typeface="Cambria Math" panose="02040503050406030204" pitchFamily="18" charset="0"/>
-                          </a:rPr>
-                          <m:t>𝜇</m:t>
-                        </m:r>
-                      </m:e>
-                    </m:acc>
-                    <m:d>
-                      <m:dPr>
-                        <m:ctrlPr>
-                          <a:rPr lang="en-US" b="0" i="1" smtClean="0">
-                            <a:latin typeface="Cambria Math" panose="02040503050406030204" pitchFamily="18" charset="0"/>
-                          </a:rPr>
-                        </m:ctrlPr>
-                      </m:dPr>
-                      <m:e>
-                        <m:r>
-                          <a:rPr lang="en-US" i="1">
-                            <a:latin typeface="Cambria Math" panose="02040503050406030204" pitchFamily="18" charset="0"/>
-                          </a:rPr>
-                          <m:t>𝟘</m:t>
-                        </m:r>
-                      </m:e>
-                    </m:d>
-                    <m:r>
-                      <a:rPr lang="en-US" b="0" i="1" smtClean="0">
-                        <a:latin typeface="Cambria Math" panose="02040503050406030204" pitchFamily="18" charset="0"/>
-                      </a:rPr>
-                      <m:t>=</m:t>
-                    </m:r>
-                    <m:d>
-                      <m:dPr>
-                        <m:begChr m:val="["/>
-                        <m:endChr m:val="]"/>
-                        <m:ctrlPr>
-                          <a:rPr lang="en-US" b="0" i="1" smtClean="0">
-                            <a:latin typeface="Cambria Math" panose="02040503050406030204" pitchFamily="18" charset="0"/>
-                          </a:rPr>
-                        </m:ctrlPr>
-                      </m:dPr>
-                      <m:e>
-                        <m:r>
-                          <a:rPr lang="en-US" b="0" i="1" smtClean="0">
-                            <a:latin typeface="Cambria Math" panose="02040503050406030204" pitchFamily="18" charset="0"/>
-                          </a:rPr>
-                          <m:t>0,0</m:t>
-                        </m:r>
-                      </m:e>
-                    </m:d>
-                  </m:oMath>
-                </a14:m>
-                <a:r>
-                  <a:rPr lang="en-US" dirty="0" smtClean="0"/>
-                  <a:t>.</a:t>
-                </a:r>
-              </a:p>
-              <a:p>
-                <a:pPr lvl="1"/>
-                <a14:m>
-                  <m:oMath xmlns:m="http://schemas.openxmlformats.org/officeDocument/2006/math">
-                    <m:acc>
-                      <m:accPr>
-                        <m:chr m:val="̅"/>
-                        <m:ctrlPr>
-                          <a:rPr lang="en-US" i="1">
-                            <a:latin typeface="Cambria Math" panose="02040503050406030204" pitchFamily="18" charset="0"/>
-                          </a:rPr>
-                        </m:ctrlPr>
-                      </m:accPr>
-                      <m:e>
-                        <m:r>
-                          <a:rPr lang="en-US" i="1">
-                            <a:latin typeface="Cambria Math" panose="02040503050406030204" pitchFamily="18" charset="0"/>
-                          </a:rPr>
-                          <m:t>𝜇</m:t>
-                        </m:r>
-                      </m:e>
-                    </m:acc>
-                    <m:d>
-                      <m:dPr>
-                        <m:ctrlPr>
-                          <a:rPr lang="en-US" i="1">
-                            <a:latin typeface="Cambria Math" panose="02040503050406030204" pitchFamily="18" charset="0"/>
-                          </a:rPr>
-                        </m:ctrlPr>
-                      </m:dPr>
-                      <m:e>
-                        <m:r>
-                          <a:rPr lang="en-US" i="1">
-                            <a:latin typeface="Cambria Math" panose="02040503050406030204" pitchFamily="18" charset="0"/>
-                          </a:rPr>
-                          <m:t>𝟙</m:t>
-                        </m:r>
-                      </m:e>
-                    </m:d>
-                    <m:r>
-                      <a:rPr lang="en-US" i="1">
-                        <a:latin typeface="Cambria Math" panose="02040503050406030204" pitchFamily="18" charset="0"/>
-                      </a:rPr>
-                      <m:t>=</m:t>
-                    </m:r>
-                    <m:d>
-                      <m:dPr>
-                        <m:begChr m:val="["/>
-                        <m:endChr m:val="]"/>
-                        <m:ctrlPr>
-                          <a:rPr lang="en-US" b="0" i="1" smtClean="0">
-                            <a:latin typeface="Cambria Math" panose="02040503050406030204" pitchFamily="18" charset="0"/>
-                          </a:rPr>
-                        </m:ctrlPr>
-                      </m:dPr>
-                      <m:e>
-                        <m:r>
-                          <a:rPr lang="en-US" b="0" i="1" smtClean="0">
-                            <a:latin typeface="Cambria Math" panose="02040503050406030204" pitchFamily="18" charset="0"/>
-                          </a:rPr>
-                          <m:t>1,1</m:t>
-                        </m:r>
-                      </m:e>
-                    </m:d>
-                  </m:oMath>
-                </a14:m>
-                <a:r>
-                  <a:rPr lang="en-US" dirty="0" smtClean="0"/>
-                  <a:t>.</a:t>
-                </a:r>
-              </a:p>
-              <a:p>
-                <a:pPr lvl="1"/>
-                <a:r>
-                  <a:rPr lang="en-US" dirty="0" smtClean="0"/>
-                  <a:t>For </a:t>
-                </a:r>
-                <a:r>
-                  <a:rPr lang="en-US" dirty="0"/>
-                  <a:t>any projector </a:t>
-                </a:r>
-                <a14:m>
-                  <m:oMath xmlns:m="http://schemas.openxmlformats.org/officeDocument/2006/math">
-                    <m:r>
-                      <a:rPr lang="en-US" i="1">
-                        <a:latin typeface="Cambria Math" panose="02040503050406030204" pitchFamily="18" charset="0"/>
-                      </a:rPr>
-                      <m:t>𝑃</m:t>
-                    </m:r>
-                  </m:oMath>
-                </a14:m>
-                <a:r>
-                  <a:rPr lang="en-US" dirty="0" smtClean="0"/>
-                  <a:t>, if </a:t>
-                </a:r>
-                <a14:m>
-                  <m:oMath xmlns:m="http://schemas.openxmlformats.org/officeDocument/2006/math">
-                    <m:acc>
-                      <m:accPr>
-                        <m:chr m:val="̅"/>
-                        <m:ctrlPr>
-                          <a:rPr lang="en-US" i="1">
-                            <a:latin typeface="Cambria Math" panose="02040503050406030204" pitchFamily="18" charset="0"/>
-                          </a:rPr>
-                        </m:ctrlPr>
-                      </m:accPr>
-                      <m:e>
-                        <m:r>
-                          <a:rPr lang="en-US" i="1">
-                            <a:latin typeface="Cambria Math" panose="02040503050406030204" pitchFamily="18" charset="0"/>
-                          </a:rPr>
-                          <m:t>𝜇</m:t>
-                        </m:r>
-                      </m:e>
-                    </m:acc>
-                    <m:d>
-                      <m:dPr>
-                        <m:ctrlPr>
-                          <a:rPr lang="en-US" i="1">
-                            <a:latin typeface="Cambria Math" panose="02040503050406030204" pitchFamily="18" charset="0"/>
-                          </a:rPr>
-                        </m:ctrlPr>
-                      </m:dPr>
-                      <m:e>
-                        <m:r>
-                          <a:rPr lang="en-US" i="1">
-                            <a:latin typeface="Cambria Math" panose="02040503050406030204" pitchFamily="18" charset="0"/>
-                          </a:rPr>
-                          <m:t>𝑃</m:t>
-                        </m:r>
-                      </m:e>
-                    </m:d>
-                    <m:r>
-                      <a:rPr lang="en-US" b="0" i="1" smtClean="0">
-                        <a:latin typeface="Cambria Math" panose="02040503050406030204" pitchFamily="18" charset="0"/>
-                      </a:rPr>
-                      <m:t>=</m:t>
-                    </m:r>
-                    <m:d>
-                      <m:dPr>
-                        <m:begChr m:val="["/>
-                        <m:endChr m:val="]"/>
-                        <m:ctrlPr>
-                          <a:rPr lang="en-US" b="0" i="1" smtClean="0">
-                            <a:latin typeface="Cambria Math" panose="02040503050406030204" pitchFamily="18" charset="0"/>
-                          </a:rPr>
-                        </m:ctrlPr>
-                      </m:dPr>
-                      <m:e>
-                        <m:r>
-                          <a:rPr lang="en-US" b="0" i="1" smtClean="0">
-                            <a:latin typeface="Cambria Math" panose="02040503050406030204" pitchFamily="18" charset="0"/>
-                          </a:rPr>
-                          <m:t>ℓ,</m:t>
-                        </m:r>
-                        <m:r>
-                          <a:rPr lang="en-US" b="0" i="1" smtClean="0">
-                            <a:latin typeface="Cambria Math" panose="02040503050406030204" pitchFamily="18" charset="0"/>
-                          </a:rPr>
-                          <m:t>𝑟</m:t>
-                        </m:r>
-                      </m:e>
-                    </m:d>
-                  </m:oMath>
-                </a14:m>
-                <a:r>
-                  <a:rPr lang="en-US" dirty="0" smtClean="0"/>
-                  <a:t>, then</a:t>
-                </a:r>
-                <a:br>
-                  <a:rPr lang="en-US" dirty="0" smtClean="0"/>
-                </a:br>
-                <a14:m>
-                  <m:oMath xmlns:m="http://schemas.openxmlformats.org/officeDocument/2006/math">
-                    <m:acc>
-                      <m:accPr>
-                        <m:chr m:val="̅"/>
-                        <m:ctrlPr>
-                          <a:rPr lang="en-US" i="1">
-                            <a:latin typeface="Cambria Math" panose="02040503050406030204" pitchFamily="18" charset="0"/>
-                          </a:rPr>
-                        </m:ctrlPr>
-                      </m:accPr>
-                      <m:e>
-                        <m:r>
-                          <a:rPr lang="en-US" i="1">
-                            <a:latin typeface="Cambria Math" panose="02040503050406030204" pitchFamily="18" charset="0"/>
-                          </a:rPr>
-                          <m:t>𝜇</m:t>
-                        </m:r>
-                      </m:e>
-                    </m:acc>
-                    <m:d>
-                      <m:dPr>
-                        <m:ctrlPr>
-                          <a:rPr lang="en-US" i="1">
-                            <a:latin typeface="Cambria Math" panose="02040503050406030204" pitchFamily="18" charset="0"/>
-                          </a:rPr>
-                        </m:ctrlPr>
-                      </m:dPr>
-                      <m:e>
-                        <m:r>
-                          <a:rPr lang="en-US" i="1">
-                            <a:latin typeface="Cambria Math" panose="02040503050406030204" pitchFamily="18" charset="0"/>
-                          </a:rPr>
-                          <m:t>𝟙</m:t>
-                        </m:r>
-                        <m:r>
-                          <a:rPr lang="en-US" b="0" i="1" smtClean="0">
-                            <a:latin typeface="Cambria Math" panose="02040503050406030204" pitchFamily="18" charset="0"/>
-                          </a:rPr>
-                          <m:t>−</m:t>
-                        </m:r>
-                        <m:r>
-                          <a:rPr lang="en-US" b="0" i="1" smtClean="0">
-                            <a:latin typeface="Cambria Math" panose="02040503050406030204" pitchFamily="18" charset="0"/>
-                          </a:rPr>
-                          <m:t>𝑃</m:t>
-                        </m:r>
-                      </m:e>
-                    </m:d>
-                    <m:r>
-                      <a:rPr lang="en-US" i="1">
-                        <a:latin typeface="Cambria Math" panose="02040503050406030204" pitchFamily="18" charset="0"/>
-                      </a:rPr>
-                      <m:t>=</m:t>
-                    </m:r>
-                    <m:d>
-                      <m:dPr>
-                        <m:begChr m:val="["/>
-                        <m:endChr m:val="]"/>
-                        <m:ctrlPr>
-                          <a:rPr lang="en-US" i="1">
-                            <a:latin typeface="Cambria Math" panose="02040503050406030204" pitchFamily="18" charset="0"/>
-                          </a:rPr>
-                        </m:ctrlPr>
-                      </m:dPr>
-                      <m:e>
-                        <m:r>
-                          <a:rPr lang="en-US" i="1">
-                            <a:latin typeface="Cambria Math" panose="02040503050406030204" pitchFamily="18" charset="0"/>
-                          </a:rPr>
-                          <m:t>1,1</m:t>
-                        </m:r>
-                      </m:e>
-                    </m:d>
-                    <m:r>
-                      <a:rPr lang="en-US" b="0" i="1" smtClean="0">
-                        <a:latin typeface="Cambria Math" panose="02040503050406030204" pitchFamily="18" charset="0"/>
-                      </a:rPr>
-                      <m:t>−</m:t>
-                    </m:r>
-                    <m:acc>
-                      <m:accPr>
-                        <m:chr m:val="̅"/>
-                        <m:ctrlPr>
-                          <a:rPr lang="en-US" i="1">
-                            <a:latin typeface="Cambria Math" panose="02040503050406030204" pitchFamily="18" charset="0"/>
-                          </a:rPr>
-                        </m:ctrlPr>
-                      </m:accPr>
-                      <m:e>
-                        <m:r>
-                          <a:rPr lang="en-US" i="1">
-                            <a:latin typeface="Cambria Math" panose="02040503050406030204" pitchFamily="18" charset="0"/>
-                          </a:rPr>
-                          <m:t>𝜇</m:t>
-                        </m:r>
-                      </m:e>
-                    </m:acc>
-                    <m:d>
-                      <m:dPr>
-                        <m:ctrlPr>
-                          <a:rPr lang="en-US" i="1">
-                            <a:latin typeface="Cambria Math" panose="02040503050406030204" pitchFamily="18" charset="0"/>
-                          </a:rPr>
-                        </m:ctrlPr>
-                      </m:dPr>
-                      <m:e>
-                        <m:r>
-                          <a:rPr lang="en-US" i="1">
-                            <a:latin typeface="Cambria Math" panose="02040503050406030204" pitchFamily="18" charset="0"/>
-                          </a:rPr>
-                          <m:t>𝑃</m:t>
-                        </m:r>
-                      </m:e>
-                    </m:d>
-                    <m:r>
-                      <a:rPr lang="en-US" i="1">
-                        <a:latin typeface="Cambria Math" panose="02040503050406030204" pitchFamily="18" charset="0"/>
-                      </a:rPr>
-                      <m:t>=</m:t>
-                    </m:r>
-                    <m:d>
-                      <m:dPr>
-                        <m:begChr m:val="["/>
-                        <m:endChr m:val="]"/>
-                        <m:ctrlPr>
-                          <a:rPr lang="en-US" i="1">
-                            <a:latin typeface="Cambria Math" panose="02040503050406030204" pitchFamily="18" charset="0"/>
-                          </a:rPr>
-                        </m:ctrlPr>
-                      </m:dPr>
-                      <m:e>
-                        <m:r>
-                          <a:rPr lang="en-US" i="1">
-                            <a:latin typeface="Cambria Math" panose="02040503050406030204" pitchFamily="18" charset="0"/>
-                          </a:rPr>
-                          <m:t>1−</m:t>
-                        </m:r>
-                        <m:r>
-                          <a:rPr lang="en-US" i="1">
-                            <a:latin typeface="Cambria Math" panose="02040503050406030204" pitchFamily="18" charset="0"/>
-                          </a:rPr>
-                          <m:t>𝑟</m:t>
-                        </m:r>
-                        <m:r>
-                          <a:rPr lang="en-US" i="1">
-                            <a:latin typeface="Cambria Math" panose="02040503050406030204" pitchFamily="18" charset="0"/>
-                          </a:rPr>
-                          <m:t>,1−ℓ</m:t>
-                        </m:r>
-                      </m:e>
-                    </m:d>
-                    <m:r>
-                      <a:rPr lang="en-US" b="0" i="1" smtClean="0">
-                        <a:latin typeface="Cambria Math" panose="02040503050406030204" pitchFamily="18" charset="0"/>
-                      </a:rPr>
-                      <m:t> .</m:t>
-                    </m:r>
-                  </m:oMath>
-                </a14:m>
-                <a:endParaRPr lang="en-US" dirty="0" smtClean="0"/>
-              </a:p>
-              <a:p>
-                <a:pPr lvl="1"/>
-                <a:r>
-                  <a:rPr lang="en-US" dirty="0" smtClean="0"/>
-                  <a:t>For </a:t>
-                </a:r>
-                <a:r>
-                  <a:rPr lang="en-US" dirty="0"/>
-                  <a:t>any </a:t>
-                </a:r>
-                <a:r>
-                  <a:rPr lang="en-US" i="1" dirty="0" smtClean="0"/>
-                  <a:t>orthogonal</a:t>
-                </a:r>
-                <a:r>
-                  <a:rPr lang="en-US" dirty="0" smtClean="0"/>
-                  <a:t> projectors</a:t>
-                </a:r>
-                <a:r>
-                  <a:rPr lang="en-US" dirty="0"/>
-                  <a:t> </a:t>
-                </a:r>
-                <a14:m>
-                  <m:oMath xmlns:m="http://schemas.openxmlformats.org/officeDocument/2006/math">
-                    <m:sSub>
-                      <m:sSubPr>
-                        <m:ctrlPr>
-                          <a:rPr lang="en-US" b="0" i="1" smtClean="0">
-                            <a:latin typeface="Cambria Math" panose="02040503050406030204" pitchFamily="18" charset="0"/>
-                          </a:rPr>
-                        </m:ctrlPr>
-                      </m:sSubPr>
-                      <m:e>
-                        <m:r>
-                          <a:rPr lang="en-US" i="1">
-                            <a:latin typeface="Cambria Math" panose="02040503050406030204" pitchFamily="18" charset="0"/>
-                          </a:rPr>
-                          <m:t>𝑃</m:t>
-                        </m:r>
-                      </m:e>
-                      <m:sub>
-                        <m:r>
-                          <a:rPr lang="en-US" b="0" i="1" smtClean="0">
-                            <a:latin typeface="Cambria Math" panose="02040503050406030204" pitchFamily="18" charset="0"/>
-                          </a:rPr>
-                          <m:t>0</m:t>
-                        </m:r>
-                      </m:sub>
-                    </m:sSub>
-                  </m:oMath>
-                </a14:m>
-                <a:r>
-                  <a:rPr lang="en-US" dirty="0" smtClean="0"/>
-                  <a:t> and </a:t>
-                </a:r>
-                <a14:m>
-                  <m:oMath xmlns:m="http://schemas.openxmlformats.org/officeDocument/2006/math">
-                    <m:sSub>
-                      <m:sSubPr>
-                        <m:ctrlPr>
-                          <a:rPr lang="en-US" i="1">
-                            <a:latin typeface="Cambria Math" panose="02040503050406030204" pitchFamily="18" charset="0"/>
-                          </a:rPr>
-                        </m:ctrlPr>
-                      </m:sSubPr>
-                      <m:e>
-                        <m:r>
-                          <a:rPr lang="en-US" i="1">
-                            <a:latin typeface="Cambria Math" panose="02040503050406030204" pitchFamily="18" charset="0"/>
-                          </a:rPr>
-                          <m:t>𝑃</m:t>
-                        </m:r>
-                      </m:e>
-                      <m:sub>
-                        <m:r>
-                          <a:rPr lang="en-US" b="0" i="1" smtClean="0">
-                            <a:latin typeface="Cambria Math" panose="02040503050406030204" pitchFamily="18" charset="0"/>
-                          </a:rPr>
-                          <m:t>1</m:t>
-                        </m:r>
-                      </m:sub>
-                    </m:sSub>
-                  </m:oMath>
-                </a14:m>
-                <a:r>
-                  <a:rPr lang="en-US" dirty="0"/>
-                  <a:t>, if </a:t>
-                </a:r>
-                <a14:m>
-                  <m:oMath xmlns:m="http://schemas.openxmlformats.org/officeDocument/2006/math">
-                    <m:acc>
-                      <m:accPr>
-                        <m:chr m:val="̅"/>
-                        <m:ctrlPr>
-                          <a:rPr lang="en-US" i="1">
-                            <a:latin typeface="Cambria Math" panose="02040503050406030204" pitchFamily="18" charset="0"/>
-                          </a:rPr>
-                        </m:ctrlPr>
-                      </m:accPr>
-                      <m:e>
-                        <m:r>
-                          <a:rPr lang="en-US" i="1">
-                            <a:latin typeface="Cambria Math" panose="02040503050406030204" pitchFamily="18" charset="0"/>
-                          </a:rPr>
-                          <m:t>𝜇</m:t>
-                        </m:r>
-                      </m:e>
-                    </m:acc>
-                    <m:d>
-                      <m:dPr>
-                        <m:ctrlPr>
-                          <a:rPr lang="en-US" i="1">
-                            <a:latin typeface="Cambria Math" panose="02040503050406030204" pitchFamily="18" charset="0"/>
-                          </a:rPr>
-                        </m:ctrlPr>
-                      </m:dPr>
-                      <m:e>
-                        <m:sSub>
-                          <m:sSubPr>
-                            <m:ctrlPr>
-                              <a:rPr lang="en-US" b="0" i="1" smtClean="0">
-                                <a:latin typeface="Cambria Math" panose="02040503050406030204" pitchFamily="18" charset="0"/>
-                              </a:rPr>
-                            </m:ctrlPr>
-                          </m:sSubPr>
-                          <m:e>
-                            <m:r>
-                              <a:rPr lang="en-US" i="1">
-                                <a:latin typeface="Cambria Math" panose="02040503050406030204" pitchFamily="18" charset="0"/>
-                              </a:rPr>
-                              <m:t>𝑃</m:t>
-                            </m:r>
-                          </m:e>
-                          <m:sub>
-                            <m:r>
-                              <a:rPr lang="en-US" b="0" i="1" smtClean="0">
-                                <a:latin typeface="Cambria Math" panose="02040503050406030204" pitchFamily="18" charset="0"/>
-                              </a:rPr>
-                              <m:t>0</m:t>
-                            </m:r>
-                          </m:sub>
-                        </m:sSub>
-                      </m:e>
-                    </m:d>
-                    <m:r>
-                      <a:rPr lang="en-US" i="1">
-                        <a:latin typeface="Cambria Math" panose="02040503050406030204" pitchFamily="18" charset="0"/>
-                      </a:rPr>
-                      <m:t>=</m:t>
-                    </m:r>
-                    <m:d>
-                      <m:dPr>
-                        <m:begChr m:val="["/>
-                        <m:endChr m:val="]"/>
-                        <m:ctrlPr>
-                          <a:rPr lang="en-US" i="1">
-                            <a:latin typeface="Cambria Math" panose="02040503050406030204" pitchFamily="18" charset="0"/>
-                          </a:rPr>
-                        </m:ctrlPr>
-                      </m:dPr>
-                      <m:e>
-                        <m:sSub>
-                          <m:sSubPr>
-                            <m:ctrlPr>
-                              <a:rPr lang="en-US" b="0" i="1" smtClean="0">
-                                <a:latin typeface="Cambria Math" panose="02040503050406030204" pitchFamily="18" charset="0"/>
-                              </a:rPr>
-                            </m:ctrlPr>
-                          </m:sSubPr>
-                          <m:e>
-                            <m:r>
-                              <a:rPr lang="en-US" i="1">
-                                <a:latin typeface="Cambria Math" panose="02040503050406030204" pitchFamily="18" charset="0"/>
-                              </a:rPr>
-                              <m:t>ℓ</m:t>
-                            </m:r>
-                          </m:e>
-                          <m:sub>
-                            <m:r>
-                              <a:rPr lang="en-US" b="0" i="1" smtClean="0">
-                                <a:latin typeface="Cambria Math" panose="02040503050406030204" pitchFamily="18" charset="0"/>
-                              </a:rPr>
-                              <m:t>0</m:t>
-                            </m:r>
-                          </m:sub>
-                        </m:sSub>
-                        <m:r>
-                          <a:rPr lang="en-US" i="1">
-                            <a:latin typeface="Cambria Math" panose="02040503050406030204" pitchFamily="18" charset="0"/>
-                          </a:rPr>
-                          <m:t>,</m:t>
-                        </m:r>
-                        <m:sSub>
-                          <m:sSubPr>
-                            <m:ctrlPr>
-                              <a:rPr lang="en-US" b="0" i="1" smtClean="0">
-                                <a:latin typeface="Cambria Math" panose="02040503050406030204" pitchFamily="18" charset="0"/>
-                              </a:rPr>
-                            </m:ctrlPr>
-                          </m:sSubPr>
-                          <m:e>
-                            <m:r>
-                              <a:rPr lang="en-US" i="1">
-                                <a:latin typeface="Cambria Math" panose="02040503050406030204" pitchFamily="18" charset="0"/>
-                              </a:rPr>
-                              <m:t>𝑟</m:t>
-                            </m:r>
-                          </m:e>
-                          <m:sub>
-                            <m:r>
-                              <a:rPr lang="en-US" b="0" i="1" smtClean="0">
-                                <a:latin typeface="Cambria Math" panose="02040503050406030204" pitchFamily="18" charset="0"/>
-                              </a:rPr>
-                              <m:t>0</m:t>
-                            </m:r>
-                          </m:sub>
-                        </m:sSub>
-                      </m:e>
-                    </m:d>
-                  </m:oMath>
-                </a14:m>
-                <a:r>
-                  <a:rPr lang="en-US" dirty="0" smtClean="0"/>
-                  <a:t> and </a:t>
-                </a:r>
-                <a14:m>
-                  <m:oMath xmlns:m="http://schemas.openxmlformats.org/officeDocument/2006/math">
-                    <m:acc>
-                      <m:accPr>
-                        <m:chr m:val="̅"/>
-                        <m:ctrlPr>
-                          <a:rPr lang="en-US" i="1">
-                            <a:latin typeface="Cambria Math" panose="02040503050406030204" pitchFamily="18" charset="0"/>
-                          </a:rPr>
-                        </m:ctrlPr>
-                      </m:accPr>
-                      <m:e>
-                        <m:r>
-                          <a:rPr lang="en-US" i="1">
-                            <a:latin typeface="Cambria Math" panose="02040503050406030204" pitchFamily="18" charset="0"/>
-                          </a:rPr>
-                          <m:t>𝜇</m:t>
-                        </m:r>
-                      </m:e>
-                    </m:acc>
-                    <m:d>
-                      <m:dPr>
-                        <m:ctrlPr>
-                          <a:rPr lang="en-US" i="1">
-                            <a:latin typeface="Cambria Math" panose="02040503050406030204" pitchFamily="18" charset="0"/>
-                          </a:rPr>
-                        </m:ctrlPr>
-                      </m:dPr>
-                      <m:e>
-                        <m:sSub>
-                          <m:sSubPr>
-                            <m:ctrlPr>
-                              <a:rPr lang="en-US" i="1">
-                                <a:latin typeface="Cambria Math" panose="02040503050406030204" pitchFamily="18" charset="0"/>
-                              </a:rPr>
-                            </m:ctrlPr>
-                          </m:sSubPr>
-                          <m:e>
-                            <m:r>
-                              <a:rPr lang="en-US" i="1">
-                                <a:latin typeface="Cambria Math" panose="02040503050406030204" pitchFamily="18" charset="0"/>
-                              </a:rPr>
-                              <m:t>𝑃</m:t>
-                            </m:r>
-                          </m:e>
-                          <m:sub>
-                            <m:r>
-                              <a:rPr lang="en-US" b="0" i="1" smtClean="0">
-                                <a:latin typeface="Cambria Math" panose="02040503050406030204" pitchFamily="18" charset="0"/>
-                              </a:rPr>
-                              <m:t>1</m:t>
-                            </m:r>
-                          </m:sub>
-                        </m:sSub>
-                      </m:e>
-                    </m:d>
-                    <m:r>
-                      <a:rPr lang="en-US" i="1">
-                        <a:latin typeface="Cambria Math" panose="02040503050406030204" pitchFamily="18" charset="0"/>
-                      </a:rPr>
-                      <m:t>=</m:t>
-                    </m:r>
-                    <m:d>
-                      <m:dPr>
-                        <m:begChr m:val="["/>
-                        <m:endChr m:val="]"/>
-                        <m:ctrlPr>
-                          <a:rPr lang="en-US" i="1">
-                            <a:latin typeface="Cambria Math" panose="02040503050406030204" pitchFamily="18" charset="0"/>
-                          </a:rPr>
-                        </m:ctrlPr>
-                      </m:dPr>
-                      <m:e>
-                        <m:sSub>
-                          <m:sSubPr>
-                            <m:ctrlPr>
-                              <a:rPr lang="en-US" i="1">
-                                <a:latin typeface="Cambria Math" panose="02040503050406030204" pitchFamily="18" charset="0"/>
-                              </a:rPr>
-                            </m:ctrlPr>
-                          </m:sSubPr>
-                          <m:e>
-                            <m:r>
-                              <a:rPr lang="en-US" i="1">
-                                <a:latin typeface="Cambria Math" panose="02040503050406030204" pitchFamily="18" charset="0"/>
-                              </a:rPr>
-                              <m:t>ℓ</m:t>
-                            </m:r>
-                          </m:e>
-                          <m:sub>
-                            <m:r>
-                              <a:rPr lang="en-US" b="0" i="1" smtClean="0">
-                                <a:latin typeface="Cambria Math" panose="02040503050406030204" pitchFamily="18" charset="0"/>
-                              </a:rPr>
-                              <m:t>1</m:t>
-                            </m:r>
-                          </m:sub>
-                        </m:sSub>
-                        <m:r>
-                          <a:rPr lang="en-US" i="1">
-                            <a:latin typeface="Cambria Math" panose="02040503050406030204" pitchFamily="18" charset="0"/>
-                          </a:rPr>
-                          <m:t>,</m:t>
-                        </m:r>
-                        <m:sSub>
-                          <m:sSubPr>
-                            <m:ctrlPr>
-                              <a:rPr lang="en-US" i="1">
-                                <a:latin typeface="Cambria Math" panose="02040503050406030204" pitchFamily="18" charset="0"/>
-                              </a:rPr>
-                            </m:ctrlPr>
-                          </m:sSubPr>
-                          <m:e>
-                            <m:r>
-                              <a:rPr lang="en-US" i="1">
-                                <a:latin typeface="Cambria Math" panose="02040503050406030204" pitchFamily="18" charset="0"/>
-                              </a:rPr>
-                              <m:t>𝑟</m:t>
-                            </m:r>
-                          </m:e>
-                          <m:sub>
-                            <m:r>
-                              <a:rPr lang="en-US" b="0" i="1" smtClean="0">
-                                <a:latin typeface="Cambria Math" panose="02040503050406030204" pitchFamily="18" charset="0"/>
-                              </a:rPr>
-                              <m:t>1</m:t>
-                            </m:r>
-                          </m:sub>
-                        </m:sSub>
-                      </m:e>
-                    </m:d>
-                  </m:oMath>
-                </a14:m>
-                <a:r>
-                  <a:rPr lang="en-US" dirty="0" smtClean="0"/>
-                  <a:t>, </a:t>
-                </a:r>
-                <a:r>
-                  <a:rPr lang="en-US" dirty="0"/>
-                  <a:t>then</a:t>
-                </a:r>
-                <a:br>
-                  <a:rPr lang="en-US" dirty="0"/>
-                </a:br>
-                <a14:m>
-                  <m:oMath xmlns:m="http://schemas.openxmlformats.org/officeDocument/2006/math">
-                    <m:acc>
-                      <m:accPr>
-                        <m:chr m:val="̅"/>
-                        <m:ctrlPr>
-                          <a:rPr lang="en-US" i="1">
-                            <a:latin typeface="Cambria Math" panose="02040503050406030204" pitchFamily="18" charset="0"/>
-                          </a:rPr>
-                        </m:ctrlPr>
-                      </m:accPr>
-                      <m:e>
-                        <m:r>
-                          <a:rPr lang="en-US" i="1">
-                            <a:latin typeface="Cambria Math" panose="02040503050406030204" pitchFamily="18" charset="0"/>
-                          </a:rPr>
-                          <m:t>𝜇</m:t>
-                        </m:r>
-                      </m:e>
-                    </m:acc>
-                    <m:d>
-                      <m:dPr>
-                        <m:ctrlPr>
-                          <a:rPr lang="en-US" i="1">
-                            <a:latin typeface="Cambria Math" panose="02040503050406030204" pitchFamily="18" charset="0"/>
-                          </a:rPr>
-                        </m:ctrlPr>
-                      </m:dPr>
-                      <m:e>
-                        <m:sSub>
-                          <m:sSubPr>
-                            <m:ctrlPr>
-                              <a:rPr lang="en-US" i="1">
-                                <a:latin typeface="Cambria Math" panose="02040503050406030204" pitchFamily="18" charset="0"/>
-                              </a:rPr>
-                            </m:ctrlPr>
-                          </m:sSubPr>
-                          <m:e>
-                            <m:r>
-                              <a:rPr lang="en-US" i="1">
-                                <a:latin typeface="Cambria Math" panose="02040503050406030204" pitchFamily="18" charset="0"/>
-                              </a:rPr>
-                              <m:t>𝑃</m:t>
-                            </m:r>
-                          </m:e>
-                          <m:sub>
-                            <m:r>
-                              <a:rPr lang="en-US" i="1">
-                                <a:latin typeface="Cambria Math" panose="02040503050406030204" pitchFamily="18" charset="0"/>
-                              </a:rPr>
-                              <m:t>0</m:t>
-                            </m:r>
-                          </m:sub>
-                        </m:sSub>
-                        <m:r>
-                          <a:rPr lang="en-US" b="0" i="1" smtClean="0">
-                            <a:latin typeface="Cambria Math" panose="02040503050406030204" pitchFamily="18" charset="0"/>
-                          </a:rPr>
-                          <m:t>+</m:t>
-                        </m:r>
-                        <m:sSub>
-                          <m:sSubPr>
-                            <m:ctrlPr>
-                              <a:rPr lang="en-US" i="1">
-                                <a:latin typeface="Cambria Math" panose="02040503050406030204" pitchFamily="18" charset="0"/>
-                              </a:rPr>
-                            </m:ctrlPr>
-                          </m:sSubPr>
-                          <m:e>
-                            <m:r>
-                              <a:rPr lang="en-US" i="1">
-                                <a:latin typeface="Cambria Math" panose="02040503050406030204" pitchFamily="18" charset="0"/>
-                              </a:rPr>
-                              <m:t>𝑃</m:t>
-                            </m:r>
-                          </m:e>
-                          <m:sub>
-                            <m:r>
-                              <a:rPr lang="en-US" b="0" i="1" smtClean="0">
-                                <a:latin typeface="Cambria Math" panose="02040503050406030204" pitchFamily="18" charset="0"/>
-                              </a:rPr>
-                              <m:t>1</m:t>
-                            </m:r>
-                          </m:sub>
-                        </m:sSub>
-                      </m:e>
-                    </m:d>
-                    <m:r>
-                      <a:rPr lang="en-US" b="0" i="1" smtClean="0">
-                        <a:latin typeface="Cambria Math" panose="02040503050406030204" pitchFamily="18" charset="0"/>
-                      </a:rPr>
-                      <m:t>⊆</m:t>
-                    </m:r>
-                    <m:acc>
-                      <m:accPr>
-                        <m:chr m:val="̅"/>
-                        <m:ctrlPr>
-                          <a:rPr lang="en-US" i="1">
-                            <a:latin typeface="Cambria Math" panose="02040503050406030204" pitchFamily="18" charset="0"/>
-                          </a:rPr>
-                        </m:ctrlPr>
-                      </m:accPr>
-                      <m:e>
-                        <m:r>
-                          <a:rPr lang="en-US" i="1">
-                            <a:latin typeface="Cambria Math" panose="02040503050406030204" pitchFamily="18" charset="0"/>
-                          </a:rPr>
-                          <m:t>𝜇</m:t>
-                        </m:r>
-                      </m:e>
-                    </m:acc>
-                    <m:d>
-                      <m:dPr>
-                        <m:ctrlPr>
-                          <a:rPr lang="en-US" i="1">
-                            <a:latin typeface="Cambria Math" panose="02040503050406030204" pitchFamily="18" charset="0"/>
-                          </a:rPr>
-                        </m:ctrlPr>
-                      </m:dPr>
-                      <m:e>
-                        <m:sSub>
-                          <m:sSubPr>
-                            <m:ctrlPr>
-                              <a:rPr lang="en-US" b="0" i="1" smtClean="0">
-                                <a:latin typeface="Cambria Math" panose="02040503050406030204" pitchFamily="18" charset="0"/>
-                              </a:rPr>
-                            </m:ctrlPr>
-                          </m:sSubPr>
-                          <m:e>
-                            <m:r>
-                              <a:rPr lang="en-US" i="1">
-                                <a:latin typeface="Cambria Math" panose="02040503050406030204" pitchFamily="18" charset="0"/>
-                              </a:rPr>
-                              <m:t>𝑃</m:t>
-                            </m:r>
-                          </m:e>
-                          <m:sub>
-                            <m:r>
-                              <a:rPr lang="en-US" b="0" i="1" smtClean="0">
-                                <a:latin typeface="Cambria Math" panose="02040503050406030204" pitchFamily="18" charset="0"/>
-                              </a:rPr>
-                              <m:t>0</m:t>
-                            </m:r>
-                          </m:sub>
-                        </m:sSub>
-                      </m:e>
-                    </m:d>
-                    <m:r>
-                      <a:rPr lang="en-US" b="0" i="1" smtClean="0">
-                        <a:latin typeface="Cambria Math" panose="02040503050406030204" pitchFamily="18" charset="0"/>
-                      </a:rPr>
-                      <m:t>+</m:t>
-                    </m:r>
-                    <m:acc>
-                      <m:accPr>
-                        <m:chr m:val="̅"/>
-                        <m:ctrlPr>
-                          <a:rPr lang="en-US" i="1">
-                            <a:latin typeface="Cambria Math" panose="02040503050406030204" pitchFamily="18" charset="0"/>
-                          </a:rPr>
-                        </m:ctrlPr>
-                      </m:accPr>
-                      <m:e>
-                        <m:r>
-                          <a:rPr lang="en-US" i="1">
-                            <a:latin typeface="Cambria Math" panose="02040503050406030204" pitchFamily="18" charset="0"/>
-                          </a:rPr>
-                          <m:t>𝜇</m:t>
-                        </m:r>
-                      </m:e>
-                    </m:acc>
-                    <m:d>
-                      <m:dPr>
-                        <m:ctrlPr>
-                          <a:rPr lang="en-US" i="1">
-                            <a:latin typeface="Cambria Math" panose="02040503050406030204" pitchFamily="18" charset="0"/>
-                          </a:rPr>
-                        </m:ctrlPr>
-                      </m:dPr>
-                      <m:e>
-                        <m:sSub>
-                          <m:sSubPr>
-                            <m:ctrlPr>
-                              <a:rPr lang="en-US" b="0" i="1" smtClean="0">
-                                <a:latin typeface="Cambria Math" panose="02040503050406030204" pitchFamily="18" charset="0"/>
-                              </a:rPr>
-                            </m:ctrlPr>
-                          </m:sSubPr>
-                          <m:e>
-                            <m:r>
-                              <a:rPr lang="en-US" i="1">
-                                <a:latin typeface="Cambria Math" panose="02040503050406030204" pitchFamily="18" charset="0"/>
-                              </a:rPr>
-                              <m:t>𝑃</m:t>
-                            </m:r>
-                          </m:e>
-                          <m:sub>
-                            <m:r>
-                              <a:rPr lang="en-US" b="0" i="1" smtClean="0">
-                                <a:latin typeface="Cambria Math" panose="02040503050406030204" pitchFamily="18" charset="0"/>
-                              </a:rPr>
-                              <m:t>1</m:t>
-                            </m:r>
-                          </m:sub>
-                        </m:sSub>
-                      </m:e>
-                    </m:d>
-                    <m:r>
-                      <a:rPr lang="en-US" b="0" i="1" smtClean="0">
-                        <a:latin typeface="Cambria Math" panose="02040503050406030204" pitchFamily="18" charset="0"/>
-                      </a:rPr>
-                      <m:t>=</m:t>
-                    </m:r>
-                    <m:d>
-                      <m:dPr>
-                        <m:begChr m:val="["/>
-                        <m:endChr m:val="]"/>
-                        <m:ctrlPr>
-                          <a:rPr lang="en-US" i="1">
-                            <a:latin typeface="Cambria Math" panose="02040503050406030204" pitchFamily="18" charset="0"/>
-                          </a:rPr>
-                        </m:ctrlPr>
-                      </m:dPr>
-                      <m:e>
-                        <m:sSub>
-                          <m:sSubPr>
-                            <m:ctrlPr>
-                              <a:rPr lang="en-US" i="1">
-                                <a:latin typeface="Cambria Math" panose="02040503050406030204" pitchFamily="18" charset="0"/>
-                              </a:rPr>
-                            </m:ctrlPr>
-                          </m:sSubPr>
-                          <m:e>
-                            <m:r>
-                              <a:rPr lang="en-US" i="1">
-                                <a:latin typeface="Cambria Math" panose="02040503050406030204" pitchFamily="18" charset="0"/>
-                              </a:rPr>
-                              <m:t>ℓ</m:t>
-                            </m:r>
-                          </m:e>
-                          <m:sub>
-                            <m:r>
-                              <a:rPr lang="en-US" i="1">
-                                <a:latin typeface="Cambria Math" panose="02040503050406030204" pitchFamily="18" charset="0"/>
-                              </a:rPr>
-                              <m:t>0</m:t>
-                            </m:r>
-                          </m:sub>
-                        </m:sSub>
-                        <m:r>
-                          <a:rPr lang="en-US" b="0" i="1" smtClean="0">
-                            <a:latin typeface="Cambria Math" panose="02040503050406030204" pitchFamily="18" charset="0"/>
-                          </a:rPr>
-                          <m:t>+</m:t>
-                        </m:r>
-                        <m:sSub>
-                          <m:sSubPr>
-                            <m:ctrlPr>
-                              <a:rPr lang="en-US" i="1">
-                                <a:latin typeface="Cambria Math" panose="02040503050406030204" pitchFamily="18" charset="0"/>
-                              </a:rPr>
-                            </m:ctrlPr>
-                          </m:sSubPr>
-                          <m:e>
-                            <m:r>
-                              <a:rPr lang="en-US" i="1">
-                                <a:latin typeface="Cambria Math" panose="02040503050406030204" pitchFamily="18" charset="0"/>
-                              </a:rPr>
-                              <m:t>ℓ</m:t>
-                            </m:r>
-                          </m:e>
-                          <m:sub>
-                            <m:r>
-                              <a:rPr lang="en-US" i="1">
-                                <a:latin typeface="Cambria Math" panose="02040503050406030204" pitchFamily="18" charset="0"/>
-                              </a:rPr>
-                              <m:t>1</m:t>
-                            </m:r>
-                          </m:sub>
-                        </m:sSub>
-                        <m:r>
-                          <a:rPr lang="en-US" i="1">
-                            <a:latin typeface="Cambria Math" panose="02040503050406030204" pitchFamily="18" charset="0"/>
-                          </a:rPr>
-                          <m:t>,</m:t>
-                        </m:r>
-                        <m:sSub>
-                          <m:sSubPr>
-                            <m:ctrlPr>
-                              <a:rPr lang="en-US" i="1">
-                                <a:latin typeface="Cambria Math" panose="02040503050406030204" pitchFamily="18" charset="0"/>
-                              </a:rPr>
-                            </m:ctrlPr>
-                          </m:sSubPr>
-                          <m:e>
-                            <m:r>
-                              <a:rPr lang="en-US" i="1">
-                                <a:latin typeface="Cambria Math" panose="02040503050406030204" pitchFamily="18" charset="0"/>
-                              </a:rPr>
-                              <m:t>𝑟</m:t>
-                            </m:r>
-                          </m:e>
-                          <m:sub>
-                            <m:r>
-                              <a:rPr lang="en-US" i="1">
-                                <a:latin typeface="Cambria Math" panose="02040503050406030204" pitchFamily="18" charset="0"/>
-                              </a:rPr>
-                              <m:t>0</m:t>
-                            </m:r>
-                          </m:sub>
-                        </m:sSub>
-                        <m:r>
-                          <a:rPr lang="en-US" b="0" i="1" smtClean="0">
-                            <a:latin typeface="Cambria Math" panose="02040503050406030204" pitchFamily="18" charset="0"/>
-                          </a:rPr>
-                          <m:t>+</m:t>
-                        </m:r>
-                        <m:sSub>
-                          <m:sSubPr>
-                            <m:ctrlPr>
-                              <a:rPr lang="en-US" i="1">
-                                <a:latin typeface="Cambria Math" panose="02040503050406030204" pitchFamily="18" charset="0"/>
-                              </a:rPr>
-                            </m:ctrlPr>
-                          </m:sSubPr>
-                          <m:e>
-                            <m:r>
-                              <a:rPr lang="en-US" i="1">
-                                <a:latin typeface="Cambria Math" panose="02040503050406030204" pitchFamily="18" charset="0"/>
-                              </a:rPr>
-                              <m:t>𝑟</m:t>
-                            </m:r>
-                          </m:e>
-                          <m:sub>
-                            <m:r>
-                              <a:rPr lang="en-US" i="1">
-                                <a:latin typeface="Cambria Math" panose="02040503050406030204" pitchFamily="18" charset="0"/>
-                              </a:rPr>
-                              <m:t>1</m:t>
-                            </m:r>
-                          </m:sub>
-                        </m:sSub>
-                      </m:e>
-                    </m:d>
-                    <m:r>
-                      <m:rPr>
-                        <m:nor/>
-                      </m:rPr>
-                      <a:rPr lang="en-US" dirty="0"/>
-                      <m:t>	</m:t>
-                    </m:r>
-                    <m:r>
-                      <a:rPr lang="en-US" b="0" i="1" dirty="0" smtClean="0">
-                        <a:latin typeface="Cambria Math" panose="02040503050406030204" pitchFamily="18" charset="0"/>
-                      </a:rPr>
-                      <m:t> .</m:t>
-                    </m:r>
-                  </m:oMath>
-                </a14:m>
-                <a:endParaRPr lang="en-US" dirty="0"/>
-              </a:p>
-            </p:txBody>
-          </p:sp>
-        </mc:Choice>
-        <mc:Fallback xmlns="">
-          <p:sp>
-            <p:nvSpPr>
-              <p:cNvPr id="3" name="Content Placeholder 2"/>
-              <p:cNvSpPr>
-                <a:spLocks noGrp="1" noRot="1" noChangeAspect="1" noMove="1" noResize="1" noEditPoints="1" noAdjustHandles="1" noChangeArrowheads="1" noChangeShapeType="1" noTextEdit="1"/>
-              </p:cNvSpPr>
-              <p:nvPr>
-                <p:ph idx="1"/>
-              </p:nvPr>
-            </p:nvSpPr>
-            <p:spPr>
-              <a:blipFill rotWithShape="0">
-                <a:blip r:embed="rId3"/>
-                <a:stretch>
-                  <a:fillRect l="-1043" t="-3081"/>
-                </a:stretch>
-              </a:blipFill>
-            </p:spPr>
-            <p:txBody>
-              <a:bodyPr/>
-              <a:lstStyle/>
-              <a:p>
-                <a:r>
-                  <a:rPr lang="en-US">
-                    <a:noFill/>
-                  </a:rPr>
-                  <a:t> </a:t>
-                </a:r>
-              </a:p>
-            </p:txBody>
-          </p:sp>
-        </mc:Fallback>
-      </mc:AlternateContent>
-    </p:spTree>
-    <p:extLst>
-      <p:ext uri="{BB962C8B-B14F-4D97-AF65-F5344CB8AC3E}">
-        <p14:creationId xmlns:p14="http://schemas.microsoft.com/office/powerpoint/2010/main" val="308616190"/>
-      </p:ext>
-    </p:extLst>
-  </p:cSld>
-  <p:clrMapOvr>
-    <a:masterClrMapping/>
-  </p:clrMapOvr>
-  <p:timing>
-    <p:tnLst>
-      <p:par>
-        <p:cTn id="1" dur="indefinite" restart="never" nodeType="tmRoot"/>
-      </p:par>
-    </p:tnLst>
-  </p:timing>
-</p:sld>
-</file>
-
-<file path=ppt/slides/slide5.xml><?xml version="1.0" encoding="utf-8"?>
-<p:sld xmlns:a="http://schemas.openxmlformats.org/drawingml/2006/main" xmlns:r="http://schemas.openxmlformats.org/officeDocument/2006/relationships" xmlns:p="http://schemas.openxmlformats.org/presentationml/2006/main">
-  <p:cSld>
-    <p:spTree>
-      <p:nvGrpSpPr>
-        <p:cNvPr id="1" name=""/>
-        <p:cNvGrpSpPr/>
-        <p:nvPr/>
-      </p:nvGrpSpPr>
-      <p:grpSpPr>
-        <a:xfrm>
-          <a:off x="0" y="0"/>
-          <a:ext cx="0" cy="0"/>
-          <a:chOff x="0" y="0"/>
-          <a:chExt cx="0" cy="0"/>
-        </a:xfrm>
-      </p:grpSpPr>
-      <p:sp>
-        <p:nvSpPr>
-          <p:cNvPr id="2" name="Title 1"/>
-          <p:cNvSpPr>
-            <a:spLocks noGrp="1"/>
-          </p:cNvSpPr>
-          <p:nvPr>
-            <p:ph type="title"/>
-          </p:nvPr>
-        </p:nvSpPr>
-        <p:spPr/>
-        <p:txBody>
-          <a:bodyPr/>
-          <a:lstStyle/>
-          <a:p>
-            <a:r>
               <a:rPr lang="en-US" dirty="0"/>
               <a:t>Kochen-Specker </a:t>
             </a:r>
@@ -8038,8 +6503,8 @@
           </a:p>
         </p:txBody>
       </p:sp>
-      <mc:AlternateContent xmlns:mc="http://schemas.openxmlformats.org/markup-compatibility/2006" xmlns:a14="http://schemas.microsoft.com/office/drawing/2010/main">
-        <mc:Choice Requires="a14">
+      <mc:AlternateContent xmlns:mc="http://schemas.openxmlformats.org/markup-compatibility/2006">
+        <mc:Choice xmlns:a14="http://schemas.microsoft.com/office/drawing/2010/main" Requires="a14">
           <p:sp>
             <p:nvSpPr>
               <p:cNvPr id="3" name="Content Placeholder 2"/>
@@ -8071,7 +6536,11 @@
                 </a:r>
                 <a:r>
                   <a:rPr lang="en-US" dirty="0" smtClean="0"/>
-                  <a:t> There is no </a:t>
+                  <a:t> There is no</a:t>
+                </a:r>
+                <a:r>
+                  <a:rPr lang="en-US" dirty="0" smtClean="0"/>
+                  <a:t> </a:t>
                 </a:r>
                 <a14:m>
                   <m:oMath xmlns:m="http://schemas.openxmlformats.org/officeDocument/2006/math">
@@ -8178,7 +6647,11 @@
                 </a14:m>
                 <a:r>
                   <a:rPr lang="en-US" dirty="0" smtClean="0"/>
-                  <a:t>, then we can define </a:t>
+                  <a:t>, then we can </a:t>
+                </a:r>
+                <a:r>
+                  <a:rPr lang="en-US" dirty="0" smtClean="0"/>
+                  <a:t>define </a:t>
                 </a:r>
                 <a14:m>
                   <m:oMath xmlns:m="http://schemas.openxmlformats.org/officeDocument/2006/math">
@@ -8191,12 +6664,24 @@
                         </m:ctrlPr>
                       </m:sSupPr>
                       <m:e>
-                        <m:r>
-                          <a:rPr lang="en-US" i="1">
-                            <a:latin typeface="Cambria Math" panose="02040503050406030204" pitchFamily="18" charset="0"/>
-                          </a:rPr>
-                          <m:t>𝜇</m:t>
-                        </m:r>
+                        <m:acc>
+                          <m:accPr>
+                            <m:chr m:val="̅"/>
+                            <m:ctrlPr>
+                              <a:rPr lang="en-US" i="1">
+                                <a:latin typeface="Cambria Math" panose="02040503050406030204" pitchFamily="18" charset="0"/>
+                              </a:rPr>
+                            </m:ctrlPr>
+                          </m:accPr>
+                          <m:e>
+                            <m:r>
+                              <a:rPr lang="en-US" i="1">
+                                <a:latin typeface="Cambria Math" panose="02040503050406030204" pitchFamily="18" charset="0"/>
+                              </a:rPr>
+                              <m:t>𝜇</m:t>
+                            </m:r>
+                          </m:e>
+                        </m:acc>
                       </m:e>
                       <m:sup>
                         <m:r>
@@ -8228,18 +6713,30 @@
                     <m:sSup>
                       <m:sSupPr>
                         <m:ctrlPr>
-                          <a:rPr lang="en-US" i="1" smtClean="0">
+                          <a:rPr lang="en-US" i="1">
                             <a:latin typeface="Cambria Math" panose="02040503050406030204" pitchFamily="18" charset="0"/>
                           </a:rPr>
                         </m:ctrlPr>
                       </m:sSupPr>
                       <m:e>
-                        <m:r>
-                          <a:rPr lang="en-US" i="1" smtClean="0">
-                            <a:latin typeface="Cambria Math" panose="02040503050406030204" pitchFamily="18" charset="0"/>
-                          </a:rPr>
-                          <m:t>𝜇</m:t>
-                        </m:r>
+                        <m:acc>
+                          <m:accPr>
+                            <m:chr m:val="̅"/>
+                            <m:ctrlPr>
+                              <a:rPr lang="en-US" i="1">
+                                <a:latin typeface="Cambria Math" panose="02040503050406030204" pitchFamily="18" charset="0"/>
+                              </a:rPr>
+                            </m:ctrlPr>
+                          </m:accPr>
+                          <m:e>
+                            <m:r>
+                              <a:rPr lang="en-US" i="1">
+                                <a:latin typeface="Cambria Math" panose="02040503050406030204" pitchFamily="18" charset="0"/>
+                              </a:rPr>
+                              <m:t>𝜇</m:t>
+                            </m:r>
+                          </m:e>
+                        </m:acc>
                       </m:e>
                       <m:sup>
                         <m:r>
@@ -8296,15 +6793,25 @@
                             </m:ctrlPr>
                           </m:eqArrPr>
                           <m:e>
-                            <m:r>
-                              <m:rPr>
-                                <m:brk m:alnAt="7"/>
-                              </m:rPr>
-                              <a:rPr lang="en-US" i="1">
-                                <a:latin typeface="Cambria Math" panose="02040503050406030204" pitchFamily="18" charset="0"/>
-                              </a:rPr>
-                              <m:t>0</m:t>
-                            </m:r>
+                            <m:d>
+                              <m:dPr>
+                                <m:begChr m:val="["/>
+                                <m:endChr m:val="]"/>
+                                <m:ctrlPr>
+                                  <a:rPr lang="en-US" i="1">
+                                    <a:latin typeface="Cambria Math" panose="02040503050406030204" pitchFamily="18" charset="0"/>
+                                  </a:rPr>
+                                </m:ctrlPr>
+                              </m:dPr>
+                              <m:e>
+                                <m:r>
+                                  <a:rPr lang="en-US" i="1">
+                                    <a:latin typeface="Cambria Math" panose="02040503050406030204" pitchFamily="18" charset="0"/>
+                                  </a:rPr>
+                                  <m:t>0,0</m:t>
+                                </m:r>
+                              </m:e>
+                            </m:d>
                             <m:r>
                               <m:rPr>
                                 <m:nor/>
@@ -8427,8 +6934,39 @@
                               <a:rPr lang="en-US" i="1">
                                 <a:latin typeface="Cambria Math" panose="02040503050406030204" pitchFamily="18" charset="0"/>
                               </a:rPr>
-                              <m:t>&amp;1</m:t>
+                              <m:t>&amp;</m:t>
                             </m:r>
+                            <m:d>
+                              <m:dPr>
+                                <m:begChr m:val="["/>
+                                <m:endChr m:val="]"/>
+                                <m:ctrlPr>
+                                  <a:rPr lang="en-US" i="1">
+                                    <a:latin typeface="Cambria Math" panose="02040503050406030204" pitchFamily="18" charset="0"/>
+                                  </a:rPr>
+                                </m:ctrlPr>
+                              </m:dPr>
+                              <m:e>
+                                <m:r>
+                                  <a:rPr lang="en-US" b="0" i="1" smtClean="0">
+                                    <a:latin typeface="Cambria Math" panose="02040503050406030204" pitchFamily="18" charset="0"/>
+                                  </a:rPr>
+                                  <m:t>1</m:t>
+                                </m:r>
+                                <m:r>
+                                  <a:rPr lang="en-US" i="1">
+                                    <a:latin typeface="Cambria Math" panose="02040503050406030204" pitchFamily="18" charset="0"/>
+                                  </a:rPr>
+                                  <m:t>,</m:t>
+                                </m:r>
+                                <m:r>
+                                  <a:rPr lang="en-US" b="0" i="1" smtClean="0">
+                                    <a:latin typeface="Cambria Math" panose="02040503050406030204" pitchFamily="18" charset="0"/>
+                                  </a:rPr>
+                                  <m:t>1</m:t>
+                                </m:r>
+                              </m:e>
+                            </m:d>
                             <m:r>
                               <m:rPr>
                                 <m:nor/>
@@ -8577,12 +7115,24 @@
                         </m:ctrlPr>
                       </m:sSupPr>
                       <m:e>
-                        <m:r>
-                          <a:rPr lang="en-US" i="1">
-                            <a:latin typeface="Cambria Math" panose="02040503050406030204" pitchFamily="18" charset="0"/>
-                          </a:rPr>
-                          <m:t>𝜇</m:t>
-                        </m:r>
+                        <m:acc>
+                          <m:accPr>
+                            <m:chr m:val="̅"/>
+                            <m:ctrlPr>
+                              <a:rPr lang="en-US" i="1">
+                                <a:latin typeface="Cambria Math" panose="02040503050406030204" pitchFamily="18" charset="0"/>
+                              </a:rPr>
+                            </m:ctrlPr>
+                          </m:accPr>
+                          <m:e>
+                            <m:r>
+                              <a:rPr lang="en-US" i="1">
+                                <a:latin typeface="Cambria Math" panose="02040503050406030204" pitchFamily="18" charset="0"/>
+                              </a:rPr>
+                              <m:t>𝜇</m:t>
+                            </m:r>
+                          </m:e>
+                        </m:acc>
                       </m:e>
                       <m:sup>
                         <m:r>
@@ -8647,12 +7197,24 @@
                         </m:ctrlPr>
                       </m:sSupPr>
                       <m:e>
-                        <m:r>
-                          <a:rPr lang="en-US" i="1">
-                            <a:latin typeface="Cambria Math" panose="02040503050406030204" pitchFamily="18" charset="0"/>
-                          </a:rPr>
-                          <m:t>𝜇</m:t>
-                        </m:r>
+                        <m:acc>
+                          <m:accPr>
+                            <m:chr m:val="̅"/>
+                            <m:ctrlPr>
+                              <a:rPr lang="en-US" i="1">
+                                <a:latin typeface="Cambria Math" panose="02040503050406030204" pitchFamily="18" charset="0"/>
+                              </a:rPr>
+                            </m:ctrlPr>
+                          </m:accPr>
+                          <m:e>
+                            <m:r>
+                              <a:rPr lang="en-US" i="1">
+                                <a:latin typeface="Cambria Math" panose="02040503050406030204" pitchFamily="18" charset="0"/>
+                              </a:rPr>
+                              <m:t>𝜇</m:t>
+                            </m:r>
+                          </m:e>
+                        </m:acc>
                       </m:e>
                       <m:sup>
                         <m:r>
@@ -8706,7 +7268,35 @@
                       <a:rPr lang="en-US" b="0" i="1" smtClean="0">
                         <a:latin typeface="Cambria Math" panose="02040503050406030204" pitchFamily="18" charset="0"/>
                       </a:rPr>
-                      <m:t>=0 </m:t>
+                      <m:t>=</m:t>
+                    </m:r>
+                    <m:d>
+                      <m:dPr>
+                        <m:begChr m:val="["/>
+                        <m:endChr m:val="]"/>
+                        <m:ctrlPr>
+                          <a:rPr lang="en-US" i="1">
+                            <a:latin typeface="Cambria Math" panose="02040503050406030204" pitchFamily="18" charset="0"/>
+                          </a:rPr>
+                        </m:ctrlPr>
+                      </m:dPr>
+                      <m:e>
+                        <m:r>
+                          <a:rPr lang="en-US" i="1">
+                            <a:latin typeface="Cambria Math" panose="02040503050406030204" pitchFamily="18" charset="0"/>
+                          </a:rPr>
+                          <m:t>0,0</m:t>
+                        </m:r>
+                      </m:e>
+                    </m:d>
+                    <m:r>
+                      <m:rPr>
+                        <m:nor/>
+                      </m:rPr>
+                      <a:rPr lang="en-US" b="0" i="0" smtClean="0">
+                        <a:latin typeface="Cambria Math" panose="02040503050406030204" pitchFamily="18" charset="0"/>
+                      </a:rPr>
+                      <m:t> </m:t>
                     </m:r>
                     <m:r>
                       <m:rPr>
@@ -8735,12 +7325,24 @@
                         </m:ctrlPr>
                       </m:sSupPr>
                       <m:e>
-                        <m:r>
-                          <a:rPr lang="en-US" i="1">
-                            <a:latin typeface="Cambria Math" panose="02040503050406030204" pitchFamily="18" charset="0"/>
-                          </a:rPr>
-                          <m:t>𝜇</m:t>
-                        </m:r>
+                        <m:acc>
+                          <m:accPr>
+                            <m:chr m:val="̅"/>
+                            <m:ctrlPr>
+                              <a:rPr lang="en-US" i="1">
+                                <a:latin typeface="Cambria Math" panose="02040503050406030204" pitchFamily="18" charset="0"/>
+                              </a:rPr>
+                            </m:ctrlPr>
+                          </m:accPr>
+                          <m:e>
+                            <m:r>
+                              <a:rPr lang="en-US" i="1">
+                                <a:latin typeface="Cambria Math" panose="02040503050406030204" pitchFamily="18" charset="0"/>
+                              </a:rPr>
+                              <m:t>𝜇</m:t>
+                            </m:r>
+                          </m:e>
+                        </m:acc>
                       </m:e>
                       <m:sup>
                         <m:r>
@@ -8825,8 +7427,27 @@
                       <a:rPr lang="en-US" b="0" i="1" smtClean="0">
                         <a:latin typeface="Cambria Math" panose="02040503050406030204" pitchFamily="18" charset="0"/>
                       </a:rPr>
-                      <m:t>=0</m:t>
+                      <m:t>=</m:t>
                     </m:r>
+                    <m:d>
+                      <m:dPr>
+                        <m:begChr m:val="["/>
+                        <m:endChr m:val="]"/>
+                        <m:ctrlPr>
+                          <a:rPr lang="en-US" i="1">
+                            <a:latin typeface="Cambria Math" panose="02040503050406030204" pitchFamily="18" charset="0"/>
+                          </a:rPr>
+                        </m:ctrlPr>
+                      </m:dPr>
+                      <m:e>
+                        <m:r>
+                          <a:rPr lang="en-US" i="1">
+                            <a:latin typeface="Cambria Math" panose="02040503050406030204" pitchFamily="18" charset="0"/>
+                          </a:rPr>
+                          <m:t>0,0</m:t>
+                        </m:r>
+                      </m:e>
+                    </m:d>
                     <m:r>
                       <m:rPr>
                         <m:nor/>
@@ -8922,7 +7543,7 @@
             </p:txBody>
           </p:sp>
         </mc:Choice>
-        <mc:Fallback xmlns="">
+        <mc:Fallback>
           <p:sp>
             <p:nvSpPr>
               <p:cNvPr id="3" name="Content Placeholder 2"/>
@@ -8980,7 +7601,7 @@
 </p:sld>
 </file>
 
-<file path=ppt/slides/slide6.xml><?xml version="1.0" encoding="utf-8"?>
+<file path=ppt/slides/slide5.xml><?xml version="1.0" encoding="utf-8"?>
 <p:sld xmlns:a="http://schemas.openxmlformats.org/drawingml/2006/main" xmlns:r="http://schemas.openxmlformats.org/officeDocument/2006/relationships" xmlns:p="http://schemas.openxmlformats.org/presentationml/2006/main">
   <p:cSld>
     <p:spTree>
@@ -8997,8 +7618,8 @@
           <a:chExt cx="0" cy="0"/>
         </a:xfrm>
       </p:grpSpPr>
-      <mc:AlternateContent xmlns:mc="http://schemas.openxmlformats.org/markup-compatibility/2006" xmlns:a14="http://schemas.microsoft.com/office/drawing/2010/main">
-        <mc:Choice Requires="a14">
+      <mc:AlternateContent xmlns:mc="http://schemas.openxmlformats.org/markup-compatibility/2006">
+        <mc:Choice xmlns:a14="http://schemas.microsoft.com/office/drawing/2010/main" Requires="a14">
           <p:sp>
             <p:nvSpPr>
               <p:cNvPr id="2" name="Title 1"/>
@@ -9032,12 +7653,24 @@
                           </m:ctrlPr>
                         </m:sSupPr>
                         <m:e>
-                          <m:r>
-                            <a:rPr lang="en-US" i="1">
-                              <a:latin typeface="Cambria Math" panose="02040503050406030204" pitchFamily="18" charset="0"/>
-                            </a:rPr>
-                            <m:t>𝜇</m:t>
-                          </m:r>
+                          <m:acc>
+                            <m:accPr>
+                              <m:chr m:val="̅"/>
+                              <m:ctrlPr>
+                                <a:rPr lang="en-US" i="1">
+                                  <a:latin typeface="Cambria Math" panose="02040503050406030204" pitchFamily="18" charset="0"/>
+                                </a:rPr>
+                              </m:ctrlPr>
+                            </m:accPr>
+                            <m:e>
+                              <m:r>
+                                <a:rPr lang="en-US" i="1">
+                                  <a:latin typeface="Cambria Math" panose="02040503050406030204" pitchFamily="18" charset="0"/>
+                                </a:rPr>
+                                <m:t>𝜇</m:t>
+                              </m:r>
+                            </m:e>
+                          </m:acc>
                         </m:e>
                         <m:sup>
                           <m:r>
@@ -9102,12 +7735,24 @@
                           </m:ctrlPr>
                         </m:sSupPr>
                         <m:e>
-                          <m:r>
-                            <a:rPr lang="en-US" i="1">
-                              <a:latin typeface="Cambria Math" panose="02040503050406030204" pitchFamily="18" charset="0"/>
-                            </a:rPr>
-                            <m:t>𝜇</m:t>
-                          </m:r>
+                          <m:acc>
+                            <m:accPr>
+                              <m:chr m:val="̅"/>
+                              <m:ctrlPr>
+                                <a:rPr lang="en-US" i="1">
+                                  <a:latin typeface="Cambria Math" panose="02040503050406030204" pitchFamily="18" charset="0"/>
+                                </a:rPr>
+                              </m:ctrlPr>
+                            </m:accPr>
+                            <m:e>
+                              <m:r>
+                                <a:rPr lang="en-US" i="1">
+                                  <a:latin typeface="Cambria Math" panose="02040503050406030204" pitchFamily="18" charset="0"/>
+                                </a:rPr>
+                                <m:t>𝜇</m:t>
+                              </m:r>
+                            </m:e>
+                          </m:acc>
                         </m:e>
                         <m:sup>
                           <m:r>
@@ -9161,8 +7806,38 @@
                         <a:rPr lang="en-US" i="1">
                           <a:latin typeface="Cambria Math" panose="02040503050406030204" pitchFamily="18" charset="0"/>
                         </a:rPr>
-                        <m:t>=0 </m:t>
+                        <m:t>=</m:t>
                       </m:r>
+                      <m:d>
+                        <m:dPr>
+                          <m:begChr m:val="["/>
+                          <m:endChr m:val="]"/>
+                          <m:ctrlPr>
+                            <a:rPr lang="en-US" i="1">
+                              <a:latin typeface="Cambria Math" panose="02040503050406030204" pitchFamily="18" charset="0"/>
+                            </a:rPr>
+                          </m:ctrlPr>
+                        </m:dPr>
+                        <m:e>
+                          <m:r>
+                            <a:rPr lang="en-US" i="1">
+                              <a:latin typeface="Cambria Math" panose="02040503050406030204" pitchFamily="18" charset="0"/>
+                            </a:rPr>
+                            <m:t>0,0</m:t>
+                          </m:r>
+                        </m:e>
+                      </m:d>
+                      <m:r>
+                        <m:rPr>
+                          <m:nor/>
+                        </m:rPr>
+                        <a:rPr lang="en-US" b="0" i="0" smtClean="0">
+                          <a:latin typeface="Cambria Math" panose="02040503050406030204" pitchFamily="18" charset="0"/>
+                        </a:rPr>
+                        <m:t> </m:t>
+                      </m:r>
+                    </m:oMath>
+                    <m:oMath xmlns:m="http://schemas.openxmlformats.org/officeDocument/2006/math">
                       <m:r>
                         <m:rPr>
                           <m:nor/>
@@ -9176,7 +7851,7 @@
                         <m:rPr>
                           <m:nor/>
                         </m:rPr>
-                        <a:rPr lang="en-US">
+                        <a:rPr lang="en-US" b="0" i="0" smtClean="0">
                           <a:latin typeface="Cambria Math" panose="02040503050406030204" pitchFamily="18" charset="0"/>
                         </a:rPr>
                         <m:t> </m:t>
@@ -9190,12 +7865,24 @@
                           </m:ctrlPr>
                         </m:sSupPr>
                         <m:e>
-                          <m:r>
-                            <a:rPr lang="en-US" i="1">
-                              <a:latin typeface="Cambria Math" panose="02040503050406030204" pitchFamily="18" charset="0"/>
-                            </a:rPr>
-                            <m:t>𝜇</m:t>
-                          </m:r>
+                          <m:acc>
+                            <m:accPr>
+                              <m:chr m:val="̅"/>
+                              <m:ctrlPr>
+                                <a:rPr lang="en-US" i="1">
+                                  <a:latin typeface="Cambria Math" panose="02040503050406030204" pitchFamily="18" charset="0"/>
+                                </a:rPr>
+                              </m:ctrlPr>
+                            </m:accPr>
+                            <m:e>
+                              <m:r>
+                                <a:rPr lang="en-US" i="1">
+                                  <a:latin typeface="Cambria Math" panose="02040503050406030204" pitchFamily="18" charset="0"/>
+                                </a:rPr>
+                                <m:t>𝜇</m:t>
+                              </m:r>
+                            </m:e>
+                          </m:acc>
                         </m:e>
                         <m:sup>
                           <m:r>
@@ -9280,8 +7967,27 @@
                         <a:rPr lang="en-US" i="1">
                           <a:latin typeface="Cambria Math" panose="02040503050406030204" pitchFamily="18" charset="0"/>
                         </a:rPr>
-                        <m:t>=0</m:t>
+                        <m:t>=</m:t>
                       </m:r>
+                      <m:d>
+                        <m:dPr>
+                          <m:begChr m:val="["/>
+                          <m:endChr m:val="]"/>
+                          <m:ctrlPr>
+                            <a:rPr lang="en-US" i="1">
+                              <a:latin typeface="Cambria Math" panose="02040503050406030204" pitchFamily="18" charset="0"/>
+                            </a:rPr>
+                          </m:ctrlPr>
+                        </m:dPr>
+                        <m:e>
+                          <m:r>
+                            <a:rPr lang="en-US" i="1">
+                              <a:latin typeface="Cambria Math" panose="02040503050406030204" pitchFamily="18" charset="0"/>
+                            </a:rPr>
+                            <m:t>0,0</m:t>
+                          </m:r>
+                        </m:e>
+                      </m:d>
                       <m:r>
                         <m:rPr>
                           <m:nor/>
@@ -9297,7 +8003,7 @@
             </p:txBody>
           </p:sp>
         </mc:Choice>
-        <mc:Fallback xmlns="">
+        <mc:Fallback>
           <p:sp>
             <p:nvSpPr>
               <p:cNvPr id="2" name="Title 1"/>
@@ -9331,8 +8037,8 @@
           </p:sp>
         </mc:Fallback>
       </mc:AlternateContent>
-      <mc:AlternateContent xmlns:mc="http://schemas.openxmlformats.org/markup-compatibility/2006" xmlns:a14="http://schemas.microsoft.com/office/drawing/2010/main">
-        <mc:Choice Requires="a14">
+      <mc:AlternateContent xmlns:mc="http://schemas.openxmlformats.org/markup-compatibility/2006">
+        <mc:Choice xmlns:a14="http://schemas.microsoft.com/office/drawing/2010/main" Requires="a14">
           <p:sp>
             <p:nvSpPr>
               <p:cNvPr id="3" name="Content Placeholder 2"/>
@@ -9367,18 +8073,30 @@
                       <m:sSup>
                         <m:sSupPr>
                           <m:ctrlPr>
-                            <a:rPr lang="en-US" i="1" smtClean="0">
+                            <a:rPr lang="en-US" i="1">
                               <a:latin typeface="Cambria Math" panose="02040503050406030204" pitchFamily="18" charset="0"/>
                             </a:rPr>
                           </m:ctrlPr>
                         </m:sSupPr>
                         <m:e>
-                          <m:r>
-                            <a:rPr lang="en-US" i="1">
-                              <a:latin typeface="Cambria Math" panose="02040503050406030204" pitchFamily="18" charset="0"/>
-                            </a:rPr>
-                            <m:t>𝜇</m:t>
-                          </m:r>
+                          <m:acc>
+                            <m:accPr>
+                              <m:chr m:val="̅"/>
+                              <m:ctrlPr>
+                                <a:rPr lang="en-US" i="1">
+                                  <a:latin typeface="Cambria Math" panose="02040503050406030204" pitchFamily="18" charset="0"/>
+                                </a:rPr>
+                              </m:ctrlPr>
+                            </m:accPr>
+                            <m:e>
+                              <m:r>
+                                <a:rPr lang="en-US" i="1">
+                                  <a:latin typeface="Cambria Math" panose="02040503050406030204" pitchFamily="18" charset="0"/>
+                                </a:rPr>
+                                <m:t>𝜇</m:t>
+                              </m:r>
+                            </m:e>
+                          </m:acc>
                         </m:e>
                         <m:sup>
                           <m:r>
@@ -9443,12 +8161,24 @@
                           </m:ctrlPr>
                         </m:sSupPr>
                         <m:e>
-                          <m:r>
-                            <a:rPr lang="en-US" i="1">
-                              <a:latin typeface="Cambria Math" panose="02040503050406030204" pitchFamily="18" charset="0"/>
-                            </a:rPr>
-                            <m:t>𝜇</m:t>
-                          </m:r>
+                          <m:acc>
+                            <m:accPr>
+                              <m:chr m:val="̅"/>
+                              <m:ctrlPr>
+                                <a:rPr lang="en-US" i="1">
+                                  <a:latin typeface="Cambria Math" panose="02040503050406030204" pitchFamily="18" charset="0"/>
+                                </a:rPr>
+                              </m:ctrlPr>
+                            </m:accPr>
+                            <m:e>
+                              <m:r>
+                                <a:rPr lang="en-US" i="1">
+                                  <a:latin typeface="Cambria Math" panose="02040503050406030204" pitchFamily="18" charset="0"/>
+                                </a:rPr>
+                                <m:t>𝜇</m:t>
+                              </m:r>
+                            </m:e>
+                          </m:acc>
                         </m:e>
                         <m:sup>
                           <m:r>
@@ -9502,8 +8232,27 @@
                         <a:rPr lang="en-US" i="1">
                           <a:latin typeface="Cambria Math" panose="02040503050406030204" pitchFamily="18" charset="0"/>
                         </a:rPr>
-                        <m:t>=0</m:t>
+                        <m:t>=</m:t>
                       </m:r>
+                      <m:d>
+                        <m:dPr>
+                          <m:begChr m:val="["/>
+                          <m:endChr m:val="]"/>
+                          <m:ctrlPr>
+                            <a:rPr lang="en-US" i="1">
+                              <a:latin typeface="Cambria Math" panose="02040503050406030204" pitchFamily="18" charset="0"/>
+                            </a:rPr>
+                          </m:ctrlPr>
+                        </m:dPr>
+                        <m:e>
+                          <m:r>
+                            <a:rPr lang="en-US" i="1">
+                              <a:latin typeface="Cambria Math" panose="02040503050406030204" pitchFamily="18" charset="0"/>
+                            </a:rPr>
+                            <m:t>0,0</m:t>
+                          </m:r>
+                        </m:e>
+                      </m:d>
                     </m:oMath>
                     <m:oMath xmlns:m="http://schemas.openxmlformats.org/officeDocument/2006/math">
                       <m:r>
@@ -9847,7 +8596,7 @@
             </p:txBody>
           </p:sp>
         </mc:Choice>
-        <mc:Fallback xmlns="">
+        <mc:Fallback>
           <p:sp>
             <p:nvSpPr>
               <p:cNvPr id="3" name="Content Placeholder 2"/>
@@ -10118,8 +8867,8 @@
           </a:p>
         </p:txBody>
       </p:sp>
-      <mc:AlternateContent xmlns:mc="http://schemas.openxmlformats.org/markup-compatibility/2006">
-        <mc:Choice xmlns:a14="http://schemas.microsoft.com/office/drawing/2010/main" Requires="a14">
+      <mc:AlternateContent xmlns:mc="http://schemas.openxmlformats.org/markup-compatibility/2006" xmlns:a14="http://schemas.microsoft.com/office/drawing/2010/main">
+        <mc:Choice Requires="a14">
           <p:sp>
             <p:nvSpPr>
               <p:cNvPr id="16" name="Rectangle 15"/>
@@ -10162,7 +8911,7 @@
             </p:txBody>
           </p:sp>
         </mc:Choice>
-        <mc:Fallback>
+        <mc:Fallback xmlns="">
           <p:sp>
             <p:nvSpPr>
               <p:cNvPr id="16" name="Rectangle 15"/>
@@ -10201,8 +8950,8 @@
           </p:sp>
         </mc:Fallback>
       </mc:AlternateContent>
-      <mc:AlternateContent xmlns:mc="http://schemas.openxmlformats.org/markup-compatibility/2006">
-        <mc:Choice xmlns:a14="http://schemas.microsoft.com/office/drawing/2010/main" Requires="a14">
+      <mc:AlternateContent xmlns:mc="http://schemas.openxmlformats.org/markup-compatibility/2006" xmlns:a14="http://schemas.microsoft.com/office/drawing/2010/main">
+        <mc:Choice Requires="a14">
           <p:sp>
             <p:nvSpPr>
               <p:cNvPr id="17" name="Rectangle 16"/>
@@ -10245,7 +8994,7 @@
             </p:txBody>
           </p:sp>
         </mc:Choice>
-        <mc:Fallback>
+        <mc:Fallback xmlns="">
           <p:sp>
             <p:nvSpPr>
               <p:cNvPr id="17" name="Rectangle 16"/>
@@ -10284,8 +9033,8 @@
           </p:sp>
         </mc:Fallback>
       </mc:AlternateContent>
-      <mc:AlternateContent xmlns:mc="http://schemas.openxmlformats.org/markup-compatibility/2006">
-        <mc:Choice xmlns:a14="http://schemas.microsoft.com/office/drawing/2010/main" Requires="a14">
+      <mc:AlternateContent xmlns:mc="http://schemas.openxmlformats.org/markup-compatibility/2006" xmlns:a14="http://schemas.microsoft.com/office/drawing/2010/main">
+        <mc:Choice Requires="a14">
           <p:sp>
             <p:nvSpPr>
               <p:cNvPr id="18" name="Rectangle 17"/>
@@ -10334,7 +9083,7 @@
             </p:txBody>
           </p:sp>
         </mc:Choice>
-        <mc:Fallback>
+        <mc:Fallback xmlns="">
           <p:sp>
             <p:nvSpPr>
               <p:cNvPr id="18" name="Rectangle 17"/>
@@ -10373,8 +9122,8 @@
           </p:sp>
         </mc:Fallback>
       </mc:AlternateContent>
-      <mc:AlternateContent xmlns:mc="http://schemas.openxmlformats.org/markup-compatibility/2006">
-        <mc:Choice xmlns:a14="http://schemas.microsoft.com/office/drawing/2010/main" Requires="a14">
+      <mc:AlternateContent xmlns:mc="http://schemas.openxmlformats.org/markup-compatibility/2006" xmlns:a14="http://schemas.microsoft.com/office/drawing/2010/main">
+        <mc:Choice Requires="a14">
           <p:sp>
             <p:nvSpPr>
               <p:cNvPr id="19" name="Rectangle 18"/>
@@ -10423,7 +9172,7 @@
             </p:txBody>
           </p:sp>
         </mc:Choice>
-        <mc:Fallback>
+        <mc:Fallback xmlns="">
           <p:sp>
             <p:nvSpPr>
               <p:cNvPr id="19" name="Rectangle 18"/>
@@ -10462,8 +9211,8 @@
           </p:sp>
         </mc:Fallback>
       </mc:AlternateContent>
-      <mc:AlternateContent xmlns:mc="http://schemas.openxmlformats.org/markup-compatibility/2006">
-        <mc:Choice xmlns:a14="http://schemas.microsoft.com/office/drawing/2010/main" Requires="a14">
+      <mc:AlternateContent xmlns:mc="http://schemas.openxmlformats.org/markup-compatibility/2006" xmlns:a14="http://schemas.microsoft.com/office/drawing/2010/main">
+        <mc:Choice Requires="a14">
           <p:sp>
             <p:nvSpPr>
               <p:cNvPr id="20" name="Rectangle 19"/>
@@ -10506,7 +9255,7 @@
             </p:txBody>
           </p:sp>
         </mc:Choice>
-        <mc:Fallback>
+        <mc:Fallback xmlns="">
           <p:sp>
             <p:nvSpPr>
               <p:cNvPr id="20" name="Rectangle 19"/>
@@ -10680,8 +9429,8 @@
           </a:p>
         </p:txBody>
       </p:sp>
-      <mc:AlternateContent xmlns:mc="http://schemas.openxmlformats.org/markup-compatibility/2006">
-        <mc:Choice xmlns:a14="http://schemas.microsoft.com/office/drawing/2010/main" Requires="a14">
+      <mc:AlternateContent xmlns:mc="http://schemas.openxmlformats.org/markup-compatibility/2006" xmlns:a14="http://schemas.microsoft.com/office/drawing/2010/main">
+        <mc:Choice Requires="a14">
           <p:sp>
             <p:nvSpPr>
               <p:cNvPr id="26" name="Rectangle 25"/>
@@ -10801,7 +9550,7 @@
             </p:txBody>
           </p:sp>
         </mc:Choice>
-        <mc:Fallback>
+        <mc:Fallback xmlns="">
           <p:sp>
             <p:nvSpPr>
               <p:cNvPr id="26" name="Rectangle 25"/>
@@ -10840,8 +9589,8 @@
           </p:sp>
         </mc:Fallback>
       </mc:AlternateContent>
-      <mc:AlternateContent xmlns:mc="http://schemas.openxmlformats.org/markup-compatibility/2006">
-        <mc:Choice xmlns:a14="http://schemas.microsoft.com/office/drawing/2010/main" Requires="a14">
+      <mc:AlternateContent xmlns:mc="http://schemas.openxmlformats.org/markup-compatibility/2006" xmlns:a14="http://schemas.microsoft.com/office/drawing/2010/main">
+        <mc:Choice Requires="a14">
           <p:sp>
             <p:nvSpPr>
               <p:cNvPr id="27" name="Rectangle 26"/>
@@ -10961,7 +9710,7 @@
             </p:txBody>
           </p:sp>
         </mc:Choice>
-        <mc:Fallback>
+        <mc:Fallback xmlns="">
           <p:sp>
             <p:nvSpPr>
               <p:cNvPr id="27" name="Rectangle 26"/>
@@ -11000,8 +9749,8 @@
           </p:sp>
         </mc:Fallback>
       </mc:AlternateContent>
-      <mc:AlternateContent xmlns:mc="http://schemas.openxmlformats.org/markup-compatibility/2006" xmlns:a14="http://schemas.microsoft.com/office/drawing/2010/main">
-        <mc:Choice Requires="a14">
+      <mc:AlternateContent xmlns:mc="http://schemas.openxmlformats.org/markup-compatibility/2006">
+        <mc:Choice xmlns:a14="http://schemas.microsoft.com/office/drawing/2010/main" Requires="a14">
           <p:sp>
             <p:nvSpPr>
               <p:cNvPr id="28" name="Content Placeholder 2"/>
@@ -11337,12 +10086,24 @@
                           </m:ctrlPr>
                         </m:sSupPr>
                         <m:e>
-                          <m:r>
-                            <a:rPr lang="en-US" i="1">
-                              <a:latin typeface="Cambria Math" panose="02040503050406030204" pitchFamily="18" charset="0"/>
-                            </a:rPr>
-                            <m:t>𝜇</m:t>
-                          </m:r>
+                          <m:acc>
+                            <m:accPr>
+                              <m:chr m:val="̅"/>
+                              <m:ctrlPr>
+                                <a:rPr lang="en-US" i="1">
+                                  <a:latin typeface="Cambria Math" panose="02040503050406030204" pitchFamily="18" charset="0"/>
+                                </a:rPr>
+                              </m:ctrlPr>
+                            </m:accPr>
+                            <m:e>
+                              <m:r>
+                                <a:rPr lang="en-US" i="1">
+                                  <a:latin typeface="Cambria Math" panose="02040503050406030204" pitchFamily="18" charset="0"/>
+                                </a:rPr>
+                                <m:t>𝜇</m:t>
+                              </m:r>
+                            </m:e>
+                          </m:acc>
                         </m:e>
                         <m:sup>
                           <m:r>
@@ -11427,8 +10188,27 @@
                         <a:rPr lang="en-US" i="1">
                           <a:latin typeface="Cambria Math" panose="02040503050406030204" pitchFamily="18" charset="0"/>
                         </a:rPr>
-                        <m:t>=0</m:t>
+                        <m:t>=</m:t>
                       </m:r>
+                      <m:d>
+                        <m:dPr>
+                          <m:begChr m:val="["/>
+                          <m:endChr m:val="]"/>
+                          <m:ctrlPr>
+                            <a:rPr lang="en-US" i="1">
+                              <a:latin typeface="Cambria Math" panose="02040503050406030204" pitchFamily="18" charset="0"/>
+                            </a:rPr>
+                          </m:ctrlPr>
+                        </m:dPr>
+                        <m:e>
+                          <m:r>
+                            <a:rPr lang="en-US" i="1">
+                              <a:latin typeface="Cambria Math" panose="02040503050406030204" pitchFamily="18" charset="0"/>
+                            </a:rPr>
+                            <m:t>0,0</m:t>
+                          </m:r>
+                        </m:e>
+                      </m:d>
                     </m:oMath>
                   </m:oMathPara>
                 </a14:m>
@@ -11437,7 +10217,7 @@
             </p:txBody>
           </p:sp>
         </mc:Choice>
-        <mc:Fallback xmlns="">
+        <mc:Fallback>
           <p:sp>
             <p:nvSpPr>
               <p:cNvPr id="28" name="Content Placeholder 2"/>
@@ -11455,7 +10235,7 @@
                 <a:avLst/>
               </a:prstGeom>
               <a:blipFill rotWithShape="0">
-                <a:blip r:embed="rId13"/>
+                <a:blip r:embed="rId12"/>
                 <a:stretch>
                   <a:fillRect/>
                 </a:stretch>
@@ -11476,8 +10256,8 @@
           </p:sp>
         </mc:Fallback>
       </mc:AlternateContent>
-      <mc:AlternateContent xmlns:mc="http://schemas.openxmlformats.org/markup-compatibility/2006">
-        <mc:Choice xmlns:a14="http://schemas.microsoft.com/office/drawing/2010/main" Requires="a14">
+      <mc:AlternateContent xmlns:mc="http://schemas.openxmlformats.org/markup-compatibility/2006" xmlns:a14="http://schemas.microsoft.com/office/drawing/2010/main">
+        <mc:Choice Requires="a14">
           <p:sp>
             <p:nvSpPr>
               <p:cNvPr id="29" name="Rectangle 28"/>
@@ -11575,7 +10355,7 @@
             </p:txBody>
           </p:sp>
         </mc:Choice>
-        <mc:Fallback>
+        <mc:Fallback xmlns="">
           <p:sp>
             <p:nvSpPr>
               <p:cNvPr id="29" name="Rectangle 28"/>

</xml_diff>

<commit_message>
Updating according to the meeting...
</commit_message>
<xml_diff>
--- a/Kochen-Specker Theorem in QIVPM.pptx
+++ b/Kochen-Specker Theorem in QIVPM.pptx
@@ -204,7 +204,7 @@
           <a:p>
             <a:fld id="{FE3023B1-3AFF-46C4-97DC-7BEE883CD9D8}" type="datetimeFigureOut">
               <a:rPr lang="en-US" smtClean="0"/>
-              <a:t>6/23/2017</a:t>
+              <a:t>6/26/2017</a:t>
             </a:fld>
             <a:endParaRPr lang="en-US"/>
           </a:p>
@@ -369,7 +369,7 @@
           <a:p>
             <a:fld id="{384BE3C3-7DB8-44EE-9555-F40C087B77CA}" type="datetimeFigureOut">
               <a:rPr lang="en-US" smtClean="0"/>
-              <a:t>6/23/2017</a:t>
+              <a:t>6/26/2017</a:t>
             </a:fld>
             <a:endParaRPr lang="en-US"/>
           </a:p>
@@ -1213,7 +1213,7 @@
           <a:p>
             <a:fld id="{D1C3BEE1-3E90-49E5-9A2E-FAD1B5091927}" type="datetimeFigureOut">
               <a:rPr lang="en-US" smtClean="0"/>
-              <a:t>6/23/2017</a:t>
+              <a:t>6/26/2017</a:t>
             </a:fld>
             <a:endParaRPr lang="en-US"/>
           </a:p>
@@ -1383,7 +1383,7 @@
           <a:p>
             <a:fld id="{D1C3BEE1-3E90-49E5-9A2E-FAD1B5091927}" type="datetimeFigureOut">
               <a:rPr lang="en-US" smtClean="0"/>
-              <a:t>6/23/2017</a:t>
+              <a:t>6/26/2017</a:t>
             </a:fld>
             <a:endParaRPr lang="en-US"/>
           </a:p>
@@ -1563,7 +1563,7 @@
           <a:p>
             <a:fld id="{D1C3BEE1-3E90-49E5-9A2E-FAD1B5091927}" type="datetimeFigureOut">
               <a:rPr lang="en-US" smtClean="0"/>
-              <a:t>6/23/2017</a:t>
+              <a:t>6/26/2017</a:t>
             </a:fld>
             <a:endParaRPr lang="en-US"/>
           </a:p>
@@ -1733,7 +1733,7 @@
           <a:p>
             <a:fld id="{D1C3BEE1-3E90-49E5-9A2E-FAD1B5091927}" type="datetimeFigureOut">
               <a:rPr lang="en-US" smtClean="0"/>
-              <a:t>6/23/2017</a:t>
+              <a:t>6/26/2017</a:t>
             </a:fld>
             <a:endParaRPr lang="en-US"/>
           </a:p>
@@ -1979,7 +1979,7 @@
           <a:p>
             <a:fld id="{D1C3BEE1-3E90-49E5-9A2E-FAD1B5091927}" type="datetimeFigureOut">
               <a:rPr lang="en-US" smtClean="0"/>
-              <a:t>6/23/2017</a:t>
+              <a:t>6/26/2017</a:t>
             </a:fld>
             <a:endParaRPr lang="en-US"/>
           </a:p>
@@ -2211,7 +2211,7 @@
           <a:p>
             <a:fld id="{D1C3BEE1-3E90-49E5-9A2E-FAD1B5091927}" type="datetimeFigureOut">
               <a:rPr lang="en-US" smtClean="0"/>
-              <a:t>6/23/2017</a:t>
+              <a:t>6/26/2017</a:t>
             </a:fld>
             <a:endParaRPr lang="en-US"/>
           </a:p>
@@ -2578,7 +2578,7 @@
           <a:p>
             <a:fld id="{D1C3BEE1-3E90-49E5-9A2E-FAD1B5091927}" type="datetimeFigureOut">
               <a:rPr lang="en-US" smtClean="0"/>
-              <a:t>6/23/2017</a:t>
+              <a:t>6/26/2017</a:t>
             </a:fld>
             <a:endParaRPr lang="en-US"/>
           </a:p>
@@ -2696,7 +2696,7 @@
           <a:p>
             <a:fld id="{D1C3BEE1-3E90-49E5-9A2E-FAD1B5091927}" type="datetimeFigureOut">
               <a:rPr lang="en-US" smtClean="0"/>
-              <a:t>6/23/2017</a:t>
+              <a:t>6/26/2017</a:t>
             </a:fld>
             <a:endParaRPr lang="en-US"/>
           </a:p>
@@ -2791,7 +2791,7 @@
           <a:p>
             <a:fld id="{D1C3BEE1-3E90-49E5-9A2E-FAD1B5091927}" type="datetimeFigureOut">
               <a:rPr lang="en-US" smtClean="0"/>
-              <a:t>6/23/2017</a:t>
+              <a:t>6/26/2017</a:t>
             </a:fld>
             <a:endParaRPr lang="en-US"/>
           </a:p>
@@ -3068,7 +3068,7 @@
           <a:p>
             <a:fld id="{D1C3BEE1-3E90-49E5-9A2E-FAD1B5091927}" type="datetimeFigureOut">
               <a:rPr lang="en-US" smtClean="0"/>
-              <a:t>6/23/2017</a:t>
+              <a:t>6/26/2017</a:t>
             </a:fld>
             <a:endParaRPr lang="en-US"/>
           </a:p>
@@ -3321,7 +3321,7 @@
           <a:p>
             <a:fld id="{D1C3BEE1-3E90-49E5-9A2E-FAD1B5091927}" type="datetimeFigureOut">
               <a:rPr lang="en-US" smtClean="0"/>
-              <a:t>6/23/2017</a:t>
+              <a:t>6/26/2017</a:t>
             </a:fld>
             <a:endParaRPr lang="en-US"/>
           </a:p>
@@ -3534,7 +3534,7 @@
           <a:p>
             <a:fld id="{D1C3BEE1-3E90-49E5-9A2E-FAD1B5091927}" type="datetimeFigureOut">
               <a:rPr lang="en-US" smtClean="0"/>
-              <a:t>6/23/2017</a:t>
+              <a:t>6/26/2017</a:t>
             </a:fld>
             <a:endParaRPr lang="en-US"/>
           </a:p>
@@ -4041,8 +4041,8 @@
           </a:p>
         </p:txBody>
       </p:sp>
-      <mc:AlternateContent xmlns:mc="http://schemas.openxmlformats.org/markup-compatibility/2006" xmlns:a14="http://schemas.microsoft.com/office/drawing/2010/main">
-        <mc:Choice Requires="a14">
+      <mc:AlternateContent xmlns:mc="http://schemas.openxmlformats.org/markup-compatibility/2006">
+        <mc:Choice xmlns:a14="http://schemas.microsoft.com/office/drawing/2010/main" Requires="a14">
           <p:sp>
             <p:nvSpPr>
               <p:cNvPr id="3" name="Content Placeholder 2"/>
@@ -4065,11 +4065,15 @@
                 </a:pPr>
                 <a:r>
                   <a:rPr lang="en-US" dirty="0" smtClean="0"/>
-                  <a:t>Given the </a:t>
+                  <a:t>Given </a:t>
                 </a:r>
                 <a:r>
                   <a:rPr lang="en-US" dirty="0"/>
-                  <a:t>set of projectors on a Hilbert space </a:t>
+                  <a:t>a Hilbert </a:t>
+                </a:r>
+                <a:r>
+                  <a:rPr lang="en-US" dirty="0" smtClean="0"/>
+                  <a:t>space, let </a:t>
                 </a:r>
                 <a14:m>
                   <m:oMath xmlns:m="http://schemas.openxmlformats.org/officeDocument/2006/math">
@@ -4080,19 +4084,57 @@
                       </a:rPr>
                       <m:t>ℰ</m:t>
                     </m:r>
+                    <m:r>
+                      <a:rPr lang="en-US" i="1">
+                        <a:latin typeface="Cambria Math" panose="02040503050406030204" pitchFamily="18" charset="0"/>
+                        <a:ea typeface="Cambria Math" panose="02040503050406030204" pitchFamily="18" charset="0"/>
+                      </a:rPr>
+                      <m:t> </m:t>
+                    </m:r>
                   </m:oMath>
                 </a14:m>
                 <a:r>
                   <a:rPr lang="en-US" dirty="0" smtClean="0"/>
-                  <a:t>,</a:t>
+                  <a:t>be the </a:t>
                 </a:r>
                 <a:r>
                   <a:rPr lang="en-US" dirty="0"/>
-                  <a:t> a</a:t>
+                  <a:t>set of </a:t>
                 </a:r>
                 <a:r>
                   <a:rPr lang="en-US" dirty="0" smtClean="0"/>
-                  <a:t> QIVPM</a:t>
+                  <a:t>all projectors, </a:t>
+                </a:r>
+                <a14:m>
+                  <m:oMath xmlns:m="http://schemas.openxmlformats.org/officeDocument/2006/math">
+                    <m:r>
+                      <m:rPr>
+                        <m:nor/>
+                      </m:rPr>
+                      <a:rPr lang="en-US" dirty="0">
+                        <a:latin typeface="XITS Math" panose="02000503000000000000" pitchFamily="50" charset="0"/>
+                        <a:ea typeface="XITS Math" panose="02000503000000000000" pitchFamily="50" charset="0"/>
+                        <a:cs typeface="XITS Math" panose="02000503000000000000" pitchFamily="50" charset="0"/>
+                      </a:rPr>
+                      <m:t>ℐ</m:t>
+                    </m:r>
+                    <m:r>
+                      <a:rPr lang="en-US" i="1" dirty="0">
+                        <a:latin typeface="XITS Math" panose="02000503000000000000" pitchFamily="50" charset="0"/>
+                        <a:ea typeface="XITS Math" panose="02000503000000000000" pitchFamily="50" charset="0"/>
+                        <a:cs typeface="XITS Math" panose="02000503000000000000" pitchFamily="50" charset="0"/>
+                      </a:rPr>
+                      <m:t> </m:t>
+                    </m:r>
+                  </m:oMath>
+                </a14:m>
+                <a:r>
+                  <a:rPr lang="en-US" dirty="0" smtClean="0"/>
+                  <a:t> be a set of intervals, a </a:t>
+                </a:r>
+                <a:r>
+                  <a:rPr lang="en-US" dirty="0" smtClean="0"/>
+                  <a:t>QIVPM</a:t>
                 </a:r>
                 <a:r>
                   <a:rPr lang="en-US" dirty="0"/>
@@ -5407,7 +5449,7 @@
             </p:txBody>
           </p:sp>
         </mc:Choice>
-        <mc:Fallback xmlns="">
+        <mc:Fallback>
           <p:sp>
             <p:nvSpPr>
               <p:cNvPr id="3" name="Content Placeholder 2"/>
@@ -6475,8 +6517,8 @@
           </a:p>
         </p:txBody>
       </p:sp>
-      <mc:AlternateContent xmlns:mc="http://schemas.openxmlformats.org/markup-compatibility/2006" xmlns:a14="http://schemas.microsoft.com/office/drawing/2010/main">
-        <mc:Choice Requires="a14">
+      <mc:AlternateContent xmlns:mc="http://schemas.openxmlformats.org/markup-compatibility/2006">
+        <mc:Choice xmlns:a14="http://schemas.microsoft.com/office/drawing/2010/main" Requires="a14">
           <p:sp>
             <p:nvSpPr>
               <p:cNvPr id="3" name="Content Placeholder 2"/>
@@ -6563,8 +6605,9 @@
                 </a:pPr>
                 <a:r>
                   <a:rPr lang="en-US" b="1" dirty="0" smtClean="0"/>
-                  <a:t>Proof</a:t>
+                  <a:t>Proof by Contradiction!</a:t>
                 </a:r>
+                <a:endParaRPr lang="en-US" b="1" dirty="0" smtClean="0"/>
               </a:p>
               <a:p>
                 <a:r>
@@ -7434,7 +7477,15 @@
                 </a:r>
                 <a:r>
                   <a:rPr lang="en-US" dirty="0"/>
-                  <a:t>any orthogonal projector </a:t>
+                  <a:t>any orthogonal </a:t>
+                </a:r>
+                <a:r>
+                  <a:rPr lang="en-US" dirty="0" smtClean="0"/>
+                  <a:t>projectors</a:t>
+                </a:r>
+                <a:r>
+                  <a:rPr lang="en-US" dirty="0"/>
+                  <a:t> </a:t>
                 </a:r>
                 <a14:m>
                   <m:oMath xmlns:m="http://schemas.openxmlformats.org/officeDocument/2006/math">
@@ -7507,7 +7558,7 @@
             </p:txBody>
           </p:sp>
         </mc:Choice>
-        <mc:Fallback xmlns="">
+        <mc:Fallback>
           <p:sp>
             <p:nvSpPr>
               <p:cNvPr id="3" name="Content Placeholder 2"/>
@@ -7582,8 +7633,8 @@
           <a:chExt cx="0" cy="0"/>
         </a:xfrm>
       </p:grpSpPr>
-      <mc:AlternateContent xmlns:mc="http://schemas.openxmlformats.org/markup-compatibility/2006">
-        <mc:Choice xmlns:a14="http://schemas.microsoft.com/office/drawing/2010/main" Requires="a14">
+      <mc:AlternateContent xmlns:mc="http://schemas.openxmlformats.org/markup-compatibility/2006" xmlns:a14="http://schemas.microsoft.com/office/drawing/2010/main">
+        <mc:Choice Requires="a14">
           <p:sp>
             <p:nvSpPr>
               <p:cNvPr id="2" name="Title 1"/>
@@ -7944,7 +7995,7 @@
             </p:txBody>
           </p:sp>
         </mc:Choice>
-        <mc:Fallback>
+        <mc:Fallback xmlns="">
           <p:sp>
             <p:nvSpPr>
               <p:cNvPr id="2" name="Title 1"/>

</xml_diff>